<commit_message>
- Atualização do projeto
</commit_message>
<xml_diff>
--- a/slides/design-patterns.pptx
+++ b/slides/design-patterns.pptx
@@ -5,15 +5,21 @@
     <p:sldMasterId id="2147483659" r:id="rId1"/>
   </p:sldMasterIdLst>
   <p:notesMasterIdLst>
-    <p:notesMasterId r:id="rId8"/>
+    <p:notesMasterId r:id="rId14"/>
   </p:notesMasterIdLst>
   <p:sldIdLst>
     <p:sldId id="256" r:id="rId2"/>
     <p:sldId id="273" r:id="rId3"/>
     <p:sldId id="289" r:id="rId4"/>
     <p:sldId id="290" r:id="rId5"/>
-    <p:sldId id="291" r:id="rId6"/>
-    <p:sldId id="292" r:id="rId7"/>
+    <p:sldId id="293" r:id="rId6"/>
+    <p:sldId id="291" r:id="rId7"/>
+    <p:sldId id="294" r:id="rId8"/>
+    <p:sldId id="292" r:id="rId9"/>
+    <p:sldId id="295" r:id="rId10"/>
+    <p:sldId id="296" r:id="rId11"/>
+    <p:sldId id="297" r:id="rId12"/>
+    <p:sldId id="298" r:id="rId13"/>
   </p:sldIdLst>
   <p:sldSz cx="9144000" cy="6858000" type="screen4x3"/>
   <p:notesSz cx="6858000" cy="9144000"/>
@@ -1643,6 +1649,474 @@
 </p:notes>
 </file>
 
+<file path=ppt/notesSlides/notesSlide10.xml><?xml version="1.0" encoding="utf-8"?>
+<p:notes xmlns:a="http://schemas.openxmlformats.org/drawingml/2006/main" xmlns:r="http://schemas.openxmlformats.org/officeDocument/2006/relationships" xmlns:p="http://schemas.openxmlformats.org/presentationml/2006/main" showMasterSp="0" showMasterPhAnim="0">
+  <p:cSld>
+    <p:spTree>
+      <p:nvGrpSpPr>
+        <p:cNvPr id="1" name="Shape 93"/>
+        <p:cNvGrpSpPr/>
+        <p:nvPr/>
+      </p:nvGrpSpPr>
+      <p:grpSpPr>
+        <a:xfrm>
+          <a:off x="0" y="0"/>
+          <a:ext cx="0" cy="0"/>
+          <a:chOff x="0" y="0"/>
+          <a:chExt cx="0" cy="0"/>
+        </a:xfrm>
+      </p:grpSpPr>
+      <p:sp>
+        <p:nvSpPr>
+          <p:cNvPr id="94" name="Google Shape;94;g5dba4fbf02_0_32:notes"/>
+          <p:cNvSpPr>
+            <a:spLocks noGrp="1" noRot="1" noChangeAspect="1"/>
+          </p:cNvSpPr>
+          <p:nvPr>
+            <p:ph type="sldImg" idx="2"/>
+          </p:nvPr>
+        </p:nvSpPr>
+        <p:spPr>
+          <a:xfrm>
+            <a:off x="1143000" y="685800"/>
+            <a:ext cx="4572000" cy="3429000"/>
+          </a:xfrm>
+          <a:custGeom>
+            <a:avLst/>
+            <a:gdLst/>
+            <a:ahLst/>
+            <a:cxnLst/>
+            <a:rect l="l" t="t" r="r" b="b"/>
+            <a:pathLst>
+              <a:path w="120000" h="120000" extrusionOk="0">
+                <a:moveTo>
+                  <a:pt x="0" y="0"/>
+                </a:moveTo>
+                <a:lnTo>
+                  <a:pt x="120000" y="0"/>
+                </a:lnTo>
+                <a:lnTo>
+                  <a:pt x="120000" y="120000"/>
+                </a:lnTo>
+                <a:lnTo>
+                  <a:pt x="0" y="120000"/>
+                </a:lnTo>
+                <a:close/>
+              </a:path>
+            </a:pathLst>
+          </a:custGeom>
+        </p:spPr>
+      </p:sp>
+      <p:sp>
+        <p:nvSpPr>
+          <p:cNvPr id="95" name="Google Shape;95;g5dba4fbf02_0_32:notes"/>
+          <p:cNvSpPr txBox="1">
+            <a:spLocks noGrp="1"/>
+          </p:cNvSpPr>
+          <p:nvPr>
+            <p:ph type="body" idx="1"/>
+          </p:nvPr>
+        </p:nvSpPr>
+        <p:spPr>
+          <a:xfrm>
+            <a:off x="685800" y="4343400"/>
+            <a:ext cx="5486400" cy="4114800"/>
+          </a:xfrm>
+          <a:prstGeom prst="rect">
+            <a:avLst/>
+          </a:prstGeom>
+        </p:spPr>
+        <p:txBody>
+          <a:bodyPr spcFirstLastPara="1" wrap="square" lIns="91425" tIns="45700" rIns="91425" bIns="45700" anchor="t" anchorCtr="0">
+            <a:noAutofit/>
+          </a:bodyPr>
+          <a:lstStyle/>
+          <a:p>
+            <a:pPr marL="0" lvl="0" indent="0" algn="l" rtl="0">
+              <a:spcBef>
+                <a:spcPts val="0"/>
+              </a:spcBef>
+              <a:spcAft>
+                <a:spcPts val="0"/>
+              </a:spcAft>
+              <a:buNone/>
+            </a:pPr>
+            <a:endParaRPr dirty="0"/>
+          </a:p>
+        </p:txBody>
+      </p:sp>
+      <p:sp>
+        <p:nvSpPr>
+          <p:cNvPr id="96" name="Google Shape;96;g5dba4fbf02_0_32:notes"/>
+          <p:cNvSpPr txBox="1">
+            <a:spLocks noGrp="1"/>
+          </p:cNvSpPr>
+          <p:nvPr>
+            <p:ph type="sldNum" idx="12"/>
+          </p:nvPr>
+        </p:nvSpPr>
+        <p:spPr>
+          <a:xfrm>
+            <a:off x="3884612" y="8685212"/>
+            <a:ext cx="2971800" cy="457200"/>
+          </a:xfrm>
+          <a:prstGeom prst="rect">
+            <a:avLst/>
+          </a:prstGeom>
+        </p:spPr>
+        <p:txBody>
+          <a:bodyPr spcFirstLastPara="1" wrap="square" lIns="91425" tIns="45700" rIns="91425" bIns="45700" anchor="b" anchorCtr="0">
+            <a:noAutofit/>
+          </a:bodyPr>
+          <a:lstStyle/>
+          <a:p>
+            <a:pPr marL="0" lvl="0" indent="0" algn="r" rtl="0">
+              <a:spcBef>
+                <a:spcPts val="0"/>
+              </a:spcBef>
+              <a:spcAft>
+                <a:spcPts val="0"/>
+              </a:spcAft>
+              <a:buClr>
+                <a:srgbClr val="000000"/>
+              </a:buClr>
+              <a:buSzPts val="1200"/>
+              <a:buFont typeface="Arial"/>
+              <a:buNone/>
+            </a:pPr>
+            <a:fld id="{00000000-1234-1234-1234-123412341234}" type="slidenum">
+              <a:rPr lang="en-US"/>
+              <a:t>10</a:t>
+            </a:fld>
+            <a:endParaRPr sz="1400"/>
+          </a:p>
+        </p:txBody>
+      </p:sp>
+    </p:spTree>
+    <p:extLst>
+      <p:ext uri="{BB962C8B-B14F-4D97-AF65-F5344CB8AC3E}">
+        <p14:creationId xmlns:p14="http://schemas.microsoft.com/office/powerpoint/2010/main" val="2036627115"/>
+      </p:ext>
+    </p:extLst>
+  </p:cSld>
+  <p:clrMapOvr>
+    <a:masterClrMapping/>
+  </p:clrMapOvr>
+</p:notes>
+</file>
+
+<file path=ppt/notesSlides/notesSlide11.xml><?xml version="1.0" encoding="utf-8"?>
+<p:notes xmlns:a="http://schemas.openxmlformats.org/drawingml/2006/main" xmlns:r="http://schemas.openxmlformats.org/officeDocument/2006/relationships" xmlns:p="http://schemas.openxmlformats.org/presentationml/2006/main" showMasterSp="0" showMasterPhAnim="0">
+  <p:cSld>
+    <p:spTree>
+      <p:nvGrpSpPr>
+        <p:cNvPr id="1" name="Shape 93"/>
+        <p:cNvGrpSpPr/>
+        <p:nvPr/>
+      </p:nvGrpSpPr>
+      <p:grpSpPr>
+        <a:xfrm>
+          <a:off x="0" y="0"/>
+          <a:ext cx="0" cy="0"/>
+          <a:chOff x="0" y="0"/>
+          <a:chExt cx="0" cy="0"/>
+        </a:xfrm>
+      </p:grpSpPr>
+      <p:sp>
+        <p:nvSpPr>
+          <p:cNvPr id="94" name="Google Shape;94;g5dba4fbf02_0_32:notes"/>
+          <p:cNvSpPr>
+            <a:spLocks noGrp="1" noRot="1" noChangeAspect="1"/>
+          </p:cNvSpPr>
+          <p:nvPr>
+            <p:ph type="sldImg" idx="2"/>
+          </p:nvPr>
+        </p:nvSpPr>
+        <p:spPr>
+          <a:xfrm>
+            <a:off x="1143000" y="685800"/>
+            <a:ext cx="4572000" cy="3429000"/>
+          </a:xfrm>
+          <a:custGeom>
+            <a:avLst/>
+            <a:gdLst/>
+            <a:ahLst/>
+            <a:cxnLst/>
+            <a:rect l="l" t="t" r="r" b="b"/>
+            <a:pathLst>
+              <a:path w="120000" h="120000" extrusionOk="0">
+                <a:moveTo>
+                  <a:pt x="0" y="0"/>
+                </a:moveTo>
+                <a:lnTo>
+                  <a:pt x="120000" y="0"/>
+                </a:lnTo>
+                <a:lnTo>
+                  <a:pt x="120000" y="120000"/>
+                </a:lnTo>
+                <a:lnTo>
+                  <a:pt x="0" y="120000"/>
+                </a:lnTo>
+                <a:close/>
+              </a:path>
+            </a:pathLst>
+          </a:custGeom>
+        </p:spPr>
+      </p:sp>
+      <p:sp>
+        <p:nvSpPr>
+          <p:cNvPr id="95" name="Google Shape;95;g5dba4fbf02_0_32:notes"/>
+          <p:cNvSpPr txBox="1">
+            <a:spLocks noGrp="1"/>
+          </p:cNvSpPr>
+          <p:nvPr>
+            <p:ph type="body" idx="1"/>
+          </p:nvPr>
+        </p:nvSpPr>
+        <p:spPr>
+          <a:xfrm>
+            <a:off x="685800" y="4343400"/>
+            <a:ext cx="5486400" cy="4114800"/>
+          </a:xfrm>
+          <a:prstGeom prst="rect">
+            <a:avLst/>
+          </a:prstGeom>
+        </p:spPr>
+        <p:txBody>
+          <a:bodyPr spcFirstLastPara="1" wrap="square" lIns="91425" tIns="45700" rIns="91425" bIns="45700" anchor="t" anchorCtr="0">
+            <a:noAutofit/>
+          </a:bodyPr>
+          <a:lstStyle/>
+          <a:p>
+            <a:pPr marL="0" lvl="0" indent="0" algn="l" rtl="0">
+              <a:spcBef>
+                <a:spcPts val="0"/>
+              </a:spcBef>
+              <a:spcAft>
+                <a:spcPts val="0"/>
+              </a:spcAft>
+              <a:buNone/>
+            </a:pPr>
+            <a:endParaRPr dirty="0"/>
+          </a:p>
+        </p:txBody>
+      </p:sp>
+      <p:sp>
+        <p:nvSpPr>
+          <p:cNvPr id="96" name="Google Shape;96;g5dba4fbf02_0_32:notes"/>
+          <p:cNvSpPr txBox="1">
+            <a:spLocks noGrp="1"/>
+          </p:cNvSpPr>
+          <p:nvPr>
+            <p:ph type="sldNum" idx="12"/>
+          </p:nvPr>
+        </p:nvSpPr>
+        <p:spPr>
+          <a:xfrm>
+            <a:off x="3884612" y="8685212"/>
+            <a:ext cx="2971800" cy="457200"/>
+          </a:xfrm>
+          <a:prstGeom prst="rect">
+            <a:avLst/>
+          </a:prstGeom>
+        </p:spPr>
+        <p:txBody>
+          <a:bodyPr spcFirstLastPara="1" wrap="square" lIns="91425" tIns="45700" rIns="91425" bIns="45700" anchor="b" anchorCtr="0">
+            <a:noAutofit/>
+          </a:bodyPr>
+          <a:lstStyle/>
+          <a:p>
+            <a:pPr marL="0" lvl="0" indent="0" algn="r" rtl="0">
+              <a:spcBef>
+                <a:spcPts val="0"/>
+              </a:spcBef>
+              <a:spcAft>
+                <a:spcPts val="0"/>
+              </a:spcAft>
+              <a:buClr>
+                <a:srgbClr val="000000"/>
+              </a:buClr>
+              <a:buSzPts val="1200"/>
+              <a:buFont typeface="Arial"/>
+              <a:buNone/>
+            </a:pPr>
+            <a:fld id="{00000000-1234-1234-1234-123412341234}" type="slidenum">
+              <a:rPr lang="en-US"/>
+              <a:t>11</a:t>
+            </a:fld>
+            <a:endParaRPr sz="1400"/>
+          </a:p>
+        </p:txBody>
+      </p:sp>
+    </p:spTree>
+    <p:extLst>
+      <p:ext uri="{BB962C8B-B14F-4D97-AF65-F5344CB8AC3E}">
+        <p14:creationId xmlns:p14="http://schemas.microsoft.com/office/powerpoint/2010/main" val="1941761386"/>
+      </p:ext>
+    </p:extLst>
+  </p:cSld>
+  <p:clrMapOvr>
+    <a:masterClrMapping/>
+  </p:clrMapOvr>
+</p:notes>
+</file>
+
+<file path=ppt/notesSlides/notesSlide12.xml><?xml version="1.0" encoding="utf-8"?>
+<p:notes xmlns:a="http://schemas.openxmlformats.org/drawingml/2006/main" xmlns:r="http://schemas.openxmlformats.org/officeDocument/2006/relationships" xmlns:p="http://schemas.openxmlformats.org/presentationml/2006/main" showMasterSp="0" showMasterPhAnim="0">
+  <p:cSld>
+    <p:spTree>
+      <p:nvGrpSpPr>
+        <p:cNvPr id="1" name="Shape 93"/>
+        <p:cNvGrpSpPr/>
+        <p:nvPr/>
+      </p:nvGrpSpPr>
+      <p:grpSpPr>
+        <a:xfrm>
+          <a:off x="0" y="0"/>
+          <a:ext cx="0" cy="0"/>
+          <a:chOff x="0" y="0"/>
+          <a:chExt cx="0" cy="0"/>
+        </a:xfrm>
+      </p:grpSpPr>
+      <p:sp>
+        <p:nvSpPr>
+          <p:cNvPr id="94" name="Google Shape;94;g5dba4fbf02_0_32:notes"/>
+          <p:cNvSpPr>
+            <a:spLocks noGrp="1" noRot="1" noChangeAspect="1"/>
+          </p:cNvSpPr>
+          <p:nvPr>
+            <p:ph type="sldImg" idx="2"/>
+          </p:nvPr>
+        </p:nvSpPr>
+        <p:spPr>
+          <a:xfrm>
+            <a:off x="1143000" y="685800"/>
+            <a:ext cx="4572000" cy="3429000"/>
+          </a:xfrm>
+          <a:custGeom>
+            <a:avLst/>
+            <a:gdLst/>
+            <a:ahLst/>
+            <a:cxnLst/>
+            <a:rect l="l" t="t" r="r" b="b"/>
+            <a:pathLst>
+              <a:path w="120000" h="120000" extrusionOk="0">
+                <a:moveTo>
+                  <a:pt x="0" y="0"/>
+                </a:moveTo>
+                <a:lnTo>
+                  <a:pt x="120000" y="0"/>
+                </a:lnTo>
+                <a:lnTo>
+                  <a:pt x="120000" y="120000"/>
+                </a:lnTo>
+                <a:lnTo>
+                  <a:pt x="0" y="120000"/>
+                </a:lnTo>
+                <a:close/>
+              </a:path>
+            </a:pathLst>
+          </a:custGeom>
+        </p:spPr>
+      </p:sp>
+      <p:sp>
+        <p:nvSpPr>
+          <p:cNvPr id="95" name="Google Shape;95;g5dba4fbf02_0_32:notes"/>
+          <p:cNvSpPr txBox="1">
+            <a:spLocks noGrp="1"/>
+          </p:cNvSpPr>
+          <p:nvPr>
+            <p:ph type="body" idx="1"/>
+          </p:nvPr>
+        </p:nvSpPr>
+        <p:spPr>
+          <a:xfrm>
+            <a:off x="685800" y="4343400"/>
+            <a:ext cx="5486400" cy="4114800"/>
+          </a:xfrm>
+          <a:prstGeom prst="rect">
+            <a:avLst/>
+          </a:prstGeom>
+        </p:spPr>
+        <p:txBody>
+          <a:bodyPr spcFirstLastPara="1" wrap="square" lIns="91425" tIns="45700" rIns="91425" bIns="45700" anchor="t" anchorCtr="0">
+            <a:noAutofit/>
+          </a:bodyPr>
+          <a:lstStyle/>
+          <a:p>
+            <a:pPr marL="0" lvl="0" indent="0" algn="l" rtl="0">
+              <a:spcBef>
+                <a:spcPts val="0"/>
+              </a:spcBef>
+              <a:spcAft>
+                <a:spcPts val="0"/>
+              </a:spcAft>
+              <a:buNone/>
+            </a:pPr>
+            <a:endParaRPr dirty="0"/>
+          </a:p>
+        </p:txBody>
+      </p:sp>
+      <p:sp>
+        <p:nvSpPr>
+          <p:cNvPr id="96" name="Google Shape;96;g5dba4fbf02_0_32:notes"/>
+          <p:cNvSpPr txBox="1">
+            <a:spLocks noGrp="1"/>
+          </p:cNvSpPr>
+          <p:nvPr>
+            <p:ph type="sldNum" idx="12"/>
+          </p:nvPr>
+        </p:nvSpPr>
+        <p:spPr>
+          <a:xfrm>
+            <a:off x="3884612" y="8685212"/>
+            <a:ext cx="2971800" cy="457200"/>
+          </a:xfrm>
+          <a:prstGeom prst="rect">
+            <a:avLst/>
+          </a:prstGeom>
+        </p:spPr>
+        <p:txBody>
+          <a:bodyPr spcFirstLastPara="1" wrap="square" lIns="91425" tIns="45700" rIns="91425" bIns="45700" anchor="b" anchorCtr="0">
+            <a:noAutofit/>
+          </a:bodyPr>
+          <a:lstStyle/>
+          <a:p>
+            <a:pPr marL="0" lvl="0" indent="0" algn="r" rtl="0">
+              <a:spcBef>
+                <a:spcPts val="0"/>
+              </a:spcBef>
+              <a:spcAft>
+                <a:spcPts val="0"/>
+              </a:spcAft>
+              <a:buClr>
+                <a:srgbClr val="000000"/>
+              </a:buClr>
+              <a:buSzPts val="1200"/>
+              <a:buFont typeface="Arial"/>
+              <a:buNone/>
+            </a:pPr>
+            <a:fld id="{00000000-1234-1234-1234-123412341234}" type="slidenum">
+              <a:rPr lang="en-US"/>
+              <a:t>12</a:t>
+            </a:fld>
+            <a:endParaRPr sz="1400"/>
+          </a:p>
+        </p:txBody>
+      </p:sp>
+    </p:spTree>
+    <p:extLst>
+      <p:ext uri="{BB962C8B-B14F-4D97-AF65-F5344CB8AC3E}">
+        <p14:creationId xmlns:p14="http://schemas.microsoft.com/office/powerpoint/2010/main" val="1997915102"/>
+      </p:ext>
+    </p:extLst>
+  </p:cSld>
+  <p:clrMapOvr>
+    <a:masterClrMapping/>
+  </p:clrMapOvr>
+</p:notes>
+</file>
+
 <file path=ppt/notesSlides/notesSlide2.xml><?xml version="1.0" encoding="utf-8"?>
 <p:notes xmlns:a="http://schemas.openxmlformats.org/drawingml/2006/main" xmlns:r="http://schemas.openxmlformats.org/officeDocument/2006/relationships" xmlns:p="http://schemas.openxmlformats.org/presentationml/2006/main" showMasterSp="0" showMasterPhAnim="0">
   <p:cSld>
@@ -2257,7 +2731,7 @@
     </p:spTree>
     <p:extLst>
       <p:ext uri="{BB962C8B-B14F-4D97-AF65-F5344CB8AC3E}">
-        <p14:creationId xmlns:p14="http://schemas.microsoft.com/office/powerpoint/2010/main" val="1192346568"/>
+        <p14:creationId xmlns:p14="http://schemas.microsoft.com/office/powerpoint/2010/main" val="450311033"/>
       </p:ext>
     </p:extLst>
   </p:cSld>
@@ -2413,7 +2887,475 @@
     </p:spTree>
     <p:extLst>
       <p:ext uri="{BB962C8B-B14F-4D97-AF65-F5344CB8AC3E}">
+        <p14:creationId xmlns:p14="http://schemas.microsoft.com/office/powerpoint/2010/main" val="1192346568"/>
+      </p:ext>
+    </p:extLst>
+  </p:cSld>
+  <p:clrMapOvr>
+    <a:masterClrMapping/>
+  </p:clrMapOvr>
+</p:notes>
+</file>
+
+<file path=ppt/notesSlides/notesSlide7.xml><?xml version="1.0" encoding="utf-8"?>
+<p:notes xmlns:a="http://schemas.openxmlformats.org/drawingml/2006/main" xmlns:r="http://schemas.openxmlformats.org/officeDocument/2006/relationships" xmlns:p="http://schemas.openxmlformats.org/presentationml/2006/main" showMasterSp="0" showMasterPhAnim="0">
+  <p:cSld>
+    <p:spTree>
+      <p:nvGrpSpPr>
+        <p:cNvPr id="1" name="Shape 93"/>
+        <p:cNvGrpSpPr/>
+        <p:nvPr/>
+      </p:nvGrpSpPr>
+      <p:grpSpPr>
+        <a:xfrm>
+          <a:off x="0" y="0"/>
+          <a:ext cx="0" cy="0"/>
+          <a:chOff x="0" y="0"/>
+          <a:chExt cx="0" cy="0"/>
+        </a:xfrm>
+      </p:grpSpPr>
+      <p:sp>
+        <p:nvSpPr>
+          <p:cNvPr id="94" name="Google Shape;94;g5dba4fbf02_0_32:notes"/>
+          <p:cNvSpPr>
+            <a:spLocks noGrp="1" noRot="1" noChangeAspect="1"/>
+          </p:cNvSpPr>
+          <p:nvPr>
+            <p:ph type="sldImg" idx="2"/>
+          </p:nvPr>
+        </p:nvSpPr>
+        <p:spPr>
+          <a:xfrm>
+            <a:off x="1143000" y="685800"/>
+            <a:ext cx="4572000" cy="3429000"/>
+          </a:xfrm>
+          <a:custGeom>
+            <a:avLst/>
+            <a:gdLst/>
+            <a:ahLst/>
+            <a:cxnLst/>
+            <a:rect l="l" t="t" r="r" b="b"/>
+            <a:pathLst>
+              <a:path w="120000" h="120000" extrusionOk="0">
+                <a:moveTo>
+                  <a:pt x="0" y="0"/>
+                </a:moveTo>
+                <a:lnTo>
+                  <a:pt x="120000" y="0"/>
+                </a:lnTo>
+                <a:lnTo>
+                  <a:pt x="120000" y="120000"/>
+                </a:lnTo>
+                <a:lnTo>
+                  <a:pt x="0" y="120000"/>
+                </a:lnTo>
+                <a:close/>
+              </a:path>
+            </a:pathLst>
+          </a:custGeom>
+        </p:spPr>
+      </p:sp>
+      <p:sp>
+        <p:nvSpPr>
+          <p:cNvPr id="95" name="Google Shape;95;g5dba4fbf02_0_32:notes"/>
+          <p:cNvSpPr txBox="1">
+            <a:spLocks noGrp="1"/>
+          </p:cNvSpPr>
+          <p:nvPr>
+            <p:ph type="body" idx="1"/>
+          </p:nvPr>
+        </p:nvSpPr>
+        <p:spPr>
+          <a:xfrm>
+            <a:off x="685800" y="4343400"/>
+            <a:ext cx="5486400" cy="4114800"/>
+          </a:xfrm>
+          <a:prstGeom prst="rect">
+            <a:avLst/>
+          </a:prstGeom>
+        </p:spPr>
+        <p:txBody>
+          <a:bodyPr spcFirstLastPara="1" wrap="square" lIns="91425" tIns="45700" rIns="91425" bIns="45700" anchor="t" anchorCtr="0">
+            <a:noAutofit/>
+          </a:bodyPr>
+          <a:lstStyle/>
+          <a:p>
+            <a:pPr marL="0" lvl="0" indent="0" algn="l" rtl="0">
+              <a:spcBef>
+                <a:spcPts val="0"/>
+              </a:spcBef>
+              <a:spcAft>
+                <a:spcPts val="0"/>
+              </a:spcAft>
+              <a:buNone/>
+            </a:pPr>
+            <a:endParaRPr dirty="0"/>
+          </a:p>
+        </p:txBody>
+      </p:sp>
+      <p:sp>
+        <p:nvSpPr>
+          <p:cNvPr id="96" name="Google Shape;96;g5dba4fbf02_0_32:notes"/>
+          <p:cNvSpPr txBox="1">
+            <a:spLocks noGrp="1"/>
+          </p:cNvSpPr>
+          <p:nvPr>
+            <p:ph type="sldNum" idx="12"/>
+          </p:nvPr>
+        </p:nvSpPr>
+        <p:spPr>
+          <a:xfrm>
+            <a:off x="3884612" y="8685212"/>
+            <a:ext cx="2971800" cy="457200"/>
+          </a:xfrm>
+          <a:prstGeom prst="rect">
+            <a:avLst/>
+          </a:prstGeom>
+        </p:spPr>
+        <p:txBody>
+          <a:bodyPr spcFirstLastPara="1" wrap="square" lIns="91425" tIns="45700" rIns="91425" bIns="45700" anchor="b" anchorCtr="0">
+            <a:noAutofit/>
+          </a:bodyPr>
+          <a:lstStyle/>
+          <a:p>
+            <a:pPr marL="0" lvl="0" indent="0" algn="r" rtl="0">
+              <a:spcBef>
+                <a:spcPts val="0"/>
+              </a:spcBef>
+              <a:spcAft>
+                <a:spcPts val="0"/>
+              </a:spcAft>
+              <a:buClr>
+                <a:srgbClr val="000000"/>
+              </a:buClr>
+              <a:buSzPts val="1200"/>
+              <a:buFont typeface="Arial"/>
+              <a:buNone/>
+            </a:pPr>
+            <a:fld id="{00000000-1234-1234-1234-123412341234}" type="slidenum">
+              <a:rPr lang="en-US"/>
+              <a:t>7</a:t>
+            </a:fld>
+            <a:endParaRPr sz="1400"/>
+          </a:p>
+        </p:txBody>
+      </p:sp>
+    </p:spTree>
+    <p:extLst>
+      <p:ext uri="{BB962C8B-B14F-4D97-AF65-F5344CB8AC3E}">
+        <p14:creationId xmlns:p14="http://schemas.microsoft.com/office/powerpoint/2010/main" val="2270867041"/>
+      </p:ext>
+    </p:extLst>
+  </p:cSld>
+  <p:clrMapOvr>
+    <a:masterClrMapping/>
+  </p:clrMapOvr>
+</p:notes>
+</file>
+
+<file path=ppt/notesSlides/notesSlide8.xml><?xml version="1.0" encoding="utf-8"?>
+<p:notes xmlns:a="http://schemas.openxmlformats.org/drawingml/2006/main" xmlns:r="http://schemas.openxmlformats.org/officeDocument/2006/relationships" xmlns:p="http://schemas.openxmlformats.org/presentationml/2006/main" showMasterSp="0" showMasterPhAnim="0">
+  <p:cSld>
+    <p:spTree>
+      <p:nvGrpSpPr>
+        <p:cNvPr id="1" name="Shape 93"/>
+        <p:cNvGrpSpPr/>
+        <p:nvPr/>
+      </p:nvGrpSpPr>
+      <p:grpSpPr>
+        <a:xfrm>
+          <a:off x="0" y="0"/>
+          <a:ext cx="0" cy="0"/>
+          <a:chOff x="0" y="0"/>
+          <a:chExt cx="0" cy="0"/>
+        </a:xfrm>
+      </p:grpSpPr>
+      <p:sp>
+        <p:nvSpPr>
+          <p:cNvPr id="94" name="Google Shape;94;g5dba4fbf02_0_32:notes"/>
+          <p:cNvSpPr>
+            <a:spLocks noGrp="1" noRot="1" noChangeAspect="1"/>
+          </p:cNvSpPr>
+          <p:nvPr>
+            <p:ph type="sldImg" idx="2"/>
+          </p:nvPr>
+        </p:nvSpPr>
+        <p:spPr>
+          <a:xfrm>
+            <a:off x="1143000" y="685800"/>
+            <a:ext cx="4572000" cy="3429000"/>
+          </a:xfrm>
+          <a:custGeom>
+            <a:avLst/>
+            <a:gdLst/>
+            <a:ahLst/>
+            <a:cxnLst/>
+            <a:rect l="l" t="t" r="r" b="b"/>
+            <a:pathLst>
+              <a:path w="120000" h="120000" extrusionOk="0">
+                <a:moveTo>
+                  <a:pt x="0" y="0"/>
+                </a:moveTo>
+                <a:lnTo>
+                  <a:pt x="120000" y="0"/>
+                </a:lnTo>
+                <a:lnTo>
+                  <a:pt x="120000" y="120000"/>
+                </a:lnTo>
+                <a:lnTo>
+                  <a:pt x="0" y="120000"/>
+                </a:lnTo>
+                <a:close/>
+              </a:path>
+            </a:pathLst>
+          </a:custGeom>
+        </p:spPr>
+      </p:sp>
+      <p:sp>
+        <p:nvSpPr>
+          <p:cNvPr id="95" name="Google Shape;95;g5dba4fbf02_0_32:notes"/>
+          <p:cNvSpPr txBox="1">
+            <a:spLocks noGrp="1"/>
+          </p:cNvSpPr>
+          <p:nvPr>
+            <p:ph type="body" idx="1"/>
+          </p:nvPr>
+        </p:nvSpPr>
+        <p:spPr>
+          <a:xfrm>
+            <a:off x="685800" y="4343400"/>
+            <a:ext cx="5486400" cy="4114800"/>
+          </a:xfrm>
+          <a:prstGeom prst="rect">
+            <a:avLst/>
+          </a:prstGeom>
+        </p:spPr>
+        <p:txBody>
+          <a:bodyPr spcFirstLastPara="1" wrap="square" lIns="91425" tIns="45700" rIns="91425" bIns="45700" anchor="t" anchorCtr="0">
+            <a:noAutofit/>
+          </a:bodyPr>
+          <a:lstStyle/>
+          <a:p>
+            <a:pPr marL="0" lvl="0" indent="0" algn="l" rtl="0">
+              <a:spcBef>
+                <a:spcPts val="0"/>
+              </a:spcBef>
+              <a:spcAft>
+                <a:spcPts val="0"/>
+              </a:spcAft>
+              <a:buNone/>
+            </a:pPr>
+            <a:endParaRPr dirty="0"/>
+          </a:p>
+        </p:txBody>
+      </p:sp>
+      <p:sp>
+        <p:nvSpPr>
+          <p:cNvPr id="96" name="Google Shape;96;g5dba4fbf02_0_32:notes"/>
+          <p:cNvSpPr txBox="1">
+            <a:spLocks noGrp="1"/>
+          </p:cNvSpPr>
+          <p:nvPr>
+            <p:ph type="sldNum" idx="12"/>
+          </p:nvPr>
+        </p:nvSpPr>
+        <p:spPr>
+          <a:xfrm>
+            <a:off x="3884612" y="8685212"/>
+            <a:ext cx="2971800" cy="457200"/>
+          </a:xfrm>
+          <a:prstGeom prst="rect">
+            <a:avLst/>
+          </a:prstGeom>
+        </p:spPr>
+        <p:txBody>
+          <a:bodyPr spcFirstLastPara="1" wrap="square" lIns="91425" tIns="45700" rIns="91425" bIns="45700" anchor="b" anchorCtr="0">
+            <a:noAutofit/>
+          </a:bodyPr>
+          <a:lstStyle/>
+          <a:p>
+            <a:pPr marL="0" lvl="0" indent="0" algn="r" rtl="0">
+              <a:spcBef>
+                <a:spcPts val="0"/>
+              </a:spcBef>
+              <a:spcAft>
+                <a:spcPts val="0"/>
+              </a:spcAft>
+              <a:buClr>
+                <a:srgbClr val="000000"/>
+              </a:buClr>
+              <a:buSzPts val="1200"/>
+              <a:buFont typeface="Arial"/>
+              <a:buNone/>
+            </a:pPr>
+            <a:fld id="{00000000-1234-1234-1234-123412341234}" type="slidenum">
+              <a:rPr lang="en-US"/>
+              <a:t>8</a:t>
+            </a:fld>
+            <a:endParaRPr sz="1400"/>
+          </a:p>
+        </p:txBody>
+      </p:sp>
+    </p:spTree>
+    <p:extLst>
+      <p:ext uri="{BB962C8B-B14F-4D97-AF65-F5344CB8AC3E}">
         <p14:creationId xmlns:p14="http://schemas.microsoft.com/office/powerpoint/2010/main" val="3323519279"/>
+      </p:ext>
+    </p:extLst>
+  </p:cSld>
+  <p:clrMapOvr>
+    <a:masterClrMapping/>
+  </p:clrMapOvr>
+</p:notes>
+</file>
+
+<file path=ppt/notesSlides/notesSlide9.xml><?xml version="1.0" encoding="utf-8"?>
+<p:notes xmlns:a="http://schemas.openxmlformats.org/drawingml/2006/main" xmlns:r="http://schemas.openxmlformats.org/officeDocument/2006/relationships" xmlns:p="http://schemas.openxmlformats.org/presentationml/2006/main" showMasterSp="0" showMasterPhAnim="0">
+  <p:cSld>
+    <p:spTree>
+      <p:nvGrpSpPr>
+        <p:cNvPr id="1" name="Shape 93"/>
+        <p:cNvGrpSpPr/>
+        <p:nvPr/>
+      </p:nvGrpSpPr>
+      <p:grpSpPr>
+        <a:xfrm>
+          <a:off x="0" y="0"/>
+          <a:ext cx="0" cy="0"/>
+          <a:chOff x="0" y="0"/>
+          <a:chExt cx="0" cy="0"/>
+        </a:xfrm>
+      </p:grpSpPr>
+      <p:sp>
+        <p:nvSpPr>
+          <p:cNvPr id="94" name="Google Shape;94;g5dba4fbf02_0_32:notes"/>
+          <p:cNvSpPr>
+            <a:spLocks noGrp="1" noRot="1" noChangeAspect="1"/>
+          </p:cNvSpPr>
+          <p:nvPr>
+            <p:ph type="sldImg" idx="2"/>
+          </p:nvPr>
+        </p:nvSpPr>
+        <p:spPr>
+          <a:xfrm>
+            <a:off x="1143000" y="685800"/>
+            <a:ext cx="4572000" cy="3429000"/>
+          </a:xfrm>
+          <a:custGeom>
+            <a:avLst/>
+            <a:gdLst/>
+            <a:ahLst/>
+            <a:cxnLst/>
+            <a:rect l="l" t="t" r="r" b="b"/>
+            <a:pathLst>
+              <a:path w="120000" h="120000" extrusionOk="0">
+                <a:moveTo>
+                  <a:pt x="0" y="0"/>
+                </a:moveTo>
+                <a:lnTo>
+                  <a:pt x="120000" y="0"/>
+                </a:lnTo>
+                <a:lnTo>
+                  <a:pt x="120000" y="120000"/>
+                </a:lnTo>
+                <a:lnTo>
+                  <a:pt x="0" y="120000"/>
+                </a:lnTo>
+                <a:close/>
+              </a:path>
+            </a:pathLst>
+          </a:custGeom>
+        </p:spPr>
+      </p:sp>
+      <p:sp>
+        <p:nvSpPr>
+          <p:cNvPr id="95" name="Google Shape;95;g5dba4fbf02_0_32:notes"/>
+          <p:cNvSpPr txBox="1">
+            <a:spLocks noGrp="1"/>
+          </p:cNvSpPr>
+          <p:nvPr>
+            <p:ph type="body" idx="1"/>
+          </p:nvPr>
+        </p:nvSpPr>
+        <p:spPr>
+          <a:xfrm>
+            <a:off x="685800" y="4343400"/>
+            <a:ext cx="5486400" cy="4114800"/>
+          </a:xfrm>
+          <a:prstGeom prst="rect">
+            <a:avLst/>
+          </a:prstGeom>
+        </p:spPr>
+        <p:txBody>
+          <a:bodyPr spcFirstLastPara="1" wrap="square" lIns="91425" tIns="45700" rIns="91425" bIns="45700" anchor="t" anchorCtr="0">
+            <a:noAutofit/>
+          </a:bodyPr>
+          <a:lstStyle/>
+          <a:p>
+            <a:pPr marL="0" lvl="0" indent="0" algn="l" rtl="0">
+              <a:spcBef>
+                <a:spcPts val="0"/>
+              </a:spcBef>
+              <a:spcAft>
+                <a:spcPts val="0"/>
+              </a:spcAft>
+              <a:buNone/>
+            </a:pPr>
+            <a:endParaRPr dirty="0"/>
+          </a:p>
+        </p:txBody>
+      </p:sp>
+      <p:sp>
+        <p:nvSpPr>
+          <p:cNvPr id="96" name="Google Shape;96;g5dba4fbf02_0_32:notes"/>
+          <p:cNvSpPr txBox="1">
+            <a:spLocks noGrp="1"/>
+          </p:cNvSpPr>
+          <p:nvPr>
+            <p:ph type="sldNum" idx="12"/>
+          </p:nvPr>
+        </p:nvSpPr>
+        <p:spPr>
+          <a:xfrm>
+            <a:off x="3884612" y="8685212"/>
+            <a:ext cx="2971800" cy="457200"/>
+          </a:xfrm>
+          <a:prstGeom prst="rect">
+            <a:avLst/>
+          </a:prstGeom>
+        </p:spPr>
+        <p:txBody>
+          <a:bodyPr spcFirstLastPara="1" wrap="square" lIns="91425" tIns="45700" rIns="91425" bIns="45700" anchor="b" anchorCtr="0">
+            <a:noAutofit/>
+          </a:bodyPr>
+          <a:lstStyle/>
+          <a:p>
+            <a:pPr marL="0" lvl="0" indent="0" algn="r" rtl="0">
+              <a:spcBef>
+                <a:spcPts val="0"/>
+              </a:spcBef>
+              <a:spcAft>
+                <a:spcPts val="0"/>
+              </a:spcAft>
+              <a:buClr>
+                <a:srgbClr val="000000"/>
+              </a:buClr>
+              <a:buSzPts val="1200"/>
+              <a:buFont typeface="Arial"/>
+              <a:buNone/>
+            </a:pPr>
+            <a:fld id="{00000000-1234-1234-1234-123412341234}" type="slidenum">
+              <a:rPr lang="en-US"/>
+              <a:t>9</a:t>
+            </a:fld>
+            <a:endParaRPr sz="1400"/>
+          </a:p>
+        </p:txBody>
+      </p:sp>
+    </p:spTree>
+    <p:extLst>
+      <p:ext uri="{BB962C8B-B14F-4D97-AF65-F5344CB8AC3E}">
+        <p14:creationId xmlns:p14="http://schemas.microsoft.com/office/powerpoint/2010/main" val="2198404689"/>
       </p:ext>
     </p:extLst>
   </p:cSld>
@@ -15447,6 +16389,1848 @@
 </p:sld>
 </file>
 
+<file path=ppt/slides/slide10.xml><?xml version="1.0" encoding="utf-8"?>
+<p:sld xmlns:a="http://schemas.openxmlformats.org/drawingml/2006/main" xmlns:r="http://schemas.openxmlformats.org/officeDocument/2006/relationships" xmlns:p="http://schemas.openxmlformats.org/presentationml/2006/main">
+  <p:cSld>
+    <p:bg>
+      <p:bgPr>
+        <a:solidFill>
+          <a:srgbClr val="54416B"/>
+        </a:solidFill>
+        <a:effectLst/>
+      </p:bgPr>
+    </p:bg>
+    <p:spTree>
+      <p:nvGrpSpPr>
+        <p:cNvPr id="1" name="Shape 97"/>
+        <p:cNvGrpSpPr/>
+        <p:nvPr/>
+      </p:nvGrpSpPr>
+      <p:grpSpPr>
+        <a:xfrm>
+          <a:off x="0" y="0"/>
+          <a:ext cx="0" cy="0"/>
+          <a:chOff x="0" y="0"/>
+          <a:chExt cx="0" cy="0"/>
+        </a:xfrm>
+      </p:grpSpPr>
+      <p:pic>
+        <p:nvPicPr>
+          <p:cNvPr id="7" name="Imagem 6">
+            <a:extLst>
+              <a:ext uri="{FF2B5EF4-FFF2-40B4-BE49-F238E27FC236}">
+                <a16:creationId xmlns:a16="http://schemas.microsoft.com/office/drawing/2014/main" id="{D6C112AC-0AED-409F-A046-42B8C81D7BFA}"/>
+              </a:ext>
+            </a:extLst>
+          </p:cNvPr>
+          <p:cNvPicPr>
+            <a:picLocks noChangeAspect="1"/>
+          </p:cNvPicPr>
+          <p:nvPr/>
+        </p:nvPicPr>
+        <p:blipFill>
+          <a:blip r:embed="rId3"/>
+          <a:stretch>
+            <a:fillRect/>
+          </a:stretch>
+        </p:blipFill>
+        <p:spPr>
+          <a:xfrm>
+            <a:off x="632061" y="174580"/>
+            <a:ext cx="746574" cy="358356"/>
+          </a:xfrm>
+          <a:prstGeom prst="rect">
+            <a:avLst/>
+          </a:prstGeom>
+        </p:spPr>
+      </p:pic>
+      <p:sp>
+        <p:nvSpPr>
+          <p:cNvPr id="12" name="Retângulo 11">
+            <a:extLst>
+              <a:ext uri="{FF2B5EF4-FFF2-40B4-BE49-F238E27FC236}">
+                <a16:creationId xmlns:a16="http://schemas.microsoft.com/office/drawing/2014/main" id="{271F94DF-0C4F-4EC5-8956-4969FA418718}"/>
+              </a:ext>
+            </a:extLst>
+          </p:cNvPr>
+          <p:cNvSpPr/>
+          <p:nvPr/>
+        </p:nvSpPr>
+        <p:spPr>
+          <a:xfrm>
+            <a:off x="0" y="0"/>
+            <a:ext cx="450166" cy="6858000"/>
+          </a:xfrm>
+          <a:prstGeom prst="rect">
+            <a:avLst/>
+          </a:prstGeom>
+          <a:gradFill>
+            <a:gsLst>
+              <a:gs pos="0">
+                <a:schemeClr val="accent1">
+                  <a:lumMod val="5000"/>
+                  <a:lumOff val="95000"/>
+                </a:schemeClr>
+              </a:gs>
+              <a:gs pos="100000">
+                <a:srgbClr val="54416B"/>
+              </a:gs>
+            </a:gsLst>
+            <a:path path="circle">
+              <a:fillToRect l="100000" t="100000"/>
+            </a:path>
+          </a:gradFill>
+          <a:ln>
+            <a:noFill/>
+          </a:ln>
+        </p:spPr>
+        <p:style>
+          <a:lnRef idx="2">
+            <a:schemeClr val="accent1">
+              <a:shade val="50000"/>
+            </a:schemeClr>
+          </a:lnRef>
+          <a:fillRef idx="1">
+            <a:schemeClr val="accent1"/>
+          </a:fillRef>
+          <a:effectRef idx="0">
+            <a:schemeClr val="accent1"/>
+          </a:effectRef>
+          <a:fontRef idx="minor">
+            <a:schemeClr val="lt1"/>
+          </a:fontRef>
+        </p:style>
+        <p:txBody>
+          <a:bodyPr rtlCol="0" anchor="ctr"/>
+          <a:lstStyle/>
+          <a:p>
+            <a:pPr algn="ctr"/>
+            <a:endParaRPr lang="pt-BR"/>
+          </a:p>
+        </p:txBody>
+      </p:sp>
+      <p:pic>
+        <p:nvPicPr>
+          <p:cNvPr id="13" name="Imagem 12">
+            <a:extLst>
+              <a:ext uri="{FF2B5EF4-FFF2-40B4-BE49-F238E27FC236}">
+                <a16:creationId xmlns:a16="http://schemas.microsoft.com/office/drawing/2014/main" id="{445294E5-3ADA-46DE-9D79-9BCEAAF12DBB}"/>
+              </a:ext>
+            </a:extLst>
+          </p:cNvPr>
+          <p:cNvPicPr>
+            <a:picLocks noChangeAspect="1"/>
+          </p:cNvPicPr>
+          <p:nvPr/>
+        </p:nvPicPr>
+        <p:blipFill>
+          <a:blip r:embed="rId3"/>
+          <a:stretch>
+            <a:fillRect/>
+          </a:stretch>
+        </p:blipFill>
+        <p:spPr>
+          <a:xfrm rot="16200000">
+            <a:off x="-148204" y="6213725"/>
+            <a:ext cx="746574" cy="358356"/>
+          </a:xfrm>
+          <a:prstGeom prst="rect">
+            <a:avLst/>
+          </a:prstGeom>
+        </p:spPr>
+      </p:pic>
+      <p:sp>
+        <p:nvSpPr>
+          <p:cNvPr id="14" name="CaixaDeTexto 13">
+            <a:extLst>
+              <a:ext uri="{FF2B5EF4-FFF2-40B4-BE49-F238E27FC236}">
+                <a16:creationId xmlns:a16="http://schemas.microsoft.com/office/drawing/2014/main" id="{F0069CE5-7C5D-4662-AABB-EB02AB282D94}"/>
+              </a:ext>
+            </a:extLst>
+          </p:cNvPr>
+          <p:cNvSpPr txBox="1"/>
+          <p:nvPr/>
+        </p:nvSpPr>
+        <p:spPr>
+          <a:xfrm rot="16200000">
+            <a:off x="-2323823" y="3225011"/>
+            <a:ext cx="5097813" cy="307777"/>
+          </a:xfrm>
+          <a:prstGeom prst="rect">
+            <a:avLst/>
+          </a:prstGeom>
+          <a:noFill/>
+        </p:spPr>
+        <p:txBody>
+          <a:bodyPr wrap="square" rtlCol="0">
+            <a:spAutoFit/>
+          </a:bodyPr>
+          <a:lstStyle/>
+          <a:p>
+            <a:r>
+              <a:rPr lang="pt-BR" dirty="0">
+                <a:latin typeface="Calibri" panose="020F0502020204030204" pitchFamily="34" charset="0"/>
+                <a:cs typeface="Calibri" panose="020F0502020204030204" pitchFamily="34" charset="0"/>
+              </a:rPr>
+              <a:t>FAI - Centro de Ensino Superior em Gestão, Tecnologia e Educação</a:t>
+            </a:r>
+          </a:p>
+        </p:txBody>
+      </p:sp>
+      <p:cxnSp>
+        <p:nvCxnSpPr>
+          <p:cNvPr id="16" name="Conector reto 15">
+            <a:extLst>
+              <a:ext uri="{FF2B5EF4-FFF2-40B4-BE49-F238E27FC236}">
+                <a16:creationId xmlns:a16="http://schemas.microsoft.com/office/drawing/2014/main" id="{6116879A-0ED7-47C5-A7F1-3BE9B9E35DD5}"/>
+              </a:ext>
+            </a:extLst>
+          </p:cNvPr>
+          <p:cNvCxnSpPr>
+            <a:cxnSpLocks/>
+          </p:cNvCxnSpPr>
+          <p:nvPr/>
+        </p:nvCxnSpPr>
+        <p:spPr>
+          <a:xfrm>
+            <a:off x="632061" y="633045"/>
+            <a:ext cx="8258721" cy="0"/>
+          </a:xfrm>
+          <a:prstGeom prst="line">
+            <a:avLst/>
+          </a:prstGeom>
+          <a:ln>
+            <a:gradFill flip="none" rotWithShape="1">
+              <a:gsLst>
+                <a:gs pos="0">
+                  <a:schemeClr val="accent3">
+                    <a:lumMod val="75000"/>
+                  </a:schemeClr>
+                </a:gs>
+                <a:gs pos="100000">
+                  <a:srgbClr val="4F6228"/>
+                </a:gs>
+              </a:gsLst>
+              <a:lin ang="0" scaled="1"/>
+              <a:tileRect/>
+            </a:gradFill>
+          </a:ln>
+        </p:spPr>
+        <p:style>
+          <a:lnRef idx="1">
+            <a:schemeClr val="accent1"/>
+          </a:lnRef>
+          <a:fillRef idx="0">
+            <a:schemeClr val="accent1"/>
+          </a:fillRef>
+          <a:effectRef idx="0">
+            <a:schemeClr val="accent1"/>
+          </a:effectRef>
+          <a:fontRef idx="minor">
+            <a:schemeClr val="tx1"/>
+          </a:fontRef>
+        </p:style>
+      </p:cxnSp>
+      <p:sp>
+        <p:nvSpPr>
+          <p:cNvPr id="9" name="CaixaDeTexto 8">
+            <a:extLst>
+              <a:ext uri="{FF2B5EF4-FFF2-40B4-BE49-F238E27FC236}">
+                <a16:creationId xmlns:a16="http://schemas.microsoft.com/office/drawing/2014/main" id="{E21B1250-A8A1-4771-8929-41EC66F5748E}"/>
+              </a:ext>
+            </a:extLst>
+          </p:cNvPr>
+          <p:cNvSpPr txBox="1"/>
+          <p:nvPr/>
+        </p:nvSpPr>
+        <p:spPr>
+          <a:xfrm>
+            <a:off x="1195262" y="1947738"/>
+            <a:ext cx="7132318" cy="2862322"/>
+          </a:xfrm>
+          <a:prstGeom prst="rect">
+            <a:avLst/>
+          </a:prstGeom>
+          <a:noFill/>
+        </p:spPr>
+        <p:txBody>
+          <a:bodyPr wrap="square" rtlCol="0">
+            <a:spAutoFit/>
+          </a:bodyPr>
+          <a:lstStyle/>
+          <a:p>
+            <a:pPr algn="just"/>
+            <a:r>
+              <a:rPr lang="pt-BR" sz="1800" dirty="0">
+                <a:solidFill>
+                  <a:schemeClr val="bg1">
+                    <a:lumMod val="85000"/>
+                  </a:schemeClr>
+                </a:solidFill>
+                <a:latin typeface="Verdana" panose="020B0604030504040204" pitchFamily="34" charset="0"/>
+                <a:ea typeface="Verdana" panose="020B0604030504040204" pitchFamily="34" charset="0"/>
+                <a:cs typeface="Calibri" panose="020F0502020204030204" pitchFamily="34" charset="0"/>
+              </a:rPr>
+              <a:t>O padrão Data Access </a:t>
+            </a:r>
+            <a:r>
+              <a:rPr lang="pt-BR" sz="1800" dirty="0" err="1">
+                <a:solidFill>
+                  <a:schemeClr val="bg1">
+                    <a:lumMod val="85000"/>
+                  </a:schemeClr>
+                </a:solidFill>
+                <a:latin typeface="Verdana" panose="020B0604030504040204" pitchFamily="34" charset="0"/>
+                <a:ea typeface="Verdana" panose="020B0604030504040204" pitchFamily="34" charset="0"/>
+                <a:cs typeface="Calibri" panose="020F0502020204030204" pitchFamily="34" charset="0"/>
+              </a:rPr>
+              <a:t>Object</a:t>
+            </a:r>
+            <a:r>
+              <a:rPr lang="pt-BR" sz="1800" dirty="0">
+                <a:solidFill>
+                  <a:schemeClr val="bg1">
+                    <a:lumMod val="85000"/>
+                  </a:schemeClr>
+                </a:solidFill>
+                <a:latin typeface="Verdana" panose="020B0604030504040204" pitchFamily="34" charset="0"/>
+                <a:ea typeface="Verdana" panose="020B0604030504040204" pitchFamily="34" charset="0"/>
+                <a:cs typeface="Calibri" panose="020F0502020204030204" pitchFamily="34" charset="0"/>
+              </a:rPr>
+              <a:t> (DAO) é um padrão estrutural que nos permite isolar a camada de modelo da camada de persistência, normalmente um banco de dados relacional.</a:t>
+            </a:r>
+          </a:p>
+          <a:p>
+            <a:pPr algn="just"/>
+            <a:endParaRPr lang="pt-BR" sz="1800" dirty="0">
+              <a:solidFill>
+                <a:schemeClr val="bg1">
+                  <a:lumMod val="85000"/>
+                </a:schemeClr>
+              </a:solidFill>
+              <a:latin typeface="Verdana" panose="020B0604030504040204" pitchFamily="34" charset="0"/>
+              <a:ea typeface="Verdana" panose="020B0604030504040204" pitchFamily="34" charset="0"/>
+              <a:cs typeface="Calibri" panose="020F0502020204030204" pitchFamily="34" charset="0"/>
+            </a:endParaRPr>
+          </a:p>
+          <a:p>
+            <a:pPr algn="just"/>
+            <a:r>
+              <a:rPr lang="pt-BR" sz="1800" dirty="0">
+                <a:solidFill>
+                  <a:schemeClr val="bg1">
+                    <a:lumMod val="85000"/>
+                  </a:schemeClr>
+                </a:solidFill>
+                <a:latin typeface="Verdana" panose="020B0604030504040204" pitchFamily="34" charset="0"/>
+                <a:ea typeface="Verdana" panose="020B0604030504040204" pitchFamily="34" charset="0"/>
+                <a:cs typeface="Calibri" panose="020F0502020204030204" pitchFamily="34" charset="0"/>
+              </a:rPr>
+              <a:t>A sua principal  função é ocultar da camada de modelo toda a complexidade envolvida na execução de operações do tipo CRUD.</a:t>
+            </a:r>
+          </a:p>
+          <a:p>
+            <a:pPr algn="just"/>
+            <a:endParaRPr lang="pt-BR" sz="1800" dirty="0">
+              <a:solidFill>
+                <a:schemeClr val="bg1">
+                  <a:lumMod val="85000"/>
+                </a:schemeClr>
+              </a:solidFill>
+              <a:latin typeface="Verdana" panose="020B0604030504040204" pitchFamily="34" charset="0"/>
+              <a:ea typeface="Verdana" panose="020B0604030504040204" pitchFamily="34" charset="0"/>
+              <a:cs typeface="Calibri" panose="020F0502020204030204" pitchFamily="34" charset="0"/>
+            </a:endParaRPr>
+          </a:p>
+          <a:p>
+            <a:pPr algn="just"/>
+            <a:r>
+              <a:rPr lang="pt-BR" sz="1800" dirty="0">
+                <a:solidFill>
+                  <a:schemeClr val="bg1">
+                    <a:lumMod val="85000"/>
+                  </a:schemeClr>
+                </a:solidFill>
+                <a:latin typeface="Verdana" panose="020B0604030504040204" pitchFamily="34" charset="0"/>
+                <a:ea typeface="Verdana" panose="020B0604030504040204" pitchFamily="34" charset="0"/>
+                <a:cs typeface="Calibri" panose="020F0502020204030204" pitchFamily="34" charset="0"/>
+              </a:rPr>
+              <a:t>Isso permite que as duas camadas evoluam separadamente sem saber nada uma da outra.</a:t>
+            </a:r>
+          </a:p>
+        </p:txBody>
+      </p:sp>
+    </p:spTree>
+    <p:extLst>
+      <p:ext uri="{BB962C8B-B14F-4D97-AF65-F5344CB8AC3E}">
+        <p14:creationId xmlns:p14="http://schemas.microsoft.com/office/powerpoint/2010/main" val="829373984"/>
+      </p:ext>
+    </p:extLst>
+  </p:cSld>
+  <p:clrMapOvr>
+    <a:masterClrMapping/>
+  </p:clrMapOvr>
+</p:sld>
+</file>
+
+<file path=ppt/slides/slide11.xml><?xml version="1.0" encoding="utf-8"?>
+<p:sld xmlns:a="http://schemas.openxmlformats.org/drawingml/2006/main" xmlns:r="http://schemas.openxmlformats.org/officeDocument/2006/relationships" xmlns:p="http://schemas.openxmlformats.org/presentationml/2006/main">
+  <p:cSld>
+    <p:bg>
+      <p:bgPr>
+        <a:solidFill>
+          <a:srgbClr val="54416B"/>
+        </a:solidFill>
+        <a:effectLst/>
+      </p:bgPr>
+    </p:bg>
+    <p:spTree>
+      <p:nvGrpSpPr>
+        <p:cNvPr id="1" name="Shape 97"/>
+        <p:cNvGrpSpPr/>
+        <p:nvPr/>
+      </p:nvGrpSpPr>
+      <p:grpSpPr>
+        <a:xfrm>
+          <a:off x="0" y="0"/>
+          <a:ext cx="0" cy="0"/>
+          <a:chOff x="0" y="0"/>
+          <a:chExt cx="0" cy="0"/>
+        </a:xfrm>
+      </p:grpSpPr>
+      <p:pic>
+        <p:nvPicPr>
+          <p:cNvPr id="7" name="Imagem 6">
+            <a:extLst>
+              <a:ext uri="{FF2B5EF4-FFF2-40B4-BE49-F238E27FC236}">
+                <a16:creationId xmlns:a16="http://schemas.microsoft.com/office/drawing/2014/main" id="{D6C112AC-0AED-409F-A046-42B8C81D7BFA}"/>
+              </a:ext>
+            </a:extLst>
+          </p:cNvPr>
+          <p:cNvPicPr>
+            <a:picLocks noChangeAspect="1"/>
+          </p:cNvPicPr>
+          <p:nvPr/>
+        </p:nvPicPr>
+        <p:blipFill>
+          <a:blip r:embed="rId3"/>
+          <a:stretch>
+            <a:fillRect/>
+          </a:stretch>
+        </p:blipFill>
+        <p:spPr>
+          <a:xfrm>
+            <a:off x="632061" y="174580"/>
+            <a:ext cx="746574" cy="358356"/>
+          </a:xfrm>
+          <a:prstGeom prst="rect">
+            <a:avLst/>
+          </a:prstGeom>
+        </p:spPr>
+      </p:pic>
+      <p:sp>
+        <p:nvSpPr>
+          <p:cNvPr id="12" name="Retângulo 11">
+            <a:extLst>
+              <a:ext uri="{FF2B5EF4-FFF2-40B4-BE49-F238E27FC236}">
+                <a16:creationId xmlns:a16="http://schemas.microsoft.com/office/drawing/2014/main" id="{271F94DF-0C4F-4EC5-8956-4969FA418718}"/>
+              </a:ext>
+            </a:extLst>
+          </p:cNvPr>
+          <p:cNvSpPr/>
+          <p:nvPr/>
+        </p:nvSpPr>
+        <p:spPr>
+          <a:xfrm>
+            <a:off x="0" y="0"/>
+            <a:ext cx="450166" cy="6858000"/>
+          </a:xfrm>
+          <a:prstGeom prst="rect">
+            <a:avLst/>
+          </a:prstGeom>
+          <a:gradFill>
+            <a:gsLst>
+              <a:gs pos="0">
+                <a:schemeClr val="accent1">
+                  <a:lumMod val="5000"/>
+                  <a:lumOff val="95000"/>
+                </a:schemeClr>
+              </a:gs>
+              <a:gs pos="100000">
+                <a:srgbClr val="54416B"/>
+              </a:gs>
+            </a:gsLst>
+            <a:path path="circle">
+              <a:fillToRect l="100000" t="100000"/>
+            </a:path>
+          </a:gradFill>
+          <a:ln>
+            <a:noFill/>
+          </a:ln>
+        </p:spPr>
+        <p:style>
+          <a:lnRef idx="2">
+            <a:schemeClr val="accent1">
+              <a:shade val="50000"/>
+            </a:schemeClr>
+          </a:lnRef>
+          <a:fillRef idx="1">
+            <a:schemeClr val="accent1"/>
+          </a:fillRef>
+          <a:effectRef idx="0">
+            <a:schemeClr val="accent1"/>
+          </a:effectRef>
+          <a:fontRef idx="minor">
+            <a:schemeClr val="lt1"/>
+          </a:fontRef>
+        </p:style>
+        <p:txBody>
+          <a:bodyPr rtlCol="0" anchor="ctr"/>
+          <a:lstStyle/>
+          <a:p>
+            <a:pPr algn="ctr"/>
+            <a:endParaRPr lang="pt-BR"/>
+          </a:p>
+        </p:txBody>
+      </p:sp>
+      <p:pic>
+        <p:nvPicPr>
+          <p:cNvPr id="13" name="Imagem 12">
+            <a:extLst>
+              <a:ext uri="{FF2B5EF4-FFF2-40B4-BE49-F238E27FC236}">
+                <a16:creationId xmlns:a16="http://schemas.microsoft.com/office/drawing/2014/main" id="{445294E5-3ADA-46DE-9D79-9BCEAAF12DBB}"/>
+              </a:ext>
+            </a:extLst>
+          </p:cNvPr>
+          <p:cNvPicPr>
+            <a:picLocks noChangeAspect="1"/>
+          </p:cNvPicPr>
+          <p:nvPr/>
+        </p:nvPicPr>
+        <p:blipFill>
+          <a:blip r:embed="rId3"/>
+          <a:stretch>
+            <a:fillRect/>
+          </a:stretch>
+        </p:blipFill>
+        <p:spPr>
+          <a:xfrm rot="16200000">
+            <a:off x="-148204" y="6213725"/>
+            <a:ext cx="746574" cy="358356"/>
+          </a:xfrm>
+          <a:prstGeom prst="rect">
+            <a:avLst/>
+          </a:prstGeom>
+        </p:spPr>
+      </p:pic>
+      <p:sp>
+        <p:nvSpPr>
+          <p:cNvPr id="14" name="CaixaDeTexto 13">
+            <a:extLst>
+              <a:ext uri="{FF2B5EF4-FFF2-40B4-BE49-F238E27FC236}">
+                <a16:creationId xmlns:a16="http://schemas.microsoft.com/office/drawing/2014/main" id="{F0069CE5-7C5D-4662-AABB-EB02AB282D94}"/>
+              </a:ext>
+            </a:extLst>
+          </p:cNvPr>
+          <p:cNvSpPr txBox="1"/>
+          <p:nvPr/>
+        </p:nvSpPr>
+        <p:spPr>
+          <a:xfrm rot="16200000">
+            <a:off x="-2323823" y="3225011"/>
+            <a:ext cx="5097813" cy="307777"/>
+          </a:xfrm>
+          <a:prstGeom prst="rect">
+            <a:avLst/>
+          </a:prstGeom>
+          <a:noFill/>
+        </p:spPr>
+        <p:txBody>
+          <a:bodyPr wrap="square" rtlCol="0">
+            <a:spAutoFit/>
+          </a:bodyPr>
+          <a:lstStyle/>
+          <a:p>
+            <a:r>
+              <a:rPr lang="pt-BR" dirty="0">
+                <a:latin typeface="Calibri" panose="020F0502020204030204" pitchFamily="34" charset="0"/>
+                <a:cs typeface="Calibri" panose="020F0502020204030204" pitchFamily="34" charset="0"/>
+              </a:rPr>
+              <a:t>FAI - Centro de Ensino Superior em Gestão, Tecnologia e Educação</a:t>
+            </a:r>
+          </a:p>
+        </p:txBody>
+      </p:sp>
+      <p:cxnSp>
+        <p:nvCxnSpPr>
+          <p:cNvPr id="16" name="Conector reto 15">
+            <a:extLst>
+              <a:ext uri="{FF2B5EF4-FFF2-40B4-BE49-F238E27FC236}">
+                <a16:creationId xmlns:a16="http://schemas.microsoft.com/office/drawing/2014/main" id="{6116879A-0ED7-47C5-A7F1-3BE9B9E35DD5}"/>
+              </a:ext>
+            </a:extLst>
+          </p:cNvPr>
+          <p:cNvCxnSpPr>
+            <a:cxnSpLocks/>
+          </p:cNvCxnSpPr>
+          <p:nvPr/>
+        </p:nvCxnSpPr>
+        <p:spPr>
+          <a:xfrm>
+            <a:off x="632061" y="633045"/>
+            <a:ext cx="8258721" cy="0"/>
+          </a:xfrm>
+          <a:prstGeom prst="line">
+            <a:avLst/>
+          </a:prstGeom>
+          <a:ln>
+            <a:gradFill flip="none" rotWithShape="1">
+              <a:gsLst>
+                <a:gs pos="0">
+                  <a:schemeClr val="accent3">
+                    <a:lumMod val="75000"/>
+                  </a:schemeClr>
+                </a:gs>
+                <a:gs pos="100000">
+                  <a:srgbClr val="4F6228"/>
+                </a:gs>
+              </a:gsLst>
+              <a:lin ang="0" scaled="1"/>
+              <a:tileRect/>
+            </a:gradFill>
+          </a:ln>
+        </p:spPr>
+        <p:style>
+          <a:lnRef idx="1">
+            <a:schemeClr val="accent1"/>
+          </a:lnRef>
+          <a:fillRef idx="0">
+            <a:schemeClr val="accent1"/>
+          </a:fillRef>
+          <a:effectRef idx="0">
+            <a:schemeClr val="accent1"/>
+          </a:effectRef>
+          <a:fontRef idx="minor">
+            <a:schemeClr val="tx1"/>
+          </a:fontRef>
+        </p:style>
+      </p:cxnSp>
+      <p:sp>
+        <p:nvSpPr>
+          <p:cNvPr id="9" name="CaixaDeTexto 8">
+            <a:extLst>
+              <a:ext uri="{FF2B5EF4-FFF2-40B4-BE49-F238E27FC236}">
+                <a16:creationId xmlns:a16="http://schemas.microsoft.com/office/drawing/2014/main" id="{E21B1250-A8A1-4771-8929-41EC66F5748E}"/>
+              </a:ext>
+            </a:extLst>
+          </p:cNvPr>
+          <p:cNvSpPr txBox="1"/>
+          <p:nvPr/>
+        </p:nvSpPr>
+        <p:spPr>
+          <a:xfrm>
+            <a:off x="1195262" y="829993"/>
+            <a:ext cx="7132318" cy="1585049"/>
+          </a:xfrm>
+          <a:prstGeom prst="rect">
+            <a:avLst/>
+          </a:prstGeom>
+          <a:noFill/>
+        </p:spPr>
+        <p:txBody>
+          <a:bodyPr wrap="square" rtlCol="0">
+            <a:spAutoFit/>
+          </a:bodyPr>
+          <a:lstStyle/>
+          <a:p>
+            <a:pPr algn="just"/>
+            <a:r>
+              <a:rPr lang="pt-BR" sz="2500" dirty="0">
+                <a:solidFill>
+                  <a:schemeClr val="bg1">
+                    <a:lumMod val="85000"/>
+                  </a:schemeClr>
+                </a:solidFill>
+                <a:latin typeface="Verdana" panose="020B0604030504040204" pitchFamily="34" charset="0"/>
+                <a:ea typeface="Verdana" panose="020B0604030504040204" pitchFamily="34" charset="0"/>
+                <a:cs typeface="Calibri" panose="020F0502020204030204" pitchFamily="34" charset="0"/>
+              </a:rPr>
+              <a:t>1º</a:t>
+            </a:r>
+          </a:p>
+          <a:p>
+            <a:pPr algn="just"/>
+            <a:endParaRPr lang="pt-BR" sz="1800" dirty="0">
+              <a:solidFill>
+                <a:schemeClr val="bg1">
+                  <a:lumMod val="85000"/>
+                </a:schemeClr>
+              </a:solidFill>
+              <a:latin typeface="Verdana" panose="020B0604030504040204" pitchFamily="34" charset="0"/>
+              <a:ea typeface="Verdana" panose="020B0604030504040204" pitchFamily="34" charset="0"/>
+              <a:cs typeface="Calibri" panose="020F0502020204030204" pitchFamily="34" charset="0"/>
+            </a:endParaRPr>
+          </a:p>
+          <a:p>
+            <a:pPr algn="just"/>
+            <a:r>
+              <a:rPr lang="pt-BR" sz="1800" dirty="0">
+                <a:solidFill>
+                  <a:schemeClr val="bg1">
+                    <a:lumMod val="85000"/>
+                  </a:schemeClr>
+                </a:solidFill>
+                <a:latin typeface="Verdana" panose="020B0604030504040204" pitchFamily="34" charset="0"/>
+                <a:ea typeface="Verdana" panose="020B0604030504040204" pitchFamily="34" charset="0"/>
+                <a:cs typeface="Calibri" panose="020F0502020204030204" pitchFamily="34" charset="0"/>
+              </a:rPr>
+              <a:t>Definimos uma camada DAO básica, para manter a camada de modelo completamente desacoplada da camada de persistência.</a:t>
+            </a:r>
+          </a:p>
+        </p:txBody>
+      </p:sp>
+      <p:sp>
+        <p:nvSpPr>
+          <p:cNvPr id="8" name="CaixaDeTexto 7">
+            <a:extLst>
+              <a:ext uri="{FF2B5EF4-FFF2-40B4-BE49-F238E27FC236}">
+                <a16:creationId xmlns:a16="http://schemas.microsoft.com/office/drawing/2014/main" id="{F0E0CC6B-812B-4F4D-98D2-ED48DBF93802}"/>
+              </a:ext>
+            </a:extLst>
+          </p:cNvPr>
+          <p:cNvSpPr txBox="1"/>
+          <p:nvPr/>
+        </p:nvSpPr>
+        <p:spPr>
+          <a:xfrm>
+            <a:off x="3038843" y="2981019"/>
+            <a:ext cx="3445156" cy="3046988"/>
+          </a:xfrm>
+          <a:prstGeom prst="rect">
+            <a:avLst/>
+          </a:prstGeom>
+          <a:noFill/>
+        </p:spPr>
+        <p:txBody>
+          <a:bodyPr wrap="square" rtlCol="0">
+            <a:spAutoFit/>
+          </a:bodyPr>
+          <a:lstStyle/>
+          <a:p>
+            <a:pPr algn="just"/>
+            <a:r>
+              <a:rPr lang="pt-BR" sz="1600" dirty="0" err="1">
+                <a:solidFill>
+                  <a:srgbClr val="FFC000"/>
+                </a:solidFill>
+                <a:latin typeface="Verdana" panose="020B0604030504040204" pitchFamily="34" charset="0"/>
+                <a:ea typeface="Verdana" panose="020B0604030504040204" pitchFamily="34" charset="0"/>
+                <a:cs typeface="Calibri" panose="020F0502020204030204" pitchFamily="34" charset="0"/>
+              </a:rPr>
+              <a:t>public</a:t>
+            </a:r>
+            <a:r>
+              <a:rPr lang="pt-BR" sz="1600" dirty="0">
+                <a:solidFill>
+                  <a:srgbClr val="FFC000"/>
+                </a:solidFill>
+                <a:latin typeface="Verdana" panose="020B0604030504040204" pitchFamily="34" charset="0"/>
+                <a:ea typeface="Verdana" panose="020B0604030504040204" pitchFamily="34" charset="0"/>
+                <a:cs typeface="Calibri" panose="020F0502020204030204" pitchFamily="34" charset="0"/>
+              </a:rPr>
+              <a:t> interface </a:t>
+            </a:r>
+            <a:r>
+              <a:rPr lang="pt-BR" sz="1600" dirty="0" err="1">
+                <a:solidFill>
+                  <a:srgbClr val="FFC000"/>
+                </a:solidFill>
+                <a:latin typeface="Verdana" panose="020B0604030504040204" pitchFamily="34" charset="0"/>
+                <a:ea typeface="Verdana" panose="020B0604030504040204" pitchFamily="34" charset="0"/>
+                <a:cs typeface="Calibri" panose="020F0502020204030204" pitchFamily="34" charset="0"/>
+              </a:rPr>
+              <a:t>Dao</a:t>
+            </a:r>
+            <a:r>
+              <a:rPr lang="pt-BR" sz="1600" dirty="0">
+                <a:solidFill>
+                  <a:srgbClr val="FFC000"/>
+                </a:solidFill>
+                <a:latin typeface="Verdana" panose="020B0604030504040204" pitchFamily="34" charset="0"/>
+                <a:ea typeface="Verdana" panose="020B0604030504040204" pitchFamily="34" charset="0"/>
+                <a:cs typeface="Calibri" panose="020F0502020204030204" pitchFamily="34" charset="0"/>
+              </a:rPr>
+              <a:t>&lt;T&gt; {</a:t>
+            </a:r>
+          </a:p>
+          <a:p>
+            <a:pPr algn="just"/>
+            <a:r>
+              <a:rPr lang="pt-BR" sz="1600" dirty="0">
+                <a:solidFill>
+                  <a:srgbClr val="FFC000"/>
+                </a:solidFill>
+                <a:latin typeface="Verdana" panose="020B0604030504040204" pitchFamily="34" charset="0"/>
+                <a:ea typeface="Verdana" panose="020B0604030504040204" pitchFamily="34" charset="0"/>
+                <a:cs typeface="Calibri" panose="020F0502020204030204" pitchFamily="34" charset="0"/>
+              </a:rPr>
+              <a:t>     </a:t>
+            </a:r>
+          </a:p>
+          <a:p>
+            <a:pPr algn="just"/>
+            <a:r>
+              <a:rPr lang="pt-BR" sz="1600" dirty="0">
+                <a:solidFill>
+                  <a:srgbClr val="FFC000"/>
+                </a:solidFill>
+                <a:latin typeface="Verdana" panose="020B0604030504040204" pitchFamily="34" charset="0"/>
+                <a:ea typeface="Verdana" panose="020B0604030504040204" pitchFamily="34" charset="0"/>
+                <a:cs typeface="Calibri" panose="020F0502020204030204" pitchFamily="34" charset="0"/>
+              </a:rPr>
+              <a:t>	</a:t>
+            </a:r>
+            <a:r>
+              <a:rPr lang="pt-BR" sz="1600" dirty="0" err="1">
+                <a:solidFill>
+                  <a:srgbClr val="FFC000"/>
+                </a:solidFill>
+                <a:latin typeface="Verdana" panose="020B0604030504040204" pitchFamily="34" charset="0"/>
+                <a:ea typeface="Verdana" panose="020B0604030504040204" pitchFamily="34" charset="0"/>
+                <a:cs typeface="Calibri" panose="020F0502020204030204" pitchFamily="34" charset="0"/>
+              </a:rPr>
+              <a:t>void</a:t>
+            </a:r>
+            <a:r>
+              <a:rPr lang="pt-BR" sz="1600" dirty="0">
+                <a:solidFill>
+                  <a:srgbClr val="FFC000"/>
+                </a:solidFill>
+                <a:latin typeface="Verdana" panose="020B0604030504040204" pitchFamily="34" charset="0"/>
+                <a:ea typeface="Verdana" panose="020B0604030504040204" pitchFamily="34" charset="0"/>
+                <a:cs typeface="Calibri" panose="020F0502020204030204" pitchFamily="34" charset="0"/>
+              </a:rPr>
+              <a:t> </a:t>
+            </a:r>
+            <a:r>
+              <a:rPr lang="pt-BR" sz="1600" dirty="0" err="1">
+                <a:solidFill>
+                  <a:srgbClr val="FFC000"/>
+                </a:solidFill>
+                <a:latin typeface="Verdana" panose="020B0604030504040204" pitchFamily="34" charset="0"/>
+                <a:ea typeface="Verdana" panose="020B0604030504040204" pitchFamily="34" charset="0"/>
+                <a:cs typeface="Calibri" panose="020F0502020204030204" pitchFamily="34" charset="0"/>
+              </a:rPr>
+              <a:t>create</a:t>
+            </a:r>
+            <a:r>
+              <a:rPr lang="pt-BR" sz="1600" dirty="0">
+                <a:solidFill>
+                  <a:srgbClr val="FFC000"/>
+                </a:solidFill>
+                <a:latin typeface="Verdana" panose="020B0604030504040204" pitchFamily="34" charset="0"/>
+                <a:ea typeface="Verdana" panose="020B0604030504040204" pitchFamily="34" charset="0"/>
+                <a:cs typeface="Calibri" panose="020F0502020204030204" pitchFamily="34" charset="0"/>
+              </a:rPr>
+              <a:t>(T t);</a:t>
+            </a:r>
+          </a:p>
+          <a:p>
+            <a:pPr algn="just"/>
+            <a:endParaRPr lang="pt-BR" sz="1600" dirty="0">
+              <a:solidFill>
+                <a:srgbClr val="FFC000"/>
+              </a:solidFill>
+              <a:latin typeface="Verdana" panose="020B0604030504040204" pitchFamily="34" charset="0"/>
+              <a:ea typeface="Verdana" panose="020B0604030504040204" pitchFamily="34" charset="0"/>
+              <a:cs typeface="Calibri" panose="020F0502020204030204" pitchFamily="34" charset="0"/>
+            </a:endParaRPr>
+          </a:p>
+          <a:p>
+            <a:pPr algn="just"/>
+            <a:r>
+              <a:rPr lang="pt-BR" sz="1600" dirty="0">
+                <a:solidFill>
+                  <a:srgbClr val="FFC000"/>
+                </a:solidFill>
+                <a:latin typeface="Verdana" panose="020B0604030504040204" pitchFamily="34" charset="0"/>
+                <a:ea typeface="Verdana" panose="020B0604030504040204" pitchFamily="34" charset="0"/>
+                <a:cs typeface="Calibri" panose="020F0502020204030204" pitchFamily="34" charset="0"/>
+              </a:rPr>
+              <a:t>	</a:t>
+            </a:r>
+            <a:r>
+              <a:rPr lang="pt-BR" sz="1600" dirty="0" err="1">
+                <a:solidFill>
+                  <a:srgbClr val="FFC000"/>
+                </a:solidFill>
+                <a:latin typeface="Verdana" panose="020B0604030504040204" pitchFamily="34" charset="0"/>
+                <a:ea typeface="Verdana" panose="020B0604030504040204" pitchFamily="34" charset="0"/>
+                <a:cs typeface="Calibri" panose="020F0502020204030204" pitchFamily="34" charset="0"/>
+              </a:rPr>
+              <a:t>List</a:t>
+            </a:r>
+            <a:r>
+              <a:rPr lang="pt-BR" sz="1600" dirty="0">
+                <a:solidFill>
+                  <a:srgbClr val="FFC000"/>
+                </a:solidFill>
+                <a:latin typeface="Verdana" panose="020B0604030504040204" pitchFamily="34" charset="0"/>
+                <a:ea typeface="Verdana" panose="020B0604030504040204" pitchFamily="34" charset="0"/>
+                <a:cs typeface="Calibri" panose="020F0502020204030204" pitchFamily="34" charset="0"/>
+              </a:rPr>
+              <a:t>&lt;T&gt; </a:t>
+            </a:r>
+            <a:r>
+              <a:rPr lang="pt-BR" sz="1600" dirty="0" err="1">
+                <a:solidFill>
+                  <a:srgbClr val="FFC000"/>
+                </a:solidFill>
+                <a:latin typeface="Verdana" panose="020B0604030504040204" pitchFamily="34" charset="0"/>
+                <a:ea typeface="Verdana" panose="020B0604030504040204" pitchFamily="34" charset="0"/>
+                <a:cs typeface="Calibri" panose="020F0502020204030204" pitchFamily="34" charset="0"/>
+              </a:rPr>
+              <a:t>readAll</a:t>
+            </a:r>
+            <a:r>
+              <a:rPr lang="pt-BR" sz="1600" dirty="0">
+                <a:solidFill>
+                  <a:srgbClr val="FFC000"/>
+                </a:solidFill>
+                <a:latin typeface="Verdana" panose="020B0604030504040204" pitchFamily="34" charset="0"/>
+                <a:ea typeface="Verdana" panose="020B0604030504040204" pitchFamily="34" charset="0"/>
+                <a:cs typeface="Calibri" panose="020F0502020204030204" pitchFamily="34" charset="0"/>
+              </a:rPr>
+              <a:t>();</a:t>
+            </a:r>
+          </a:p>
+          <a:p>
+            <a:pPr algn="just"/>
+            <a:endParaRPr lang="pt-BR" sz="1600" dirty="0">
+              <a:solidFill>
+                <a:srgbClr val="FFC000"/>
+              </a:solidFill>
+              <a:latin typeface="Verdana" panose="020B0604030504040204" pitchFamily="34" charset="0"/>
+              <a:ea typeface="Verdana" panose="020B0604030504040204" pitchFamily="34" charset="0"/>
+              <a:cs typeface="Calibri" panose="020F0502020204030204" pitchFamily="34" charset="0"/>
+            </a:endParaRPr>
+          </a:p>
+          <a:p>
+            <a:pPr algn="just"/>
+            <a:r>
+              <a:rPr lang="pt-BR" sz="1600" dirty="0">
+                <a:solidFill>
+                  <a:srgbClr val="FFC000"/>
+                </a:solidFill>
+                <a:latin typeface="Verdana" panose="020B0604030504040204" pitchFamily="34" charset="0"/>
+                <a:ea typeface="Verdana" panose="020B0604030504040204" pitchFamily="34" charset="0"/>
+                <a:cs typeface="Calibri" panose="020F0502020204030204" pitchFamily="34" charset="0"/>
+              </a:rPr>
+              <a:t>	T </a:t>
+            </a:r>
+            <a:r>
+              <a:rPr lang="pt-BR" sz="1600" dirty="0" err="1">
+                <a:solidFill>
+                  <a:srgbClr val="FFC000"/>
+                </a:solidFill>
+                <a:latin typeface="Verdana" panose="020B0604030504040204" pitchFamily="34" charset="0"/>
+                <a:ea typeface="Verdana" panose="020B0604030504040204" pitchFamily="34" charset="0"/>
+                <a:cs typeface="Calibri" panose="020F0502020204030204" pitchFamily="34" charset="0"/>
+              </a:rPr>
+              <a:t>readById</a:t>
+            </a:r>
+            <a:r>
+              <a:rPr lang="pt-BR" sz="1600" dirty="0">
+                <a:solidFill>
+                  <a:srgbClr val="FFC000"/>
+                </a:solidFill>
+                <a:latin typeface="Verdana" panose="020B0604030504040204" pitchFamily="34" charset="0"/>
+                <a:ea typeface="Verdana" panose="020B0604030504040204" pitchFamily="34" charset="0"/>
+                <a:cs typeface="Calibri" panose="020F0502020204030204" pitchFamily="34" charset="0"/>
+              </a:rPr>
+              <a:t>(</a:t>
+            </a:r>
+            <a:r>
+              <a:rPr lang="pt-BR" sz="1600" dirty="0" err="1">
+                <a:solidFill>
+                  <a:srgbClr val="FFC000"/>
+                </a:solidFill>
+                <a:latin typeface="Verdana" panose="020B0604030504040204" pitchFamily="34" charset="0"/>
+                <a:ea typeface="Verdana" panose="020B0604030504040204" pitchFamily="34" charset="0"/>
+                <a:cs typeface="Calibri" panose="020F0502020204030204" pitchFamily="34" charset="0"/>
+              </a:rPr>
+              <a:t>long</a:t>
+            </a:r>
+            <a:r>
+              <a:rPr lang="pt-BR" sz="1600" dirty="0">
+                <a:solidFill>
+                  <a:srgbClr val="FFC000"/>
+                </a:solidFill>
+                <a:latin typeface="Verdana" panose="020B0604030504040204" pitchFamily="34" charset="0"/>
+                <a:ea typeface="Verdana" panose="020B0604030504040204" pitchFamily="34" charset="0"/>
+                <a:cs typeface="Calibri" panose="020F0502020204030204" pitchFamily="34" charset="0"/>
+              </a:rPr>
+              <a:t> id);</a:t>
+            </a:r>
+          </a:p>
+          <a:p>
+            <a:pPr algn="just"/>
+            <a:r>
+              <a:rPr lang="pt-BR" sz="1600" dirty="0">
+                <a:solidFill>
+                  <a:srgbClr val="FFC000"/>
+                </a:solidFill>
+                <a:latin typeface="Verdana" panose="020B0604030504040204" pitchFamily="34" charset="0"/>
+                <a:ea typeface="Verdana" panose="020B0604030504040204" pitchFamily="34" charset="0"/>
+                <a:cs typeface="Calibri" panose="020F0502020204030204" pitchFamily="34" charset="0"/>
+              </a:rPr>
+              <a:t>    </a:t>
+            </a:r>
+          </a:p>
+          <a:p>
+            <a:pPr algn="just"/>
+            <a:r>
+              <a:rPr lang="pt-BR" sz="1600" dirty="0">
+                <a:solidFill>
+                  <a:srgbClr val="FFC000"/>
+                </a:solidFill>
+                <a:latin typeface="Verdana" panose="020B0604030504040204" pitchFamily="34" charset="0"/>
+                <a:ea typeface="Verdana" panose="020B0604030504040204" pitchFamily="34" charset="0"/>
+                <a:cs typeface="Calibri" panose="020F0502020204030204" pitchFamily="34" charset="0"/>
+              </a:rPr>
+              <a:t>	</a:t>
+            </a:r>
+            <a:r>
+              <a:rPr lang="pt-BR" sz="1600" dirty="0" err="1">
+                <a:solidFill>
+                  <a:srgbClr val="FFC000"/>
+                </a:solidFill>
+                <a:latin typeface="Verdana" panose="020B0604030504040204" pitchFamily="34" charset="0"/>
+                <a:ea typeface="Verdana" panose="020B0604030504040204" pitchFamily="34" charset="0"/>
+                <a:cs typeface="Calibri" panose="020F0502020204030204" pitchFamily="34" charset="0"/>
+              </a:rPr>
+              <a:t>void</a:t>
+            </a:r>
+            <a:r>
+              <a:rPr lang="pt-BR" sz="1600" dirty="0">
+                <a:solidFill>
+                  <a:srgbClr val="FFC000"/>
+                </a:solidFill>
+                <a:latin typeface="Verdana" panose="020B0604030504040204" pitchFamily="34" charset="0"/>
+                <a:ea typeface="Verdana" panose="020B0604030504040204" pitchFamily="34" charset="0"/>
+                <a:cs typeface="Calibri" panose="020F0502020204030204" pitchFamily="34" charset="0"/>
+              </a:rPr>
+              <a:t> update(T t);</a:t>
+            </a:r>
+          </a:p>
+          <a:p>
+            <a:pPr algn="just"/>
+            <a:r>
+              <a:rPr lang="pt-BR" sz="1600" dirty="0">
+                <a:solidFill>
+                  <a:srgbClr val="FFC000"/>
+                </a:solidFill>
+                <a:latin typeface="Verdana" panose="020B0604030504040204" pitchFamily="34" charset="0"/>
+                <a:ea typeface="Verdana" panose="020B0604030504040204" pitchFamily="34" charset="0"/>
+                <a:cs typeface="Calibri" panose="020F0502020204030204" pitchFamily="34" charset="0"/>
+              </a:rPr>
+              <a:t>     </a:t>
+            </a:r>
+          </a:p>
+          <a:p>
+            <a:pPr algn="just"/>
+            <a:r>
+              <a:rPr lang="pt-BR" sz="1600" dirty="0">
+                <a:solidFill>
+                  <a:srgbClr val="FFC000"/>
+                </a:solidFill>
+                <a:latin typeface="Verdana" panose="020B0604030504040204" pitchFamily="34" charset="0"/>
+                <a:ea typeface="Verdana" panose="020B0604030504040204" pitchFamily="34" charset="0"/>
+                <a:cs typeface="Calibri" panose="020F0502020204030204" pitchFamily="34" charset="0"/>
+              </a:rPr>
+              <a:t>	</a:t>
+            </a:r>
+            <a:r>
+              <a:rPr lang="pt-BR" sz="1600" dirty="0" err="1">
+                <a:solidFill>
+                  <a:srgbClr val="FFC000"/>
+                </a:solidFill>
+                <a:latin typeface="Verdana" panose="020B0604030504040204" pitchFamily="34" charset="0"/>
+                <a:ea typeface="Verdana" panose="020B0604030504040204" pitchFamily="34" charset="0"/>
+                <a:cs typeface="Calibri" panose="020F0502020204030204" pitchFamily="34" charset="0"/>
+              </a:rPr>
+              <a:t>void</a:t>
+            </a:r>
+            <a:r>
+              <a:rPr lang="pt-BR" sz="1600" dirty="0">
+                <a:solidFill>
+                  <a:srgbClr val="FFC000"/>
+                </a:solidFill>
+                <a:latin typeface="Verdana" panose="020B0604030504040204" pitchFamily="34" charset="0"/>
+                <a:ea typeface="Verdana" panose="020B0604030504040204" pitchFamily="34" charset="0"/>
+                <a:cs typeface="Calibri" panose="020F0502020204030204" pitchFamily="34" charset="0"/>
+              </a:rPr>
+              <a:t> delete(T t);</a:t>
+            </a:r>
+          </a:p>
+          <a:p>
+            <a:pPr algn="just"/>
+            <a:r>
+              <a:rPr lang="pt-BR" sz="1600" dirty="0">
+                <a:solidFill>
+                  <a:srgbClr val="FFC000"/>
+                </a:solidFill>
+                <a:latin typeface="Verdana" panose="020B0604030504040204" pitchFamily="34" charset="0"/>
+                <a:ea typeface="Verdana" panose="020B0604030504040204" pitchFamily="34" charset="0"/>
+                <a:cs typeface="Calibri" panose="020F0502020204030204" pitchFamily="34" charset="0"/>
+              </a:rPr>
+              <a:t>}</a:t>
+            </a:r>
+          </a:p>
+        </p:txBody>
+      </p:sp>
+    </p:spTree>
+    <p:extLst>
+      <p:ext uri="{BB962C8B-B14F-4D97-AF65-F5344CB8AC3E}">
+        <p14:creationId xmlns:p14="http://schemas.microsoft.com/office/powerpoint/2010/main" val="497262610"/>
+      </p:ext>
+    </p:extLst>
+  </p:cSld>
+  <p:clrMapOvr>
+    <a:masterClrMapping/>
+  </p:clrMapOvr>
+</p:sld>
+</file>
+
+<file path=ppt/slides/slide12.xml><?xml version="1.0" encoding="utf-8"?>
+<p:sld xmlns:a="http://schemas.openxmlformats.org/drawingml/2006/main" xmlns:r="http://schemas.openxmlformats.org/officeDocument/2006/relationships" xmlns:p="http://schemas.openxmlformats.org/presentationml/2006/main">
+  <p:cSld>
+    <p:bg>
+      <p:bgPr>
+        <a:solidFill>
+          <a:srgbClr val="54416B"/>
+        </a:solidFill>
+        <a:effectLst/>
+      </p:bgPr>
+    </p:bg>
+    <p:spTree>
+      <p:nvGrpSpPr>
+        <p:cNvPr id="1" name="Shape 97"/>
+        <p:cNvGrpSpPr/>
+        <p:nvPr/>
+      </p:nvGrpSpPr>
+      <p:grpSpPr>
+        <a:xfrm>
+          <a:off x="0" y="0"/>
+          <a:ext cx="0" cy="0"/>
+          <a:chOff x="0" y="0"/>
+          <a:chExt cx="0" cy="0"/>
+        </a:xfrm>
+      </p:grpSpPr>
+      <p:pic>
+        <p:nvPicPr>
+          <p:cNvPr id="7" name="Imagem 6">
+            <a:extLst>
+              <a:ext uri="{FF2B5EF4-FFF2-40B4-BE49-F238E27FC236}">
+                <a16:creationId xmlns:a16="http://schemas.microsoft.com/office/drawing/2014/main" id="{D6C112AC-0AED-409F-A046-42B8C81D7BFA}"/>
+              </a:ext>
+            </a:extLst>
+          </p:cNvPr>
+          <p:cNvPicPr>
+            <a:picLocks noChangeAspect="1"/>
+          </p:cNvPicPr>
+          <p:nvPr/>
+        </p:nvPicPr>
+        <p:blipFill>
+          <a:blip r:embed="rId3"/>
+          <a:stretch>
+            <a:fillRect/>
+          </a:stretch>
+        </p:blipFill>
+        <p:spPr>
+          <a:xfrm>
+            <a:off x="632061" y="174580"/>
+            <a:ext cx="746574" cy="358356"/>
+          </a:xfrm>
+          <a:prstGeom prst="rect">
+            <a:avLst/>
+          </a:prstGeom>
+        </p:spPr>
+      </p:pic>
+      <p:sp>
+        <p:nvSpPr>
+          <p:cNvPr id="12" name="Retângulo 11">
+            <a:extLst>
+              <a:ext uri="{FF2B5EF4-FFF2-40B4-BE49-F238E27FC236}">
+                <a16:creationId xmlns:a16="http://schemas.microsoft.com/office/drawing/2014/main" id="{271F94DF-0C4F-4EC5-8956-4969FA418718}"/>
+              </a:ext>
+            </a:extLst>
+          </p:cNvPr>
+          <p:cNvSpPr/>
+          <p:nvPr/>
+        </p:nvSpPr>
+        <p:spPr>
+          <a:xfrm>
+            <a:off x="0" y="0"/>
+            <a:ext cx="450166" cy="6858000"/>
+          </a:xfrm>
+          <a:prstGeom prst="rect">
+            <a:avLst/>
+          </a:prstGeom>
+          <a:gradFill>
+            <a:gsLst>
+              <a:gs pos="0">
+                <a:schemeClr val="accent1">
+                  <a:lumMod val="5000"/>
+                  <a:lumOff val="95000"/>
+                </a:schemeClr>
+              </a:gs>
+              <a:gs pos="100000">
+                <a:srgbClr val="54416B"/>
+              </a:gs>
+            </a:gsLst>
+            <a:path path="circle">
+              <a:fillToRect l="100000" t="100000"/>
+            </a:path>
+          </a:gradFill>
+          <a:ln>
+            <a:noFill/>
+          </a:ln>
+        </p:spPr>
+        <p:style>
+          <a:lnRef idx="2">
+            <a:schemeClr val="accent1">
+              <a:shade val="50000"/>
+            </a:schemeClr>
+          </a:lnRef>
+          <a:fillRef idx="1">
+            <a:schemeClr val="accent1"/>
+          </a:fillRef>
+          <a:effectRef idx="0">
+            <a:schemeClr val="accent1"/>
+          </a:effectRef>
+          <a:fontRef idx="minor">
+            <a:schemeClr val="lt1"/>
+          </a:fontRef>
+        </p:style>
+        <p:txBody>
+          <a:bodyPr rtlCol="0" anchor="ctr"/>
+          <a:lstStyle/>
+          <a:p>
+            <a:pPr algn="ctr"/>
+            <a:endParaRPr lang="pt-BR"/>
+          </a:p>
+        </p:txBody>
+      </p:sp>
+      <p:pic>
+        <p:nvPicPr>
+          <p:cNvPr id="13" name="Imagem 12">
+            <a:extLst>
+              <a:ext uri="{FF2B5EF4-FFF2-40B4-BE49-F238E27FC236}">
+                <a16:creationId xmlns:a16="http://schemas.microsoft.com/office/drawing/2014/main" id="{445294E5-3ADA-46DE-9D79-9BCEAAF12DBB}"/>
+              </a:ext>
+            </a:extLst>
+          </p:cNvPr>
+          <p:cNvPicPr>
+            <a:picLocks noChangeAspect="1"/>
+          </p:cNvPicPr>
+          <p:nvPr/>
+        </p:nvPicPr>
+        <p:blipFill>
+          <a:blip r:embed="rId3"/>
+          <a:stretch>
+            <a:fillRect/>
+          </a:stretch>
+        </p:blipFill>
+        <p:spPr>
+          <a:xfrm rot="16200000">
+            <a:off x="-148204" y="6213725"/>
+            <a:ext cx="746574" cy="358356"/>
+          </a:xfrm>
+          <a:prstGeom prst="rect">
+            <a:avLst/>
+          </a:prstGeom>
+        </p:spPr>
+      </p:pic>
+      <p:sp>
+        <p:nvSpPr>
+          <p:cNvPr id="14" name="CaixaDeTexto 13">
+            <a:extLst>
+              <a:ext uri="{FF2B5EF4-FFF2-40B4-BE49-F238E27FC236}">
+                <a16:creationId xmlns:a16="http://schemas.microsoft.com/office/drawing/2014/main" id="{F0069CE5-7C5D-4662-AABB-EB02AB282D94}"/>
+              </a:ext>
+            </a:extLst>
+          </p:cNvPr>
+          <p:cNvSpPr txBox="1"/>
+          <p:nvPr/>
+        </p:nvSpPr>
+        <p:spPr>
+          <a:xfrm rot="16200000">
+            <a:off x="-2323823" y="3225011"/>
+            <a:ext cx="5097813" cy="307777"/>
+          </a:xfrm>
+          <a:prstGeom prst="rect">
+            <a:avLst/>
+          </a:prstGeom>
+          <a:noFill/>
+        </p:spPr>
+        <p:txBody>
+          <a:bodyPr wrap="square" rtlCol="0">
+            <a:spAutoFit/>
+          </a:bodyPr>
+          <a:lstStyle/>
+          <a:p>
+            <a:r>
+              <a:rPr lang="pt-BR" dirty="0">
+                <a:latin typeface="Calibri" panose="020F0502020204030204" pitchFamily="34" charset="0"/>
+                <a:cs typeface="Calibri" panose="020F0502020204030204" pitchFamily="34" charset="0"/>
+              </a:rPr>
+              <a:t>FAI - Centro de Ensino Superior em Gestão, Tecnologia e Educação</a:t>
+            </a:r>
+          </a:p>
+        </p:txBody>
+      </p:sp>
+      <p:cxnSp>
+        <p:nvCxnSpPr>
+          <p:cNvPr id="16" name="Conector reto 15">
+            <a:extLst>
+              <a:ext uri="{FF2B5EF4-FFF2-40B4-BE49-F238E27FC236}">
+                <a16:creationId xmlns:a16="http://schemas.microsoft.com/office/drawing/2014/main" id="{6116879A-0ED7-47C5-A7F1-3BE9B9E35DD5}"/>
+              </a:ext>
+            </a:extLst>
+          </p:cNvPr>
+          <p:cNvCxnSpPr>
+            <a:cxnSpLocks/>
+          </p:cNvCxnSpPr>
+          <p:nvPr/>
+        </p:nvCxnSpPr>
+        <p:spPr>
+          <a:xfrm>
+            <a:off x="632061" y="633045"/>
+            <a:ext cx="8258721" cy="0"/>
+          </a:xfrm>
+          <a:prstGeom prst="line">
+            <a:avLst/>
+          </a:prstGeom>
+          <a:ln>
+            <a:gradFill flip="none" rotWithShape="1">
+              <a:gsLst>
+                <a:gs pos="0">
+                  <a:schemeClr val="accent3">
+                    <a:lumMod val="75000"/>
+                  </a:schemeClr>
+                </a:gs>
+                <a:gs pos="100000">
+                  <a:srgbClr val="4F6228"/>
+                </a:gs>
+              </a:gsLst>
+              <a:lin ang="0" scaled="1"/>
+              <a:tileRect/>
+            </a:gradFill>
+          </a:ln>
+        </p:spPr>
+        <p:style>
+          <a:lnRef idx="1">
+            <a:schemeClr val="accent1"/>
+          </a:lnRef>
+          <a:fillRef idx="0">
+            <a:schemeClr val="accent1"/>
+          </a:fillRef>
+          <a:effectRef idx="0">
+            <a:schemeClr val="accent1"/>
+          </a:effectRef>
+          <a:fontRef idx="minor">
+            <a:schemeClr val="tx1"/>
+          </a:fontRef>
+        </p:style>
+      </p:cxnSp>
+      <p:sp>
+        <p:nvSpPr>
+          <p:cNvPr id="9" name="CaixaDeTexto 8">
+            <a:extLst>
+              <a:ext uri="{FF2B5EF4-FFF2-40B4-BE49-F238E27FC236}">
+                <a16:creationId xmlns:a16="http://schemas.microsoft.com/office/drawing/2014/main" id="{E21B1250-A8A1-4771-8929-41EC66F5748E}"/>
+              </a:ext>
+            </a:extLst>
+          </p:cNvPr>
+          <p:cNvSpPr txBox="1"/>
+          <p:nvPr/>
+        </p:nvSpPr>
+        <p:spPr>
+          <a:xfrm>
+            <a:off x="1195262" y="829993"/>
+            <a:ext cx="7132318" cy="1031051"/>
+          </a:xfrm>
+          <a:prstGeom prst="rect">
+            <a:avLst/>
+          </a:prstGeom>
+          <a:noFill/>
+        </p:spPr>
+        <p:txBody>
+          <a:bodyPr wrap="square" rtlCol="0">
+            <a:spAutoFit/>
+          </a:bodyPr>
+          <a:lstStyle/>
+          <a:p>
+            <a:pPr algn="just"/>
+            <a:r>
+              <a:rPr lang="pt-BR" sz="2500" dirty="0">
+                <a:solidFill>
+                  <a:schemeClr val="bg1">
+                    <a:lumMod val="85000"/>
+                  </a:schemeClr>
+                </a:solidFill>
+                <a:latin typeface="Verdana" panose="020B0604030504040204" pitchFamily="34" charset="0"/>
+                <a:ea typeface="Verdana" panose="020B0604030504040204" pitchFamily="34" charset="0"/>
+                <a:cs typeface="Calibri" panose="020F0502020204030204" pitchFamily="34" charset="0"/>
+              </a:rPr>
+              <a:t>2º</a:t>
+            </a:r>
+          </a:p>
+          <a:p>
+            <a:pPr algn="just"/>
+            <a:endParaRPr lang="pt-BR" sz="1800" dirty="0">
+              <a:solidFill>
+                <a:schemeClr val="bg1">
+                  <a:lumMod val="85000"/>
+                </a:schemeClr>
+              </a:solidFill>
+              <a:latin typeface="Verdana" panose="020B0604030504040204" pitchFamily="34" charset="0"/>
+              <a:ea typeface="Verdana" panose="020B0604030504040204" pitchFamily="34" charset="0"/>
+              <a:cs typeface="Calibri" panose="020F0502020204030204" pitchFamily="34" charset="0"/>
+            </a:endParaRPr>
+          </a:p>
+          <a:p>
+            <a:pPr algn="just"/>
+            <a:r>
+              <a:rPr lang="pt-BR" sz="1800" dirty="0">
+                <a:solidFill>
+                  <a:schemeClr val="bg1">
+                    <a:lumMod val="85000"/>
+                  </a:schemeClr>
+                </a:solidFill>
+                <a:latin typeface="Verdana" panose="020B0604030504040204" pitchFamily="34" charset="0"/>
+                <a:ea typeface="Verdana" panose="020B0604030504040204" pitchFamily="34" charset="0"/>
+                <a:cs typeface="Calibri" panose="020F0502020204030204" pitchFamily="34" charset="0"/>
+              </a:rPr>
+              <a:t>Agora, implementamos a interface DAO</a:t>
+            </a:r>
+          </a:p>
+        </p:txBody>
+      </p:sp>
+      <p:sp>
+        <p:nvSpPr>
+          <p:cNvPr id="8" name="CaixaDeTexto 7">
+            <a:extLst>
+              <a:ext uri="{FF2B5EF4-FFF2-40B4-BE49-F238E27FC236}">
+                <a16:creationId xmlns:a16="http://schemas.microsoft.com/office/drawing/2014/main" id="{F0E0CC6B-812B-4F4D-98D2-ED48DBF93802}"/>
+              </a:ext>
+            </a:extLst>
+          </p:cNvPr>
+          <p:cNvSpPr txBox="1"/>
+          <p:nvPr/>
+        </p:nvSpPr>
+        <p:spPr>
+          <a:xfrm>
+            <a:off x="3038843" y="2981019"/>
+            <a:ext cx="3445156" cy="3046988"/>
+          </a:xfrm>
+          <a:prstGeom prst="rect">
+            <a:avLst/>
+          </a:prstGeom>
+          <a:noFill/>
+        </p:spPr>
+        <p:txBody>
+          <a:bodyPr wrap="square" rtlCol="0">
+            <a:spAutoFit/>
+          </a:bodyPr>
+          <a:lstStyle/>
+          <a:p>
+            <a:pPr algn="just"/>
+            <a:r>
+              <a:rPr lang="pt-BR" sz="1600" dirty="0" err="1">
+                <a:solidFill>
+                  <a:srgbClr val="FFC000"/>
+                </a:solidFill>
+                <a:latin typeface="Verdana" panose="020B0604030504040204" pitchFamily="34" charset="0"/>
+                <a:ea typeface="Verdana" panose="020B0604030504040204" pitchFamily="34" charset="0"/>
+                <a:cs typeface="Calibri" panose="020F0502020204030204" pitchFamily="34" charset="0"/>
+              </a:rPr>
+              <a:t>public</a:t>
+            </a:r>
+            <a:r>
+              <a:rPr lang="pt-BR" sz="1600" dirty="0">
+                <a:solidFill>
+                  <a:srgbClr val="FFC000"/>
+                </a:solidFill>
+                <a:latin typeface="Verdana" panose="020B0604030504040204" pitchFamily="34" charset="0"/>
+                <a:ea typeface="Verdana" panose="020B0604030504040204" pitchFamily="34" charset="0"/>
+                <a:cs typeface="Calibri" panose="020F0502020204030204" pitchFamily="34" charset="0"/>
+              </a:rPr>
+              <a:t> interface </a:t>
+            </a:r>
+            <a:r>
+              <a:rPr lang="pt-BR" sz="1600" dirty="0" err="1">
+                <a:solidFill>
+                  <a:srgbClr val="FFC000"/>
+                </a:solidFill>
+                <a:latin typeface="Verdana" panose="020B0604030504040204" pitchFamily="34" charset="0"/>
+                <a:ea typeface="Verdana" panose="020B0604030504040204" pitchFamily="34" charset="0"/>
+                <a:cs typeface="Calibri" panose="020F0502020204030204" pitchFamily="34" charset="0"/>
+              </a:rPr>
+              <a:t>Dao</a:t>
+            </a:r>
+            <a:r>
+              <a:rPr lang="pt-BR" sz="1600" dirty="0">
+                <a:solidFill>
+                  <a:srgbClr val="FFC000"/>
+                </a:solidFill>
+                <a:latin typeface="Verdana" panose="020B0604030504040204" pitchFamily="34" charset="0"/>
+                <a:ea typeface="Verdana" panose="020B0604030504040204" pitchFamily="34" charset="0"/>
+                <a:cs typeface="Calibri" panose="020F0502020204030204" pitchFamily="34" charset="0"/>
+              </a:rPr>
+              <a:t>&lt;T&gt; {</a:t>
+            </a:r>
+          </a:p>
+          <a:p>
+            <a:pPr algn="just"/>
+            <a:r>
+              <a:rPr lang="pt-BR" sz="1600" dirty="0">
+                <a:solidFill>
+                  <a:srgbClr val="FFC000"/>
+                </a:solidFill>
+                <a:latin typeface="Verdana" panose="020B0604030504040204" pitchFamily="34" charset="0"/>
+                <a:ea typeface="Verdana" panose="020B0604030504040204" pitchFamily="34" charset="0"/>
+                <a:cs typeface="Calibri" panose="020F0502020204030204" pitchFamily="34" charset="0"/>
+              </a:rPr>
+              <a:t>     </a:t>
+            </a:r>
+          </a:p>
+          <a:p>
+            <a:pPr algn="just"/>
+            <a:r>
+              <a:rPr lang="pt-BR" sz="1600" dirty="0">
+                <a:solidFill>
+                  <a:srgbClr val="FFC000"/>
+                </a:solidFill>
+                <a:latin typeface="Verdana" panose="020B0604030504040204" pitchFamily="34" charset="0"/>
+                <a:ea typeface="Verdana" panose="020B0604030504040204" pitchFamily="34" charset="0"/>
+                <a:cs typeface="Calibri" panose="020F0502020204030204" pitchFamily="34" charset="0"/>
+              </a:rPr>
+              <a:t>	</a:t>
+            </a:r>
+            <a:r>
+              <a:rPr lang="pt-BR" sz="1600" dirty="0" err="1">
+                <a:solidFill>
+                  <a:srgbClr val="FFC000"/>
+                </a:solidFill>
+                <a:latin typeface="Verdana" panose="020B0604030504040204" pitchFamily="34" charset="0"/>
+                <a:ea typeface="Verdana" panose="020B0604030504040204" pitchFamily="34" charset="0"/>
+                <a:cs typeface="Calibri" panose="020F0502020204030204" pitchFamily="34" charset="0"/>
+              </a:rPr>
+              <a:t>void</a:t>
+            </a:r>
+            <a:r>
+              <a:rPr lang="pt-BR" sz="1600" dirty="0">
+                <a:solidFill>
+                  <a:srgbClr val="FFC000"/>
+                </a:solidFill>
+                <a:latin typeface="Verdana" panose="020B0604030504040204" pitchFamily="34" charset="0"/>
+                <a:ea typeface="Verdana" panose="020B0604030504040204" pitchFamily="34" charset="0"/>
+                <a:cs typeface="Calibri" panose="020F0502020204030204" pitchFamily="34" charset="0"/>
+              </a:rPr>
+              <a:t> </a:t>
+            </a:r>
+            <a:r>
+              <a:rPr lang="pt-BR" sz="1600" dirty="0" err="1">
+                <a:solidFill>
+                  <a:srgbClr val="FFC000"/>
+                </a:solidFill>
+                <a:latin typeface="Verdana" panose="020B0604030504040204" pitchFamily="34" charset="0"/>
+                <a:ea typeface="Verdana" panose="020B0604030504040204" pitchFamily="34" charset="0"/>
+                <a:cs typeface="Calibri" panose="020F0502020204030204" pitchFamily="34" charset="0"/>
+              </a:rPr>
+              <a:t>create</a:t>
+            </a:r>
+            <a:r>
+              <a:rPr lang="pt-BR" sz="1600" dirty="0">
+                <a:solidFill>
+                  <a:srgbClr val="FFC000"/>
+                </a:solidFill>
+                <a:latin typeface="Verdana" panose="020B0604030504040204" pitchFamily="34" charset="0"/>
+                <a:ea typeface="Verdana" panose="020B0604030504040204" pitchFamily="34" charset="0"/>
+                <a:cs typeface="Calibri" panose="020F0502020204030204" pitchFamily="34" charset="0"/>
+              </a:rPr>
+              <a:t>(T t);</a:t>
+            </a:r>
+          </a:p>
+          <a:p>
+            <a:pPr algn="just"/>
+            <a:endParaRPr lang="pt-BR" sz="1600" dirty="0">
+              <a:solidFill>
+                <a:srgbClr val="FFC000"/>
+              </a:solidFill>
+              <a:latin typeface="Verdana" panose="020B0604030504040204" pitchFamily="34" charset="0"/>
+              <a:ea typeface="Verdana" panose="020B0604030504040204" pitchFamily="34" charset="0"/>
+              <a:cs typeface="Calibri" panose="020F0502020204030204" pitchFamily="34" charset="0"/>
+            </a:endParaRPr>
+          </a:p>
+          <a:p>
+            <a:pPr algn="just"/>
+            <a:r>
+              <a:rPr lang="pt-BR" sz="1600" dirty="0">
+                <a:solidFill>
+                  <a:srgbClr val="FFC000"/>
+                </a:solidFill>
+                <a:latin typeface="Verdana" panose="020B0604030504040204" pitchFamily="34" charset="0"/>
+                <a:ea typeface="Verdana" panose="020B0604030504040204" pitchFamily="34" charset="0"/>
+                <a:cs typeface="Calibri" panose="020F0502020204030204" pitchFamily="34" charset="0"/>
+              </a:rPr>
+              <a:t>	</a:t>
+            </a:r>
+            <a:r>
+              <a:rPr lang="pt-BR" sz="1600" dirty="0" err="1">
+                <a:solidFill>
+                  <a:srgbClr val="FFC000"/>
+                </a:solidFill>
+                <a:latin typeface="Verdana" panose="020B0604030504040204" pitchFamily="34" charset="0"/>
+                <a:ea typeface="Verdana" panose="020B0604030504040204" pitchFamily="34" charset="0"/>
+                <a:cs typeface="Calibri" panose="020F0502020204030204" pitchFamily="34" charset="0"/>
+              </a:rPr>
+              <a:t>List</a:t>
+            </a:r>
+            <a:r>
+              <a:rPr lang="pt-BR" sz="1600" dirty="0">
+                <a:solidFill>
+                  <a:srgbClr val="FFC000"/>
+                </a:solidFill>
+                <a:latin typeface="Verdana" panose="020B0604030504040204" pitchFamily="34" charset="0"/>
+                <a:ea typeface="Verdana" panose="020B0604030504040204" pitchFamily="34" charset="0"/>
+                <a:cs typeface="Calibri" panose="020F0502020204030204" pitchFamily="34" charset="0"/>
+              </a:rPr>
+              <a:t>&lt;T&gt; </a:t>
+            </a:r>
+            <a:r>
+              <a:rPr lang="pt-BR" sz="1600" dirty="0" err="1">
+                <a:solidFill>
+                  <a:srgbClr val="FFC000"/>
+                </a:solidFill>
+                <a:latin typeface="Verdana" panose="020B0604030504040204" pitchFamily="34" charset="0"/>
+                <a:ea typeface="Verdana" panose="020B0604030504040204" pitchFamily="34" charset="0"/>
+                <a:cs typeface="Calibri" panose="020F0502020204030204" pitchFamily="34" charset="0"/>
+              </a:rPr>
+              <a:t>readAll</a:t>
+            </a:r>
+            <a:r>
+              <a:rPr lang="pt-BR" sz="1600" dirty="0">
+                <a:solidFill>
+                  <a:srgbClr val="FFC000"/>
+                </a:solidFill>
+                <a:latin typeface="Verdana" panose="020B0604030504040204" pitchFamily="34" charset="0"/>
+                <a:ea typeface="Verdana" panose="020B0604030504040204" pitchFamily="34" charset="0"/>
+                <a:cs typeface="Calibri" panose="020F0502020204030204" pitchFamily="34" charset="0"/>
+              </a:rPr>
+              <a:t>();</a:t>
+            </a:r>
+          </a:p>
+          <a:p>
+            <a:pPr algn="just"/>
+            <a:endParaRPr lang="pt-BR" sz="1600" dirty="0">
+              <a:solidFill>
+                <a:srgbClr val="FFC000"/>
+              </a:solidFill>
+              <a:latin typeface="Verdana" panose="020B0604030504040204" pitchFamily="34" charset="0"/>
+              <a:ea typeface="Verdana" panose="020B0604030504040204" pitchFamily="34" charset="0"/>
+              <a:cs typeface="Calibri" panose="020F0502020204030204" pitchFamily="34" charset="0"/>
+            </a:endParaRPr>
+          </a:p>
+          <a:p>
+            <a:pPr algn="just"/>
+            <a:r>
+              <a:rPr lang="pt-BR" sz="1600" dirty="0">
+                <a:solidFill>
+                  <a:srgbClr val="FFC000"/>
+                </a:solidFill>
+                <a:latin typeface="Verdana" panose="020B0604030504040204" pitchFamily="34" charset="0"/>
+                <a:ea typeface="Verdana" panose="020B0604030504040204" pitchFamily="34" charset="0"/>
+                <a:cs typeface="Calibri" panose="020F0502020204030204" pitchFamily="34" charset="0"/>
+              </a:rPr>
+              <a:t>	T </a:t>
+            </a:r>
+            <a:r>
+              <a:rPr lang="pt-BR" sz="1600" dirty="0" err="1">
+                <a:solidFill>
+                  <a:srgbClr val="FFC000"/>
+                </a:solidFill>
+                <a:latin typeface="Verdana" panose="020B0604030504040204" pitchFamily="34" charset="0"/>
+                <a:ea typeface="Verdana" panose="020B0604030504040204" pitchFamily="34" charset="0"/>
+                <a:cs typeface="Calibri" panose="020F0502020204030204" pitchFamily="34" charset="0"/>
+              </a:rPr>
+              <a:t>readById</a:t>
+            </a:r>
+            <a:r>
+              <a:rPr lang="pt-BR" sz="1600" dirty="0">
+                <a:solidFill>
+                  <a:srgbClr val="FFC000"/>
+                </a:solidFill>
+                <a:latin typeface="Verdana" panose="020B0604030504040204" pitchFamily="34" charset="0"/>
+                <a:ea typeface="Verdana" panose="020B0604030504040204" pitchFamily="34" charset="0"/>
+                <a:cs typeface="Calibri" panose="020F0502020204030204" pitchFamily="34" charset="0"/>
+              </a:rPr>
+              <a:t>(</a:t>
+            </a:r>
+            <a:r>
+              <a:rPr lang="pt-BR" sz="1600" dirty="0" err="1">
+                <a:solidFill>
+                  <a:srgbClr val="FFC000"/>
+                </a:solidFill>
+                <a:latin typeface="Verdana" panose="020B0604030504040204" pitchFamily="34" charset="0"/>
+                <a:ea typeface="Verdana" panose="020B0604030504040204" pitchFamily="34" charset="0"/>
+                <a:cs typeface="Calibri" panose="020F0502020204030204" pitchFamily="34" charset="0"/>
+              </a:rPr>
+              <a:t>long</a:t>
+            </a:r>
+            <a:r>
+              <a:rPr lang="pt-BR" sz="1600" dirty="0">
+                <a:solidFill>
+                  <a:srgbClr val="FFC000"/>
+                </a:solidFill>
+                <a:latin typeface="Verdana" panose="020B0604030504040204" pitchFamily="34" charset="0"/>
+                <a:ea typeface="Verdana" panose="020B0604030504040204" pitchFamily="34" charset="0"/>
+                <a:cs typeface="Calibri" panose="020F0502020204030204" pitchFamily="34" charset="0"/>
+              </a:rPr>
+              <a:t> id);</a:t>
+            </a:r>
+          </a:p>
+          <a:p>
+            <a:pPr algn="just"/>
+            <a:r>
+              <a:rPr lang="pt-BR" sz="1600" dirty="0">
+                <a:solidFill>
+                  <a:srgbClr val="FFC000"/>
+                </a:solidFill>
+                <a:latin typeface="Verdana" panose="020B0604030504040204" pitchFamily="34" charset="0"/>
+                <a:ea typeface="Verdana" panose="020B0604030504040204" pitchFamily="34" charset="0"/>
+                <a:cs typeface="Calibri" panose="020F0502020204030204" pitchFamily="34" charset="0"/>
+              </a:rPr>
+              <a:t>    </a:t>
+            </a:r>
+          </a:p>
+          <a:p>
+            <a:pPr algn="just"/>
+            <a:r>
+              <a:rPr lang="pt-BR" sz="1600" dirty="0">
+                <a:solidFill>
+                  <a:srgbClr val="FFC000"/>
+                </a:solidFill>
+                <a:latin typeface="Verdana" panose="020B0604030504040204" pitchFamily="34" charset="0"/>
+                <a:ea typeface="Verdana" panose="020B0604030504040204" pitchFamily="34" charset="0"/>
+                <a:cs typeface="Calibri" panose="020F0502020204030204" pitchFamily="34" charset="0"/>
+              </a:rPr>
+              <a:t>	</a:t>
+            </a:r>
+            <a:r>
+              <a:rPr lang="pt-BR" sz="1600" dirty="0" err="1">
+                <a:solidFill>
+                  <a:srgbClr val="FFC000"/>
+                </a:solidFill>
+                <a:latin typeface="Verdana" panose="020B0604030504040204" pitchFamily="34" charset="0"/>
+                <a:ea typeface="Verdana" panose="020B0604030504040204" pitchFamily="34" charset="0"/>
+                <a:cs typeface="Calibri" panose="020F0502020204030204" pitchFamily="34" charset="0"/>
+              </a:rPr>
+              <a:t>void</a:t>
+            </a:r>
+            <a:r>
+              <a:rPr lang="pt-BR" sz="1600" dirty="0">
+                <a:solidFill>
+                  <a:srgbClr val="FFC000"/>
+                </a:solidFill>
+                <a:latin typeface="Verdana" panose="020B0604030504040204" pitchFamily="34" charset="0"/>
+                <a:ea typeface="Verdana" panose="020B0604030504040204" pitchFamily="34" charset="0"/>
+                <a:cs typeface="Calibri" panose="020F0502020204030204" pitchFamily="34" charset="0"/>
+              </a:rPr>
+              <a:t> update(T t);</a:t>
+            </a:r>
+          </a:p>
+          <a:p>
+            <a:pPr algn="just"/>
+            <a:r>
+              <a:rPr lang="pt-BR" sz="1600" dirty="0">
+                <a:solidFill>
+                  <a:srgbClr val="FFC000"/>
+                </a:solidFill>
+                <a:latin typeface="Verdana" panose="020B0604030504040204" pitchFamily="34" charset="0"/>
+                <a:ea typeface="Verdana" panose="020B0604030504040204" pitchFamily="34" charset="0"/>
+                <a:cs typeface="Calibri" panose="020F0502020204030204" pitchFamily="34" charset="0"/>
+              </a:rPr>
+              <a:t>     </a:t>
+            </a:r>
+          </a:p>
+          <a:p>
+            <a:pPr algn="just"/>
+            <a:r>
+              <a:rPr lang="pt-BR" sz="1600" dirty="0">
+                <a:solidFill>
+                  <a:srgbClr val="FFC000"/>
+                </a:solidFill>
+                <a:latin typeface="Verdana" panose="020B0604030504040204" pitchFamily="34" charset="0"/>
+                <a:ea typeface="Verdana" panose="020B0604030504040204" pitchFamily="34" charset="0"/>
+                <a:cs typeface="Calibri" panose="020F0502020204030204" pitchFamily="34" charset="0"/>
+              </a:rPr>
+              <a:t>	</a:t>
+            </a:r>
+            <a:r>
+              <a:rPr lang="pt-BR" sz="1600" dirty="0" err="1">
+                <a:solidFill>
+                  <a:srgbClr val="FFC000"/>
+                </a:solidFill>
+                <a:latin typeface="Verdana" panose="020B0604030504040204" pitchFamily="34" charset="0"/>
+                <a:ea typeface="Verdana" panose="020B0604030504040204" pitchFamily="34" charset="0"/>
+                <a:cs typeface="Calibri" panose="020F0502020204030204" pitchFamily="34" charset="0"/>
+              </a:rPr>
+              <a:t>void</a:t>
+            </a:r>
+            <a:r>
+              <a:rPr lang="pt-BR" sz="1600" dirty="0">
+                <a:solidFill>
+                  <a:srgbClr val="FFC000"/>
+                </a:solidFill>
+                <a:latin typeface="Verdana" panose="020B0604030504040204" pitchFamily="34" charset="0"/>
+                <a:ea typeface="Verdana" panose="020B0604030504040204" pitchFamily="34" charset="0"/>
+                <a:cs typeface="Calibri" panose="020F0502020204030204" pitchFamily="34" charset="0"/>
+              </a:rPr>
+              <a:t> delete(T t);</a:t>
+            </a:r>
+          </a:p>
+          <a:p>
+            <a:pPr algn="just"/>
+            <a:r>
+              <a:rPr lang="pt-BR" sz="1600" dirty="0">
+                <a:solidFill>
+                  <a:srgbClr val="FFC000"/>
+                </a:solidFill>
+                <a:latin typeface="Verdana" panose="020B0604030504040204" pitchFamily="34" charset="0"/>
+                <a:ea typeface="Verdana" panose="020B0604030504040204" pitchFamily="34" charset="0"/>
+                <a:cs typeface="Calibri" panose="020F0502020204030204" pitchFamily="34" charset="0"/>
+              </a:rPr>
+              <a:t>}</a:t>
+            </a:r>
+          </a:p>
+        </p:txBody>
+      </p:sp>
+    </p:spTree>
+    <p:extLst>
+      <p:ext uri="{BB962C8B-B14F-4D97-AF65-F5344CB8AC3E}">
+        <p14:creationId xmlns:p14="http://schemas.microsoft.com/office/powerpoint/2010/main" val="1215287962"/>
+      </p:ext>
+    </p:extLst>
+  </p:cSld>
+  <p:clrMapOvr>
+    <a:masterClrMapping/>
+  </p:clrMapOvr>
+</p:sld>
+</file>
+
 <file path=ppt/slides/slide2.xml><?xml version="1.0" encoding="utf-8"?>
 <p:sld xmlns:a="http://schemas.openxmlformats.org/drawingml/2006/main" xmlns:r="http://schemas.openxmlformats.org/officeDocument/2006/relationships" xmlns:p="http://schemas.openxmlformats.org/presentationml/2006/main">
   <p:cSld>
@@ -16012,73 +18796,6 @@
           </a:fontRef>
         </p:style>
       </p:cxnSp>
-      <p:sp>
-        <p:nvSpPr>
-          <p:cNvPr id="8" name="CaixaDeTexto 7">
-            <a:extLst>
-              <a:ext uri="{FF2B5EF4-FFF2-40B4-BE49-F238E27FC236}">
-                <a16:creationId xmlns:a16="http://schemas.microsoft.com/office/drawing/2014/main" id="{DB851173-65B6-4ABA-8EAF-BE1573B2F766}"/>
-              </a:ext>
-            </a:extLst>
-          </p:cNvPr>
-          <p:cNvSpPr txBox="1"/>
-          <p:nvPr/>
-        </p:nvSpPr>
-        <p:spPr>
-          <a:xfrm>
-            <a:off x="7322815" y="174580"/>
-            <a:ext cx="1709122" cy="323165"/>
-          </a:xfrm>
-          <a:prstGeom prst="rect">
-            <a:avLst/>
-          </a:prstGeom>
-          <a:noFill/>
-        </p:spPr>
-        <p:txBody>
-          <a:bodyPr wrap="none" rtlCol="0">
-            <a:spAutoFit/>
-          </a:bodyPr>
-          <a:lstStyle/>
-          <a:p>
-            <a:r>
-              <a:rPr lang="pt-BR" sz="1500" dirty="0">
-                <a:solidFill>
-                  <a:schemeClr val="bg1">
-                    <a:lumMod val="85000"/>
-                  </a:schemeClr>
-                </a:solidFill>
-                <a:latin typeface="Verdana" panose="020B0604030504040204" pitchFamily="34" charset="0"/>
-                <a:ea typeface="Verdana" panose="020B0604030504040204" pitchFamily="34" charset="0"/>
-                <a:cs typeface="Calibri" panose="020F0502020204030204" pitchFamily="34" charset="0"/>
-              </a:rPr>
-              <a:t>Design </a:t>
-            </a:r>
-            <a:r>
-              <a:rPr lang="pt-BR" sz="1500" dirty="0" err="1">
-                <a:solidFill>
-                  <a:schemeClr val="bg1">
-                    <a:lumMod val="85000"/>
-                  </a:schemeClr>
-                </a:solidFill>
-                <a:latin typeface="Verdana" panose="020B0604030504040204" pitchFamily="34" charset="0"/>
-                <a:ea typeface="Verdana" panose="020B0604030504040204" pitchFamily="34" charset="0"/>
-                <a:cs typeface="Calibri" panose="020F0502020204030204" pitchFamily="34" charset="0"/>
-              </a:rPr>
-              <a:t>Patterns</a:t>
-            </a:r>
-            <a:endParaRPr lang="pt-BR" sz="1500" dirty="0">
-              <a:solidFill>
-                <a:schemeClr val="bg1">
-                  <a:lumMod val="85000"/>
-                </a:schemeClr>
-              </a:solidFill>
-              <a:latin typeface="Verdana" panose="020B0604030504040204" pitchFamily="34" charset="0"/>
-              <a:ea typeface="Verdana" panose="020B0604030504040204" pitchFamily="34" charset="0"/>
-              <a:cs typeface="Calibri" panose="020F0502020204030204" pitchFamily="34" charset="0"/>
-            </a:endParaRPr>
-          </a:p>
-        </p:txBody>
-      </p:sp>
       <p:sp>
         <p:nvSpPr>
           <p:cNvPr id="9" name="CaixaDeTexto 8">
@@ -16572,7 +19289,7 @@
               </a:buClr>
             </a:pPr>
             <a:r>
-              <a:rPr lang="pt-BR" sz="4000" dirty="0" err="1">
+              <a:rPr lang="pt-BR" sz="4000" dirty="0">
                 <a:solidFill>
                   <a:schemeClr val="bg1">
                     <a:lumMod val="85000"/>
@@ -16582,85 +19299,8 @@
                 <a:ea typeface="Verdana" panose="020B0604030504040204" pitchFamily="34" charset="0"/>
                 <a:cs typeface="Calibri" panose="020F0502020204030204" pitchFamily="34" charset="0"/>
               </a:rPr>
-              <a:t>Dao</a:t>
+              <a:t>DAO</a:t>
             </a:r>
-            <a:endParaRPr lang="pt-BR" sz="4000" dirty="0">
-              <a:solidFill>
-                <a:schemeClr val="bg1">
-                  <a:lumMod val="85000"/>
-                </a:schemeClr>
-              </a:solidFill>
-              <a:latin typeface="Verdana" panose="020B0604030504040204" pitchFamily="34" charset="0"/>
-              <a:ea typeface="Verdana" panose="020B0604030504040204" pitchFamily="34" charset="0"/>
-              <a:cs typeface="Calibri" panose="020F0502020204030204" pitchFamily="34" charset="0"/>
-            </a:endParaRPr>
-          </a:p>
-        </p:txBody>
-      </p:sp>
-      <p:sp>
-        <p:nvSpPr>
-          <p:cNvPr id="10" name="CaixaDeTexto 9">
-            <a:extLst>
-              <a:ext uri="{FF2B5EF4-FFF2-40B4-BE49-F238E27FC236}">
-                <a16:creationId xmlns:a16="http://schemas.microsoft.com/office/drawing/2014/main" id="{E0A68E7E-16D1-4723-8626-A27FB7921E0F}"/>
-              </a:ext>
-            </a:extLst>
-          </p:cNvPr>
-          <p:cNvSpPr txBox="1"/>
-          <p:nvPr/>
-        </p:nvSpPr>
-        <p:spPr>
-          <a:xfrm>
-            <a:off x="7322815" y="174580"/>
-            <a:ext cx="1709122" cy="323165"/>
-          </a:xfrm>
-          <a:prstGeom prst="rect">
-            <a:avLst/>
-          </a:prstGeom>
-          <a:noFill/>
-        </p:spPr>
-        <p:txBody>
-          <a:bodyPr wrap="none" rtlCol="0">
-            <a:spAutoFit/>
-          </a:bodyPr>
-          <a:lstStyle/>
-          <a:p>
-            <a:r>
-              <a:rPr lang="pt-BR" sz="1500" dirty="0">
-                <a:solidFill>
-                  <a:schemeClr val="bg1">
-                    <a:lumMod val="85000"/>
-                  </a:schemeClr>
-                </a:solidFill>
-                <a:latin typeface="Verdana" panose="020B0604030504040204" pitchFamily="34" charset="0"/>
-                <a:ea typeface="Verdana" panose="020B0604030504040204" pitchFamily="34" charset="0"/>
-                <a:cs typeface="Calibri" panose="020F0502020204030204" pitchFamily="34" charset="0"/>
-              </a:rPr>
-              <a:t>Design </a:t>
-            </a:r>
-            <a:r>
-              <a:rPr lang="pt-BR" sz="1500" dirty="0" err="1">
-                <a:solidFill>
-                  <a:schemeClr val="bg1">
-                    <a:lumMod val="85000"/>
-                  </a:schemeClr>
-                </a:solidFill>
-                <a:latin typeface="Verdana" panose="020B0604030504040204" pitchFamily="34" charset="0"/>
-                <a:ea typeface="Verdana" panose="020B0604030504040204" pitchFamily="34" charset="0"/>
-                <a:cs typeface="Calibri" panose="020F0502020204030204" pitchFamily="34" charset="0"/>
-              </a:rPr>
-              <a:t>Patterns</a:t>
-            </a:r>
-            <a:endParaRPr lang="pt-BR" sz="1500" dirty="0">
-              <a:solidFill>
-                <a:schemeClr val="bg1">
-                  <a:lumMod val="85000"/>
-                </a:schemeClr>
-              </a:solidFill>
-              <a:latin typeface="Verdana" panose="020B0604030504040204" pitchFamily="34" charset="0"/>
-              <a:ea typeface="Verdana" panose="020B0604030504040204" pitchFamily="34" charset="0"/>
-              <a:cs typeface="Calibri" panose="020F0502020204030204" pitchFamily="34" charset="0"/>
-            </a:endParaRPr>
           </a:p>
         </p:txBody>
       </p:sp>
@@ -16678,6 +19318,322 @@
 </file>
 
 <file path=ppt/slides/slide5.xml><?xml version="1.0" encoding="utf-8"?>
+<p:sld xmlns:a="http://schemas.openxmlformats.org/drawingml/2006/main" xmlns:r="http://schemas.openxmlformats.org/officeDocument/2006/relationships" xmlns:p="http://schemas.openxmlformats.org/presentationml/2006/main">
+  <p:cSld>
+    <p:bg>
+      <p:bgPr>
+        <a:solidFill>
+          <a:srgbClr val="54416B"/>
+        </a:solidFill>
+        <a:effectLst/>
+      </p:bgPr>
+    </p:bg>
+    <p:spTree>
+      <p:nvGrpSpPr>
+        <p:cNvPr id="1" name="Shape 97"/>
+        <p:cNvGrpSpPr/>
+        <p:nvPr/>
+      </p:nvGrpSpPr>
+      <p:grpSpPr>
+        <a:xfrm>
+          <a:off x="0" y="0"/>
+          <a:ext cx="0" cy="0"/>
+          <a:chOff x="0" y="0"/>
+          <a:chExt cx="0" cy="0"/>
+        </a:xfrm>
+      </p:grpSpPr>
+      <p:pic>
+        <p:nvPicPr>
+          <p:cNvPr id="7" name="Imagem 6">
+            <a:extLst>
+              <a:ext uri="{FF2B5EF4-FFF2-40B4-BE49-F238E27FC236}">
+                <a16:creationId xmlns:a16="http://schemas.microsoft.com/office/drawing/2014/main" id="{D6C112AC-0AED-409F-A046-42B8C81D7BFA}"/>
+              </a:ext>
+            </a:extLst>
+          </p:cNvPr>
+          <p:cNvPicPr>
+            <a:picLocks noChangeAspect="1"/>
+          </p:cNvPicPr>
+          <p:nvPr/>
+        </p:nvPicPr>
+        <p:blipFill>
+          <a:blip r:embed="rId3"/>
+          <a:stretch>
+            <a:fillRect/>
+          </a:stretch>
+        </p:blipFill>
+        <p:spPr>
+          <a:xfrm>
+            <a:off x="632061" y="174580"/>
+            <a:ext cx="746574" cy="358356"/>
+          </a:xfrm>
+          <a:prstGeom prst="rect">
+            <a:avLst/>
+          </a:prstGeom>
+        </p:spPr>
+      </p:pic>
+      <p:sp>
+        <p:nvSpPr>
+          <p:cNvPr id="12" name="Retângulo 11">
+            <a:extLst>
+              <a:ext uri="{FF2B5EF4-FFF2-40B4-BE49-F238E27FC236}">
+                <a16:creationId xmlns:a16="http://schemas.microsoft.com/office/drawing/2014/main" id="{271F94DF-0C4F-4EC5-8956-4969FA418718}"/>
+              </a:ext>
+            </a:extLst>
+          </p:cNvPr>
+          <p:cNvSpPr/>
+          <p:nvPr/>
+        </p:nvSpPr>
+        <p:spPr>
+          <a:xfrm>
+            <a:off x="0" y="0"/>
+            <a:ext cx="450166" cy="6858000"/>
+          </a:xfrm>
+          <a:prstGeom prst="rect">
+            <a:avLst/>
+          </a:prstGeom>
+          <a:gradFill>
+            <a:gsLst>
+              <a:gs pos="0">
+                <a:schemeClr val="accent1">
+                  <a:lumMod val="5000"/>
+                  <a:lumOff val="95000"/>
+                </a:schemeClr>
+              </a:gs>
+              <a:gs pos="100000">
+                <a:srgbClr val="54416B"/>
+              </a:gs>
+            </a:gsLst>
+            <a:path path="circle">
+              <a:fillToRect l="100000" t="100000"/>
+            </a:path>
+          </a:gradFill>
+          <a:ln>
+            <a:noFill/>
+          </a:ln>
+        </p:spPr>
+        <p:style>
+          <a:lnRef idx="2">
+            <a:schemeClr val="accent1">
+              <a:shade val="50000"/>
+            </a:schemeClr>
+          </a:lnRef>
+          <a:fillRef idx="1">
+            <a:schemeClr val="accent1"/>
+          </a:fillRef>
+          <a:effectRef idx="0">
+            <a:schemeClr val="accent1"/>
+          </a:effectRef>
+          <a:fontRef idx="minor">
+            <a:schemeClr val="lt1"/>
+          </a:fontRef>
+        </p:style>
+        <p:txBody>
+          <a:bodyPr rtlCol="0" anchor="ctr"/>
+          <a:lstStyle/>
+          <a:p>
+            <a:pPr algn="ctr"/>
+            <a:endParaRPr lang="pt-BR"/>
+          </a:p>
+        </p:txBody>
+      </p:sp>
+      <p:pic>
+        <p:nvPicPr>
+          <p:cNvPr id="13" name="Imagem 12">
+            <a:extLst>
+              <a:ext uri="{FF2B5EF4-FFF2-40B4-BE49-F238E27FC236}">
+                <a16:creationId xmlns:a16="http://schemas.microsoft.com/office/drawing/2014/main" id="{445294E5-3ADA-46DE-9D79-9BCEAAF12DBB}"/>
+              </a:ext>
+            </a:extLst>
+          </p:cNvPr>
+          <p:cNvPicPr>
+            <a:picLocks noChangeAspect="1"/>
+          </p:cNvPicPr>
+          <p:nvPr/>
+        </p:nvPicPr>
+        <p:blipFill>
+          <a:blip r:embed="rId3"/>
+          <a:stretch>
+            <a:fillRect/>
+          </a:stretch>
+        </p:blipFill>
+        <p:spPr>
+          <a:xfrm rot="16200000">
+            <a:off x="-148204" y="6213725"/>
+            <a:ext cx="746574" cy="358356"/>
+          </a:xfrm>
+          <a:prstGeom prst="rect">
+            <a:avLst/>
+          </a:prstGeom>
+        </p:spPr>
+      </p:pic>
+      <p:sp>
+        <p:nvSpPr>
+          <p:cNvPr id="14" name="CaixaDeTexto 13">
+            <a:extLst>
+              <a:ext uri="{FF2B5EF4-FFF2-40B4-BE49-F238E27FC236}">
+                <a16:creationId xmlns:a16="http://schemas.microsoft.com/office/drawing/2014/main" id="{F0069CE5-7C5D-4662-AABB-EB02AB282D94}"/>
+              </a:ext>
+            </a:extLst>
+          </p:cNvPr>
+          <p:cNvSpPr txBox="1"/>
+          <p:nvPr/>
+        </p:nvSpPr>
+        <p:spPr>
+          <a:xfrm rot="16200000">
+            <a:off x="-2323823" y="3225011"/>
+            <a:ext cx="5097813" cy="307777"/>
+          </a:xfrm>
+          <a:prstGeom prst="rect">
+            <a:avLst/>
+          </a:prstGeom>
+          <a:noFill/>
+        </p:spPr>
+        <p:txBody>
+          <a:bodyPr wrap="square" rtlCol="0">
+            <a:spAutoFit/>
+          </a:bodyPr>
+          <a:lstStyle/>
+          <a:p>
+            <a:r>
+              <a:rPr lang="pt-BR" dirty="0">
+                <a:latin typeface="Calibri" panose="020F0502020204030204" pitchFamily="34" charset="0"/>
+                <a:cs typeface="Calibri" panose="020F0502020204030204" pitchFamily="34" charset="0"/>
+              </a:rPr>
+              <a:t>FAI - Centro de Ensino Superior em Gestão, Tecnologia e Educação</a:t>
+            </a:r>
+          </a:p>
+        </p:txBody>
+      </p:sp>
+      <p:cxnSp>
+        <p:nvCxnSpPr>
+          <p:cNvPr id="16" name="Conector reto 15">
+            <a:extLst>
+              <a:ext uri="{FF2B5EF4-FFF2-40B4-BE49-F238E27FC236}">
+                <a16:creationId xmlns:a16="http://schemas.microsoft.com/office/drawing/2014/main" id="{6116879A-0ED7-47C5-A7F1-3BE9B9E35DD5}"/>
+              </a:ext>
+            </a:extLst>
+          </p:cNvPr>
+          <p:cNvCxnSpPr>
+            <a:cxnSpLocks/>
+          </p:cNvCxnSpPr>
+          <p:nvPr/>
+        </p:nvCxnSpPr>
+        <p:spPr>
+          <a:xfrm>
+            <a:off x="632061" y="633045"/>
+            <a:ext cx="8258721" cy="0"/>
+          </a:xfrm>
+          <a:prstGeom prst="line">
+            <a:avLst/>
+          </a:prstGeom>
+          <a:ln>
+            <a:gradFill flip="none" rotWithShape="1">
+              <a:gsLst>
+                <a:gs pos="0">
+                  <a:schemeClr val="accent3">
+                    <a:lumMod val="75000"/>
+                  </a:schemeClr>
+                </a:gs>
+                <a:gs pos="100000">
+                  <a:srgbClr val="4F6228"/>
+                </a:gs>
+              </a:gsLst>
+              <a:lin ang="0" scaled="1"/>
+              <a:tileRect/>
+            </a:gradFill>
+          </a:ln>
+        </p:spPr>
+        <p:style>
+          <a:lnRef idx="1">
+            <a:schemeClr val="accent1"/>
+          </a:lnRef>
+          <a:fillRef idx="0">
+            <a:schemeClr val="accent1"/>
+          </a:fillRef>
+          <a:effectRef idx="0">
+            <a:schemeClr val="accent1"/>
+          </a:effectRef>
+          <a:fontRef idx="minor">
+            <a:schemeClr val="tx1"/>
+          </a:fontRef>
+        </p:style>
+      </p:cxnSp>
+      <p:sp>
+        <p:nvSpPr>
+          <p:cNvPr id="9" name="CaixaDeTexto 8">
+            <a:extLst>
+              <a:ext uri="{FF2B5EF4-FFF2-40B4-BE49-F238E27FC236}">
+                <a16:creationId xmlns:a16="http://schemas.microsoft.com/office/drawing/2014/main" id="{E21B1250-A8A1-4771-8929-41EC66F5748E}"/>
+              </a:ext>
+            </a:extLst>
+          </p:cNvPr>
+          <p:cNvSpPr txBox="1"/>
+          <p:nvPr/>
+        </p:nvSpPr>
+        <p:spPr>
+          <a:xfrm>
+            <a:off x="1195262" y="3024956"/>
+            <a:ext cx="7132318" cy="707886"/>
+          </a:xfrm>
+          <a:prstGeom prst="rect">
+            <a:avLst/>
+          </a:prstGeom>
+          <a:noFill/>
+        </p:spPr>
+        <p:txBody>
+          <a:bodyPr wrap="square" rtlCol="0">
+            <a:spAutoFit/>
+          </a:bodyPr>
+          <a:lstStyle/>
+          <a:p>
+            <a:pPr algn="ctr">
+              <a:buClr>
+                <a:schemeClr val="bg1">
+                  <a:lumMod val="85000"/>
+                </a:schemeClr>
+              </a:buClr>
+            </a:pPr>
+            <a:r>
+              <a:rPr lang="pt-BR" sz="4000" dirty="0" err="1">
+                <a:solidFill>
+                  <a:schemeClr val="bg1">
+                    <a:lumMod val="85000"/>
+                  </a:schemeClr>
+                </a:solidFill>
+                <a:latin typeface="Verdana" panose="020B0604030504040204" pitchFamily="34" charset="0"/>
+                <a:ea typeface="Verdana" panose="020B0604030504040204" pitchFamily="34" charset="0"/>
+                <a:cs typeface="Calibri" panose="020F0502020204030204" pitchFamily="34" charset="0"/>
+              </a:rPr>
+              <a:t>Singleton</a:t>
+            </a:r>
+            <a:endParaRPr lang="pt-BR" sz="4000" dirty="0">
+              <a:solidFill>
+                <a:schemeClr val="bg1">
+                  <a:lumMod val="85000"/>
+                </a:schemeClr>
+              </a:solidFill>
+              <a:latin typeface="Verdana" panose="020B0604030504040204" pitchFamily="34" charset="0"/>
+              <a:ea typeface="Verdana" panose="020B0604030504040204" pitchFamily="34" charset="0"/>
+              <a:cs typeface="Calibri" panose="020F0502020204030204" pitchFamily="34" charset="0"/>
+            </a:endParaRPr>
+          </a:p>
+        </p:txBody>
+      </p:sp>
+    </p:spTree>
+    <p:extLst>
+      <p:ext uri="{BB962C8B-B14F-4D97-AF65-F5344CB8AC3E}">
+        <p14:creationId xmlns:p14="http://schemas.microsoft.com/office/powerpoint/2010/main" val="3664821756"/>
+      </p:ext>
+    </p:extLst>
+  </p:cSld>
+  <p:clrMapOvr>
+    <a:masterClrMapping/>
+  </p:clrMapOvr>
+</p:sld>
+</file>
+
+<file path=ppt/slides/slide6.xml><?xml version="1.0" encoding="utf-8"?>
 <p:sld xmlns:a="http://schemas.openxmlformats.org/drawingml/2006/main" xmlns:r="http://schemas.openxmlformats.org/officeDocument/2006/relationships" xmlns:p="http://schemas.openxmlformats.org/presentationml/2006/main">
   <p:cSld>
     <p:bg>
@@ -16951,10 +19907,10 @@
       </p:pic>
       <p:sp>
         <p:nvSpPr>
-          <p:cNvPr id="15" name="CaixaDeTexto 14">
+          <p:cNvPr id="9" name="CaixaDeTexto 8">
             <a:extLst>
               <a:ext uri="{FF2B5EF4-FFF2-40B4-BE49-F238E27FC236}">
-                <a16:creationId xmlns:a16="http://schemas.microsoft.com/office/drawing/2014/main" id="{B2BEDC5B-813A-4EA1-9AC0-5BE4D4F689E6}"/>
+                <a16:creationId xmlns:a16="http://schemas.microsoft.com/office/drawing/2014/main" id="{34E426BF-E0D7-4BE4-9665-6F4F04862E92}"/>
               </a:ext>
             </a:extLst>
           </p:cNvPr>
@@ -16963,8 +19919,8 @@
         </p:nvSpPr>
         <p:spPr>
           <a:xfrm>
-            <a:off x="7905914" y="174580"/>
-            <a:ext cx="1091966" cy="323165"/>
+            <a:off x="5913037" y="5439114"/>
+            <a:ext cx="2091276" cy="553998"/>
           </a:xfrm>
           <a:prstGeom prst="rect">
             <a:avLst/>
@@ -16972,13 +19928,20 @@
           <a:noFill/>
         </p:spPr>
         <p:txBody>
-          <a:bodyPr wrap="none" rtlCol="0">
+          <a:bodyPr wrap="square" rtlCol="0">
             <a:spAutoFit/>
           </a:bodyPr>
           <a:lstStyle/>
           <a:p>
+            <a:pPr algn="ctr">
+              <a:buClr>
+                <a:schemeClr val="bg1">
+                  <a:lumMod val="85000"/>
+                </a:schemeClr>
+              </a:buClr>
+            </a:pPr>
             <a:r>
-              <a:rPr lang="pt-BR" sz="1500" dirty="0" err="1">
+              <a:rPr lang="pt-BR" sz="3000" dirty="0" err="1">
                 <a:solidFill>
                   <a:schemeClr val="bg1">
                     <a:lumMod val="85000"/>
@@ -16990,7 +19953,7 @@
               </a:rPr>
               <a:t>Singleton</a:t>
             </a:r>
-            <a:endParaRPr lang="pt-BR" sz="1500" dirty="0">
+            <a:endParaRPr lang="pt-BR" sz="3000" dirty="0">
               <a:solidFill>
                 <a:schemeClr val="bg1">
                   <a:lumMod val="85000"/>
@@ -17016,7 +19979,323 @@
 </p:sld>
 </file>
 
-<file path=ppt/slides/slide6.xml><?xml version="1.0" encoding="utf-8"?>
+<file path=ppt/slides/slide7.xml><?xml version="1.0" encoding="utf-8"?>
+<p:sld xmlns:a="http://schemas.openxmlformats.org/drawingml/2006/main" xmlns:r="http://schemas.openxmlformats.org/officeDocument/2006/relationships" xmlns:p="http://schemas.openxmlformats.org/presentationml/2006/main">
+  <p:cSld>
+    <p:bg>
+      <p:bgPr>
+        <a:solidFill>
+          <a:srgbClr val="54416B"/>
+        </a:solidFill>
+        <a:effectLst/>
+      </p:bgPr>
+    </p:bg>
+    <p:spTree>
+      <p:nvGrpSpPr>
+        <p:cNvPr id="1" name="Shape 97"/>
+        <p:cNvGrpSpPr/>
+        <p:nvPr/>
+      </p:nvGrpSpPr>
+      <p:grpSpPr>
+        <a:xfrm>
+          <a:off x="0" y="0"/>
+          <a:ext cx="0" cy="0"/>
+          <a:chOff x="0" y="0"/>
+          <a:chExt cx="0" cy="0"/>
+        </a:xfrm>
+      </p:grpSpPr>
+      <p:pic>
+        <p:nvPicPr>
+          <p:cNvPr id="7" name="Imagem 6">
+            <a:extLst>
+              <a:ext uri="{FF2B5EF4-FFF2-40B4-BE49-F238E27FC236}">
+                <a16:creationId xmlns:a16="http://schemas.microsoft.com/office/drawing/2014/main" id="{D6C112AC-0AED-409F-A046-42B8C81D7BFA}"/>
+              </a:ext>
+            </a:extLst>
+          </p:cNvPr>
+          <p:cNvPicPr>
+            <a:picLocks noChangeAspect="1"/>
+          </p:cNvPicPr>
+          <p:nvPr/>
+        </p:nvPicPr>
+        <p:blipFill>
+          <a:blip r:embed="rId3"/>
+          <a:stretch>
+            <a:fillRect/>
+          </a:stretch>
+        </p:blipFill>
+        <p:spPr>
+          <a:xfrm>
+            <a:off x="632061" y="174580"/>
+            <a:ext cx="746574" cy="358356"/>
+          </a:xfrm>
+          <a:prstGeom prst="rect">
+            <a:avLst/>
+          </a:prstGeom>
+        </p:spPr>
+      </p:pic>
+      <p:sp>
+        <p:nvSpPr>
+          <p:cNvPr id="12" name="Retângulo 11">
+            <a:extLst>
+              <a:ext uri="{FF2B5EF4-FFF2-40B4-BE49-F238E27FC236}">
+                <a16:creationId xmlns:a16="http://schemas.microsoft.com/office/drawing/2014/main" id="{271F94DF-0C4F-4EC5-8956-4969FA418718}"/>
+              </a:ext>
+            </a:extLst>
+          </p:cNvPr>
+          <p:cNvSpPr/>
+          <p:nvPr/>
+        </p:nvSpPr>
+        <p:spPr>
+          <a:xfrm>
+            <a:off x="0" y="0"/>
+            <a:ext cx="450166" cy="6858000"/>
+          </a:xfrm>
+          <a:prstGeom prst="rect">
+            <a:avLst/>
+          </a:prstGeom>
+          <a:gradFill>
+            <a:gsLst>
+              <a:gs pos="0">
+                <a:schemeClr val="accent1">
+                  <a:lumMod val="5000"/>
+                  <a:lumOff val="95000"/>
+                </a:schemeClr>
+              </a:gs>
+              <a:gs pos="100000">
+                <a:srgbClr val="54416B"/>
+              </a:gs>
+            </a:gsLst>
+            <a:path path="circle">
+              <a:fillToRect l="100000" t="100000"/>
+            </a:path>
+          </a:gradFill>
+          <a:ln>
+            <a:noFill/>
+          </a:ln>
+        </p:spPr>
+        <p:style>
+          <a:lnRef idx="2">
+            <a:schemeClr val="accent1">
+              <a:shade val="50000"/>
+            </a:schemeClr>
+          </a:lnRef>
+          <a:fillRef idx="1">
+            <a:schemeClr val="accent1"/>
+          </a:fillRef>
+          <a:effectRef idx="0">
+            <a:schemeClr val="accent1"/>
+          </a:effectRef>
+          <a:fontRef idx="minor">
+            <a:schemeClr val="lt1"/>
+          </a:fontRef>
+        </p:style>
+        <p:txBody>
+          <a:bodyPr rtlCol="0" anchor="ctr"/>
+          <a:lstStyle/>
+          <a:p>
+            <a:pPr algn="ctr"/>
+            <a:endParaRPr lang="pt-BR"/>
+          </a:p>
+        </p:txBody>
+      </p:sp>
+      <p:pic>
+        <p:nvPicPr>
+          <p:cNvPr id="13" name="Imagem 12">
+            <a:extLst>
+              <a:ext uri="{FF2B5EF4-FFF2-40B4-BE49-F238E27FC236}">
+                <a16:creationId xmlns:a16="http://schemas.microsoft.com/office/drawing/2014/main" id="{445294E5-3ADA-46DE-9D79-9BCEAAF12DBB}"/>
+              </a:ext>
+            </a:extLst>
+          </p:cNvPr>
+          <p:cNvPicPr>
+            <a:picLocks noChangeAspect="1"/>
+          </p:cNvPicPr>
+          <p:nvPr/>
+        </p:nvPicPr>
+        <p:blipFill>
+          <a:blip r:embed="rId3"/>
+          <a:stretch>
+            <a:fillRect/>
+          </a:stretch>
+        </p:blipFill>
+        <p:spPr>
+          <a:xfrm rot="16200000">
+            <a:off x="-148204" y="6213725"/>
+            <a:ext cx="746574" cy="358356"/>
+          </a:xfrm>
+          <a:prstGeom prst="rect">
+            <a:avLst/>
+          </a:prstGeom>
+        </p:spPr>
+      </p:pic>
+      <p:sp>
+        <p:nvSpPr>
+          <p:cNvPr id="14" name="CaixaDeTexto 13">
+            <a:extLst>
+              <a:ext uri="{FF2B5EF4-FFF2-40B4-BE49-F238E27FC236}">
+                <a16:creationId xmlns:a16="http://schemas.microsoft.com/office/drawing/2014/main" id="{F0069CE5-7C5D-4662-AABB-EB02AB282D94}"/>
+              </a:ext>
+            </a:extLst>
+          </p:cNvPr>
+          <p:cNvSpPr txBox="1"/>
+          <p:nvPr/>
+        </p:nvSpPr>
+        <p:spPr>
+          <a:xfrm rot="16200000">
+            <a:off x="-2323823" y="3225011"/>
+            <a:ext cx="5097813" cy="307777"/>
+          </a:xfrm>
+          <a:prstGeom prst="rect">
+            <a:avLst/>
+          </a:prstGeom>
+          <a:noFill/>
+        </p:spPr>
+        <p:txBody>
+          <a:bodyPr wrap="square" rtlCol="0">
+            <a:spAutoFit/>
+          </a:bodyPr>
+          <a:lstStyle/>
+          <a:p>
+            <a:r>
+              <a:rPr lang="pt-BR" dirty="0">
+                <a:latin typeface="Calibri" panose="020F0502020204030204" pitchFamily="34" charset="0"/>
+                <a:cs typeface="Calibri" panose="020F0502020204030204" pitchFamily="34" charset="0"/>
+              </a:rPr>
+              <a:t>FAI - Centro de Ensino Superior em Gestão, Tecnologia e Educação</a:t>
+            </a:r>
+          </a:p>
+        </p:txBody>
+      </p:sp>
+      <p:cxnSp>
+        <p:nvCxnSpPr>
+          <p:cNvPr id="16" name="Conector reto 15">
+            <a:extLst>
+              <a:ext uri="{FF2B5EF4-FFF2-40B4-BE49-F238E27FC236}">
+                <a16:creationId xmlns:a16="http://schemas.microsoft.com/office/drawing/2014/main" id="{6116879A-0ED7-47C5-A7F1-3BE9B9E35DD5}"/>
+              </a:ext>
+            </a:extLst>
+          </p:cNvPr>
+          <p:cNvCxnSpPr>
+            <a:cxnSpLocks/>
+          </p:cNvCxnSpPr>
+          <p:nvPr/>
+        </p:nvCxnSpPr>
+        <p:spPr>
+          <a:xfrm>
+            <a:off x="632061" y="633045"/>
+            <a:ext cx="8258721" cy="0"/>
+          </a:xfrm>
+          <a:prstGeom prst="line">
+            <a:avLst/>
+          </a:prstGeom>
+          <a:ln>
+            <a:gradFill flip="none" rotWithShape="1">
+              <a:gsLst>
+                <a:gs pos="0">
+                  <a:schemeClr val="accent3">
+                    <a:lumMod val="75000"/>
+                  </a:schemeClr>
+                </a:gs>
+                <a:gs pos="100000">
+                  <a:srgbClr val="4F6228"/>
+                </a:gs>
+              </a:gsLst>
+              <a:lin ang="0" scaled="1"/>
+              <a:tileRect/>
+            </a:gradFill>
+          </a:ln>
+        </p:spPr>
+        <p:style>
+          <a:lnRef idx="1">
+            <a:schemeClr val="accent1"/>
+          </a:lnRef>
+          <a:fillRef idx="0">
+            <a:schemeClr val="accent1"/>
+          </a:fillRef>
+          <a:effectRef idx="0">
+            <a:schemeClr val="accent1"/>
+          </a:effectRef>
+          <a:fontRef idx="minor">
+            <a:schemeClr val="tx1"/>
+          </a:fontRef>
+        </p:style>
+      </p:cxnSp>
+      <p:sp>
+        <p:nvSpPr>
+          <p:cNvPr id="9" name="CaixaDeTexto 8">
+            <a:extLst>
+              <a:ext uri="{FF2B5EF4-FFF2-40B4-BE49-F238E27FC236}">
+                <a16:creationId xmlns:a16="http://schemas.microsoft.com/office/drawing/2014/main" id="{E21B1250-A8A1-4771-8929-41EC66F5748E}"/>
+              </a:ext>
+            </a:extLst>
+          </p:cNvPr>
+          <p:cNvSpPr txBox="1"/>
+          <p:nvPr/>
+        </p:nvSpPr>
+        <p:spPr>
+          <a:xfrm>
+            <a:off x="1195262" y="3024956"/>
+            <a:ext cx="7132318" cy="707886"/>
+          </a:xfrm>
+          <a:prstGeom prst="rect">
+            <a:avLst/>
+          </a:prstGeom>
+          <a:noFill/>
+        </p:spPr>
+        <p:txBody>
+          <a:bodyPr wrap="square" rtlCol="0">
+            <a:spAutoFit/>
+          </a:bodyPr>
+          <a:lstStyle/>
+          <a:p>
+            <a:pPr algn="ctr">
+              <a:buClr>
+                <a:schemeClr val="bg1">
+                  <a:lumMod val="85000"/>
+                </a:schemeClr>
+              </a:buClr>
+            </a:pPr>
+            <a:r>
+              <a:rPr lang="pt-BR" sz="4000" dirty="0" err="1">
+                <a:solidFill>
+                  <a:schemeClr val="bg1">
+                    <a:lumMod val="85000"/>
+                  </a:schemeClr>
+                </a:solidFill>
+                <a:latin typeface="Verdana" panose="020B0604030504040204" pitchFamily="34" charset="0"/>
+                <a:ea typeface="Verdana" panose="020B0604030504040204" pitchFamily="34" charset="0"/>
+                <a:cs typeface="Calibri" panose="020F0502020204030204" pitchFamily="34" charset="0"/>
+              </a:rPr>
+              <a:t>Factory</a:t>
+            </a:r>
+            <a:endParaRPr lang="pt-BR" sz="4000" dirty="0">
+              <a:solidFill>
+                <a:schemeClr val="bg1">
+                  <a:lumMod val="85000"/>
+                </a:schemeClr>
+              </a:solidFill>
+              <a:latin typeface="Verdana" panose="020B0604030504040204" pitchFamily="34" charset="0"/>
+              <a:ea typeface="Verdana" panose="020B0604030504040204" pitchFamily="34" charset="0"/>
+              <a:cs typeface="Calibri" panose="020F0502020204030204" pitchFamily="34" charset="0"/>
+            </a:endParaRPr>
+          </a:p>
+        </p:txBody>
+      </p:sp>
+    </p:spTree>
+    <p:extLst>
+      <p:ext uri="{BB962C8B-B14F-4D97-AF65-F5344CB8AC3E}">
+        <p14:creationId xmlns:p14="http://schemas.microsoft.com/office/powerpoint/2010/main" val="4029982949"/>
+      </p:ext>
+    </p:extLst>
+  </p:cSld>
+  <p:clrMapOvr>
+    <a:masterClrMapping/>
+  </p:clrMapOvr>
+</p:sld>
+</file>
+
+<file path=ppt/slides/slide8.xml><?xml version="1.0" encoding="utf-8"?>
 <p:sld xmlns:a="http://schemas.openxmlformats.org/drawingml/2006/main" xmlns:r="http://schemas.openxmlformats.org/officeDocument/2006/relationships" xmlns:p="http://schemas.openxmlformats.org/presentationml/2006/main">
   <p:cSld>
     <p:bg>
@@ -17290,10 +20569,10 @@
       </p:pic>
       <p:sp>
         <p:nvSpPr>
-          <p:cNvPr id="10" name="CaixaDeTexto 9">
+          <p:cNvPr id="9" name="CaixaDeTexto 8">
             <a:extLst>
               <a:ext uri="{FF2B5EF4-FFF2-40B4-BE49-F238E27FC236}">
-                <a16:creationId xmlns:a16="http://schemas.microsoft.com/office/drawing/2014/main" id="{0601F981-1C43-41A1-AFD3-A6D526BE9E2F}"/>
+                <a16:creationId xmlns:a16="http://schemas.microsoft.com/office/drawing/2014/main" id="{B0D03BB2-1854-463A-B1ED-B61CAF4A6D17}"/>
               </a:ext>
             </a:extLst>
           </p:cNvPr>
@@ -17302,8 +20581,8 @@
         </p:nvSpPr>
         <p:spPr>
           <a:xfrm>
-            <a:off x="8038436" y="174580"/>
-            <a:ext cx="899605" cy="323165"/>
+            <a:off x="6248383" y="5373808"/>
+            <a:ext cx="1808939" cy="553998"/>
           </a:xfrm>
           <a:prstGeom prst="rect">
             <a:avLst/>
@@ -17311,13 +20590,20 @@
           <a:noFill/>
         </p:spPr>
         <p:txBody>
-          <a:bodyPr wrap="none" rtlCol="0">
+          <a:bodyPr wrap="square" rtlCol="0">
             <a:spAutoFit/>
           </a:bodyPr>
           <a:lstStyle/>
           <a:p>
+            <a:pPr algn="ctr">
+              <a:buClr>
+                <a:schemeClr val="bg1">
+                  <a:lumMod val="85000"/>
+                </a:schemeClr>
+              </a:buClr>
+            </a:pPr>
             <a:r>
-              <a:rPr lang="pt-BR" sz="1500" dirty="0" err="1">
+              <a:rPr lang="pt-BR" sz="3000" dirty="0" err="1">
                 <a:solidFill>
                   <a:schemeClr val="bg1">
                     <a:lumMod val="85000"/>
@@ -17329,7 +20615,7 @@
               </a:rPr>
               <a:t>Factory</a:t>
             </a:r>
-            <a:endParaRPr lang="pt-BR" sz="1500" dirty="0">
+            <a:endParaRPr lang="pt-BR" sz="3000" dirty="0">
               <a:solidFill>
                 <a:schemeClr val="bg1">
                   <a:lumMod val="85000"/>
@@ -17346,6 +20632,312 @@
     <p:extLst>
       <p:ext uri="{BB962C8B-B14F-4D97-AF65-F5344CB8AC3E}">
         <p14:creationId xmlns:p14="http://schemas.microsoft.com/office/powerpoint/2010/main" val="1909159283"/>
+      </p:ext>
+    </p:extLst>
+  </p:cSld>
+  <p:clrMapOvr>
+    <a:masterClrMapping/>
+  </p:clrMapOvr>
+</p:sld>
+</file>
+
+<file path=ppt/slides/slide9.xml><?xml version="1.0" encoding="utf-8"?>
+<p:sld xmlns:a="http://schemas.openxmlformats.org/drawingml/2006/main" xmlns:r="http://schemas.openxmlformats.org/officeDocument/2006/relationships" xmlns:p="http://schemas.openxmlformats.org/presentationml/2006/main">
+  <p:cSld>
+    <p:bg>
+      <p:bgPr>
+        <a:solidFill>
+          <a:srgbClr val="54416B"/>
+        </a:solidFill>
+        <a:effectLst/>
+      </p:bgPr>
+    </p:bg>
+    <p:spTree>
+      <p:nvGrpSpPr>
+        <p:cNvPr id="1" name="Shape 97"/>
+        <p:cNvGrpSpPr/>
+        <p:nvPr/>
+      </p:nvGrpSpPr>
+      <p:grpSpPr>
+        <a:xfrm>
+          <a:off x="0" y="0"/>
+          <a:ext cx="0" cy="0"/>
+          <a:chOff x="0" y="0"/>
+          <a:chExt cx="0" cy="0"/>
+        </a:xfrm>
+      </p:grpSpPr>
+      <p:pic>
+        <p:nvPicPr>
+          <p:cNvPr id="7" name="Imagem 6">
+            <a:extLst>
+              <a:ext uri="{FF2B5EF4-FFF2-40B4-BE49-F238E27FC236}">
+                <a16:creationId xmlns:a16="http://schemas.microsoft.com/office/drawing/2014/main" id="{D6C112AC-0AED-409F-A046-42B8C81D7BFA}"/>
+              </a:ext>
+            </a:extLst>
+          </p:cNvPr>
+          <p:cNvPicPr>
+            <a:picLocks noChangeAspect="1"/>
+          </p:cNvPicPr>
+          <p:nvPr/>
+        </p:nvPicPr>
+        <p:blipFill>
+          <a:blip r:embed="rId3"/>
+          <a:stretch>
+            <a:fillRect/>
+          </a:stretch>
+        </p:blipFill>
+        <p:spPr>
+          <a:xfrm>
+            <a:off x="632061" y="174580"/>
+            <a:ext cx="746574" cy="358356"/>
+          </a:xfrm>
+          <a:prstGeom prst="rect">
+            <a:avLst/>
+          </a:prstGeom>
+        </p:spPr>
+      </p:pic>
+      <p:sp>
+        <p:nvSpPr>
+          <p:cNvPr id="12" name="Retângulo 11">
+            <a:extLst>
+              <a:ext uri="{FF2B5EF4-FFF2-40B4-BE49-F238E27FC236}">
+                <a16:creationId xmlns:a16="http://schemas.microsoft.com/office/drawing/2014/main" id="{271F94DF-0C4F-4EC5-8956-4969FA418718}"/>
+              </a:ext>
+            </a:extLst>
+          </p:cNvPr>
+          <p:cNvSpPr/>
+          <p:nvPr/>
+        </p:nvSpPr>
+        <p:spPr>
+          <a:xfrm>
+            <a:off x="0" y="0"/>
+            <a:ext cx="450166" cy="6858000"/>
+          </a:xfrm>
+          <a:prstGeom prst="rect">
+            <a:avLst/>
+          </a:prstGeom>
+          <a:gradFill>
+            <a:gsLst>
+              <a:gs pos="0">
+                <a:schemeClr val="accent1">
+                  <a:lumMod val="5000"/>
+                  <a:lumOff val="95000"/>
+                </a:schemeClr>
+              </a:gs>
+              <a:gs pos="100000">
+                <a:srgbClr val="54416B"/>
+              </a:gs>
+            </a:gsLst>
+            <a:path path="circle">
+              <a:fillToRect l="100000" t="100000"/>
+            </a:path>
+          </a:gradFill>
+          <a:ln>
+            <a:noFill/>
+          </a:ln>
+        </p:spPr>
+        <p:style>
+          <a:lnRef idx="2">
+            <a:schemeClr val="accent1">
+              <a:shade val="50000"/>
+            </a:schemeClr>
+          </a:lnRef>
+          <a:fillRef idx="1">
+            <a:schemeClr val="accent1"/>
+          </a:fillRef>
+          <a:effectRef idx="0">
+            <a:schemeClr val="accent1"/>
+          </a:effectRef>
+          <a:fontRef idx="minor">
+            <a:schemeClr val="lt1"/>
+          </a:fontRef>
+        </p:style>
+        <p:txBody>
+          <a:bodyPr rtlCol="0" anchor="ctr"/>
+          <a:lstStyle/>
+          <a:p>
+            <a:pPr algn="ctr"/>
+            <a:endParaRPr lang="pt-BR"/>
+          </a:p>
+        </p:txBody>
+      </p:sp>
+      <p:pic>
+        <p:nvPicPr>
+          <p:cNvPr id="13" name="Imagem 12">
+            <a:extLst>
+              <a:ext uri="{FF2B5EF4-FFF2-40B4-BE49-F238E27FC236}">
+                <a16:creationId xmlns:a16="http://schemas.microsoft.com/office/drawing/2014/main" id="{445294E5-3ADA-46DE-9D79-9BCEAAF12DBB}"/>
+              </a:ext>
+            </a:extLst>
+          </p:cNvPr>
+          <p:cNvPicPr>
+            <a:picLocks noChangeAspect="1"/>
+          </p:cNvPicPr>
+          <p:nvPr/>
+        </p:nvPicPr>
+        <p:blipFill>
+          <a:blip r:embed="rId3"/>
+          <a:stretch>
+            <a:fillRect/>
+          </a:stretch>
+        </p:blipFill>
+        <p:spPr>
+          <a:xfrm rot="16200000">
+            <a:off x="-148204" y="6213725"/>
+            <a:ext cx="746574" cy="358356"/>
+          </a:xfrm>
+          <a:prstGeom prst="rect">
+            <a:avLst/>
+          </a:prstGeom>
+        </p:spPr>
+      </p:pic>
+      <p:sp>
+        <p:nvSpPr>
+          <p:cNvPr id="14" name="CaixaDeTexto 13">
+            <a:extLst>
+              <a:ext uri="{FF2B5EF4-FFF2-40B4-BE49-F238E27FC236}">
+                <a16:creationId xmlns:a16="http://schemas.microsoft.com/office/drawing/2014/main" id="{F0069CE5-7C5D-4662-AABB-EB02AB282D94}"/>
+              </a:ext>
+            </a:extLst>
+          </p:cNvPr>
+          <p:cNvSpPr txBox="1"/>
+          <p:nvPr/>
+        </p:nvSpPr>
+        <p:spPr>
+          <a:xfrm rot="16200000">
+            <a:off x="-2323823" y="3225011"/>
+            <a:ext cx="5097813" cy="307777"/>
+          </a:xfrm>
+          <a:prstGeom prst="rect">
+            <a:avLst/>
+          </a:prstGeom>
+          <a:noFill/>
+        </p:spPr>
+        <p:txBody>
+          <a:bodyPr wrap="square" rtlCol="0">
+            <a:spAutoFit/>
+          </a:bodyPr>
+          <a:lstStyle/>
+          <a:p>
+            <a:r>
+              <a:rPr lang="pt-BR" dirty="0">
+                <a:latin typeface="Calibri" panose="020F0502020204030204" pitchFamily="34" charset="0"/>
+                <a:cs typeface="Calibri" panose="020F0502020204030204" pitchFamily="34" charset="0"/>
+              </a:rPr>
+              <a:t>FAI - Centro de Ensino Superior em Gestão, Tecnologia e Educação</a:t>
+            </a:r>
+          </a:p>
+        </p:txBody>
+      </p:sp>
+      <p:cxnSp>
+        <p:nvCxnSpPr>
+          <p:cNvPr id="16" name="Conector reto 15">
+            <a:extLst>
+              <a:ext uri="{FF2B5EF4-FFF2-40B4-BE49-F238E27FC236}">
+                <a16:creationId xmlns:a16="http://schemas.microsoft.com/office/drawing/2014/main" id="{6116879A-0ED7-47C5-A7F1-3BE9B9E35DD5}"/>
+              </a:ext>
+            </a:extLst>
+          </p:cNvPr>
+          <p:cNvCxnSpPr>
+            <a:cxnSpLocks/>
+          </p:cNvCxnSpPr>
+          <p:nvPr/>
+        </p:nvCxnSpPr>
+        <p:spPr>
+          <a:xfrm>
+            <a:off x="632061" y="633045"/>
+            <a:ext cx="8258721" cy="0"/>
+          </a:xfrm>
+          <a:prstGeom prst="line">
+            <a:avLst/>
+          </a:prstGeom>
+          <a:ln>
+            <a:gradFill flip="none" rotWithShape="1">
+              <a:gsLst>
+                <a:gs pos="0">
+                  <a:schemeClr val="accent3">
+                    <a:lumMod val="75000"/>
+                  </a:schemeClr>
+                </a:gs>
+                <a:gs pos="100000">
+                  <a:srgbClr val="4F6228"/>
+                </a:gs>
+              </a:gsLst>
+              <a:lin ang="0" scaled="1"/>
+              <a:tileRect/>
+            </a:gradFill>
+          </a:ln>
+        </p:spPr>
+        <p:style>
+          <a:lnRef idx="1">
+            <a:schemeClr val="accent1"/>
+          </a:lnRef>
+          <a:fillRef idx="0">
+            <a:schemeClr val="accent1"/>
+          </a:fillRef>
+          <a:effectRef idx="0">
+            <a:schemeClr val="accent1"/>
+          </a:effectRef>
+          <a:fontRef idx="minor">
+            <a:schemeClr val="tx1"/>
+          </a:fontRef>
+        </p:style>
+      </p:cxnSp>
+      <p:sp>
+        <p:nvSpPr>
+          <p:cNvPr id="9" name="CaixaDeTexto 8">
+            <a:extLst>
+              <a:ext uri="{FF2B5EF4-FFF2-40B4-BE49-F238E27FC236}">
+                <a16:creationId xmlns:a16="http://schemas.microsoft.com/office/drawing/2014/main" id="{E21B1250-A8A1-4771-8929-41EC66F5748E}"/>
+              </a:ext>
+            </a:extLst>
+          </p:cNvPr>
+          <p:cNvSpPr txBox="1"/>
+          <p:nvPr/>
+        </p:nvSpPr>
+        <p:spPr>
+          <a:xfrm>
+            <a:off x="1195262" y="3024956"/>
+            <a:ext cx="7132318" cy="707886"/>
+          </a:xfrm>
+          <a:prstGeom prst="rect">
+            <a:avLst/>
+          </a:prstGeom>
+          <a:noFill/>
+        </p:spPr>
+        <p:txBody>
+          <a:bodyPr wrap="square" rtlCol="0">
+            <a:spAutoFit/>
+          </a:bodyPr>
+          <a:lstStyle/>
+          <a:p>
+            <a:pPr algn="ctr">
+              <a:buClr>
+                <a:schemeClr val="bg1">
+                  <a:lumMod val="85000"/>
+                </a:schemeClr>
+              </a:buClr>
+            </a:pPr>
+            <a:r>
+              <a:rPr lang="pt-BR" sz="4000" dirty="0">
+                <a:solidFill>
+                  <a:schemeClr val="bg1">
+                    <a:lumMod val="85000"/>
+                  </a:schemeClr>
+                </a:solidFill>
+                <a:latin typeface="Verdana" panose="020B0604030504040204" pitchFamily="34" charset="0"/>
+                <a:ea typeface="Verdana" panose="020B0604030504040204" pitchFamily="34" charset="0"/>
+                <a:cs typeface="Calibri" panose="020F0502020204030204" pitchFamily="34" charset="0"/>
+              </a:rPr>
+              <a:t>DAO</a:t>
+            </a:r>
+          </a:p>
+        </p:txBody>
+      </p:sp>
+    </p:spTree>
+    <p:extLst>
+      <p:ext uri="{BB962C8B-B14F-4D97-AF65-F5344CB8AC3E}">
+        <p14:creationId xmlns:p14="http://schemas.microsoft.com/office/powerpoint/2010/main" val="734261597"/>
       </p:ext>
     </p:extLst>
   </p:cSld>

</xml_diff>

<commit_message>
- Atualização dos slides
</commit_message>
<xml_diff>
--- a/slides/design-patterns.pptx
+++ b/slides/design-patterns.pptx
@@ -5,7 +5,7 @@
     <p:sldMasterId id="2147483659" r:id="rId1"/>
   </p:sldMasterIdLst>
   <p:notesMasterIdLst>
-    <p:notesMasterId r:id="rId14"/>
+    <p:notesMasterId r:id="rId16"/>
   </p:notesMasterIdLst>
   <p:sldIdLst>
     <p:sldId id="256" r:id="rId2"/>
@@ -14,12 +14,14 @@
     <p:sldId id="290" r:id="rId5"/>
     <p:sldId id="293" r:id="rId6"/>
     <p:sldId id="291" r:id="rId7"/>
-    <p:sldId id="294" r:id="rId8"/>
-    <p:sldId id="292" r:id="rId9"/>
-    <p:sldId id="295" r:id="rId10"/>
-    <p:sldId id="296" r:id="rId11"/>
-    <p:sldId id="297" r:id="rId12"/>
-    <p:sldId id="298" r:id="rId13"/>
+    <p:sldId id="299" r:id="rId8"/>
+    <p:sldId id="294" r:id="rId9"/>
+    <p:sldId id="292" r:id="rId10"/>
+    <p:sldId id="300" r:id="rId11"/>
+    <p:sldId id="295" r:id="rId12"/>
+    <p:sldId id="296" r:id="rId13"/>
+    <p:sldId id="297" r:id="rId14"/>
+    <p:sldId id="298" r:id="rId15"/>
   </p:sldIdLst>
   <p:sldSz cx="9144000" cy="6858000" type="screen4x3"/>
   <p:notesSz cx="6858000" cy="9144000"/>
@@ -1795,7 +1797,7 @@
     </p:spTree>
     <p:extLst>
       <p:ext uri="{BB962C8B-B14F-4D97-AF65-F5344CB8AC3E}">
-        <p14:creationId xmlns:p14="http://schemas.microsoft.com/office/powerpoint/2010/main" val="2036627115"/>
+        <p14:creationId xmlns:p14="http://schemas.microsoft.com/office/powerpoint/2010/main" val="2207984074"/>
       </p:ext>
     </p:extLst>
   </p:cSld>
@@ -1951,7 +1953,7 @@
     </p:spTree>
     <p:extLst>
       <p:ext uri="{BB962C8B-B14F-4D97-AF65-F5344CB8AC3E}">
-        <p14:creationId xmlns:p14="http://schemas.microsoft.com/office/powerpoint/2010/main" val="1941761386"/>
+        <p14:creationId xmlns:p14="http://schemas.microsoft.com/office/powerpoint/2010/main" val="2198404689"/>
       </p:ext>
     </p:extLst>
   </p:cSld>
@@ -2099,6 +2101,318 @@
             <a:fld id="{00000000-1234-1234-1234-123412341234}" type="slidenum">
               <a:rPr lang="en-US"/>
               <a:t>12</a:t>
+            </a:fld>
+            <a:endParaRPr sz="1400"/>
+          </a:p>
+        </p:txBody>
+      </p:sp>
+    </p:spTree>
+    <p:extLst>
+      <p:ext uri="{BB962C8B-B14F-4D97-AF65-F5344CB8AC3E}">
+        <p14:creationId xmlns:p14="http://schemas.microsoft.com/office/powerpoint/2010/main" val="2036627115"/>
+      </p:ext>
+    </p:extLst>
+  </p:cSld>
+  <p:clrMapOvr>
+    <a:masterClrMapping/>
+  </p:clrMapOvr>
+</p:notes>
+</file>
+
+<file path=ppt/notesSlides/notesSlide13.xml><?xml version="1.0" encoding="utf-8"?>
+<p:notes xmlns:a="http://schemas.openxmlformats.org/drawingml/2006/main" xmlns:r="http://schemas.openxmlformats.org/officeDocument/2006/relationships" xmlns:p="http://schemas.openxmlformats.org/presentationml/2006/main" showMasterSp="0" showMasterPhAnim="0">
+  <p:cSld>
+    <p:spTree>
+      <p:nvGrpSpPr>
+        <p:cNvPr id="1" name="Shape 93"/>
+        <p:cNvGrpSpPr/>
+        <p:nvPr/>
+      </p:nvGrpSpPr>
+      <p:grpSpPr>
+        <a:xfrm>
+          <a:off x="0" y="0"/>
+          <a:ext cx="0" cy="0"/>
+          <a:chOff x="0" y="0"/>
+          <a:chExt cx="0" cy="0"/>
+        </a:xfrm>
+      </p:grpSpPr>
+      <p:sp>
+        <p:nvSpPr>
+          <p:cNvPr id="94" name="Google Shape;94;g5dba4fbf02_0_32:notes"/>
+          <p:cNvSpPr>
+            <a:spLocks noGrp="1" noRot="1" noChangeAspect="1"/>
+          </p:cNvSpPr>
+          <p:nvPr>
+            <p:ph type="sldImg" idx="2"/>
+          </p:nvPr>
+        </p:nvSpPr>
+        <p:spPr>
+          <a:xfrm>
+            <a:off x="1143000" y="685800"/>
+            <a:ext cx="4572000" cy="3429000"/>
+          </a:xfrm>
+          <a:custGeom>
+            <a:avLst/>
+            <a:gdLst/>
+            <a:ahLst/>
+            <a:cxnLst/>
+            <a:rect l="l" t="t" r="r" b="b"/>
+            <a:pathLst>
+              <a:path w="120000" h="120000" extrusionOk="0">
+                <a:moveTo>
+                  <a:pt x="0" y="0"/>
+                </a:moveTo>
+                <a:lnTo>
+                  <a:pt x="120000" y="0"/>
+                </a:lnTo>
+                <a:lnTo>
+                  <a:pt x="120000" y="120000"/>
+                </a:lnTo>
+                <a:lnTo>
+                  <a:pt x="0" y="120000"/>
+                </a:lnTo>
+                <a:close/>
+              </a:path>
+            </a:pathLst>
+          </a:custGeom>
+        </p:spPr>
+      </p:sp>
+      <p:sp>
+        <p:nvSpPr>
+          <p:cNvPr id="95" name="Google Shape;95;g5dba4fbf02_0_32:notes"/>
+          <p:cNvSpPr txBox="1">
+            <a:spLocks noGrp="1"/>
+          </p:cNvSpPr>
+          <p:nvPr>
+            <p:ph type="body" idx="1"/>
+          </p:nvPr>
+        </p:nvSpPr>
+        <p:spPr>
+          <a:xfrm>
+            <a:off x="685800" y="4343400"/>
+            <a:ext cx="5486400" cy="4114800"/>
+          </a:xfrm>
+          <a:prstGeom prst="rect">
+            <a:avLst/>
+          </a:prstGeom>
+        </p:spPr>
+        <p:txBody>
+          <a:bodyPr spcFirstLastPara="1" wrap="square" lIns="91425" tIns="45700" rIns="91425" bIns="45700" anchor="t" anchorCtr="0">
+            <a:noAutofit/>
+          </a:bodyPr>
+          <a:lstStyle/>
+          <a:p>
+            <a:pPr marL="0" lvl="0" indent="0" algn="l" rtl="0">
+              <a:spcBef>
+                <a:spcPts val="0"/>
+              </a:spcBef>
+              <a:spcAft>
+                <a:spcPts val="0"/>
+              </a:spcAft>
+              <a:buNone/>
+            </a:pPr>
+            <a:endParaRPr dirty="0"/>
+          </a:p>
+        </p:txBody>
+      </p:sp>
+      <p:sp>
+        <p:nvSpPr>
+          <p:cNvPr id="96" name="Google Shape;96;g5dba4fbf02_0_32:notes"/>
+          <p:cNvSpPr txBox="1">
+            <a:spLocks noGrp="1"/>
+          </p:cNvSpPr>
+          <p:nvPr>
+            <p:ph type="sldNum" idx="12"/>
+          </p:nvPr>
+        </p:nvSpPr>
+        <p:spPr>
+          <a:xfrm>
+            <a:off x="3884612" y="8685212"/>
+            <a:ext cx="2971800" cy="457200"/>
+          </a:xfrm>
+          <a:prstGeom prst="rect">
+            <a:avLst/>
+          </a:prstGeom>
+        </p:spPr>
+        <p:txBody>
+          <a:bodyPr spcFirstLastPara="1" wrap="square" lIns="91425" tIns="45700" rIns="91425" bIns="45700" anchor="b" anchorCtr="0">
+            <a:noAutofit/>
+          </a:bodyPr>
+          <a:lstStyle/>
+          <a:p>
+            <a:pPr marL="0" lvl="0" indent="0" algn="r" rtl="0">
+              <a:spcBef>
+                <a:spcPts val="0"/>
+              </a:spcBef>
+              <a:spcAft>
+                <a:spcPts val="0"/>
+              </a:spcAft>
+              <a:buClr>
+                <a:srgbClr val="000000"/>
+              </a:buClr>
+              <a:buSzPts val="1200"/>
+              <a:buFont typeface="Arial"/>
+              <a:buNone/>
+            </a:pPr>
+            <a:fld id="{00000000-1234-1234-1234-123412341234}" type="slidenum">
+              <a:rPr lang="en-US"/>
+              <a:t>13</a:t>
+            </a:fld>
+            <a:endParaRPr sz="1400"/>
+          </a:p>
+        </p:txBody>
+      </p:sp>
+    </p:spTree>
+    <p:extLst>
+      <p:ext uri="{BB962C8B-B14F-4D97-AF65-F5344CB8AC3E}">
+        <p14:creationId xmlns:p14="http://schemas.microsoft.com/office/powerpoint/2010/main" val="1941761386"/>
+      </p:ext>
+    </p:extLst>
+  </p:cSld>
+  <p:clrMapOvr>
+    <a:masterClrMapping/>
+  </p:clrMapOvr>
+</p:notes>
+</file>
+
+<file path=ppt/notesSlides/notesSlide14.xml><?xml version="1.0" encoding="utf-8"?>
+<p:notes xmlns:a="http://schemas.openxmlformats.org/drawingml/2006/main" xmlns:r="http://schemas.openxmlformats.org/officeDocument/2006/relationships" xmlns:p="http://schemas.openxmlformats.org/presentationml/2006/main" showMasterSp="0" showMasterPhAnim="0">
+  <p:cSld>
+    <p:spTree>
+      <p:nvGrpSpPr>
+        <p:cNvPr id="1" name="Shape 93"/>
+        <p:cNvGrpSpPr/>
+        <p:nvPr/>
+      </p:nvGrpSpPr>
+      <p:grpSpPr>
+        <a:xfrm>
+          <a:off x="0" y="0"/>
+          <a:ext cx="0" cy="0"/>
+          <a:chOff x="0" y="0"/>
+          <a:chExt cx="0" cy="0"/>
+        </a:xfrm>
+      </p:grpSpPr>
+      <p:sp>
+        <p:nvSpPr>
+          <p:cNvPr id="94" name="Google Shape;94;g5dba4fbf02_0_32:notes"/>
+          <p:cNvSpPr>
+            <a:spLocks noGrp="1" noRot="1" noChangeAspect="1"/>
+          </p:cNvSpPr>
+          <p:nvPr>
+            <p:ph type="sldImg" idx="2"/>
+          </p:nvPr>
+        </p:nvSpPr>
+        <p:spPr>
+          <a:xfrm>
+            <a:off x="1143000" y="685800"/>
+            <a:ext cx="4572000" cy="3429000"/>
+          </a:xfrm>
+          <a:custGeom>
+            <a:avLst/>
+            <a:gdLst/>
+            <a:ahLst/>
+            <a:cxnLst/>
+            <a:rect l="l" t="t" r="r" b="b"/>
+            <a:pathLst>
+              <a:path w="120000" h="120000" extrusionOk="0">
+                <a:moveTo>
+                  <a:pt x="0" y="0"/>
+                </a:moveTo>
+                <a:lnTo>
+                  <a:pt x="120000" y="0"/>
+                </a:lnTo>
+                <a:lnTo>
+                  <a:pt x="120000" y="120000"/>
+                </a:lnTo>
+                <a:lnTo>
+                  <a:pt x="0" y="120000"/>
+                </a:lnTo>
+                <a:close/>
+              </a:path>
+            </a:pathLst>
+          </a:custGeom>
+        </p:spPr>
+      </p:sp>
+      <p:sp>
+        <p:nvSpPr>
+          <p:cNvPr id="95" name="Google Shape;95;g5dba4fbf02_0_32:notes"/>
+          <p:cNvSpPr txBox="1">
+            <a:spLocks noGrp="1"/>
+          </p:cNvSpPr>
+          <p:nvPr>
+            <p:ph type="body" idx="1"/>
+          </p:nvPr>
+        </p:nvSpPr>
+        <p:spPr>
+          <a:xfrm>
+            <a:off x="685800" y="4343400"/>
+            <a:ext cx="5486400" cy="4114800"/>
+          </a:xfrm>
+          <a:prstGeom prst="rect">
+            <a:avLst/>
+          </a:prstGeom>
+        </p:spPr>
+        <p:txBody>
+          <a:bodyPr spcFirstLastPara="1" wrap="square" lIns="91425" tIns="45700" rIns="91425" bIns="45700" anchor="t" anchorCtr="0">
+            <a:noAutofit/>
+          </a:bodyPr>
+          <a:lstStyle/>
+          <a:p>
+            <a:pPr marL="0" lvl="0" indent="0" algn="l" rtl="0">
+              <a:spcBef>
+                <a:spcPts val="0"/>
+              </a:spcBef>
+              <a:spcAft>
+                <a:spcPts val="0"/>
+              </a:spcAft>
+              <a:buNone/>
+            </a:pPr>
+            <a:endParaRPr dirty="0"/>
+          </a:p>
+        </p:txBody>
+      </p:sp>
+      <p:sp>
+        <p:nvSpPr>
+          <p:cNvPr id="96" name="Google Shape;96;g5dba4fbf02_0_32:notes"/>
+          <p:cNvSpPr txBox="1">
+            <a:spLocks noGrp="1"/>
+          </p:cNvSpPr>
+          <p:nvPr>
+            <p:ph type="sldNum" idx="12"/>
+          </p:nvPr>
+        </p:nvSpPr>
+        <p:spPr>
+          <a:xfrm>
+            <a:off x="3884612" y="8685212"/>
+            <a:ext cx="2971800" cy="457200"/>
+          </a:xfrm>
+          <a:prstGeom prst="rect">
+            <a:avLst/>
+          </a:prstGeom>
+        </p:spPr>
+        <p:txBody>
+          <a:bodyPr spcFirstLastPara="1" wrap="square" lIns="91425" tIns="45700" rIns="91425" bIns="45700" anchor="b" anchorCtr="0">
+            <a:noAutofit/>
+          </a:bodyPr>
+          <a:lstStyle/>
+          <a:p>
+            <a:pPr marL="0" lvl="0" indent="0" algn="r" rtl="0">
+              <a:spcBef>
+                <a:spcPts val="0"/>
+              </a:spcBef>
+              <a:spcAft>
+                <a:spcPts val="0"/>
+              </a:spcAft>
+              <a:buClr>
+                <a:srgbClr val="000000"/>
+              </a:buClr>
+              <a:buSzPts val="1200"/>
+              <a:buFont typeface="Arial"/>
+              <a:buNone/>
+            </a:pPr>
+            <a:fld id="{00000000-1234-1234-1234-123412341234}" type="slidenum">
+              <a:rPr lang="en-US"/>
+              <a:t>14</a:t>
             </a:fld>
             <a:endParaRPr sz="1400"/>
           </a:p>
@@ -3043,7 +3357,7 @@
     </p:spTree>
     <p:extLst>
       <p:ext uri="{BB962C8B-B14F-4D97-AF65-F5344CB8AC3E}">
-        <p14:creationId xmlns:p14="http://schemas.microsoft.com/office/powerpoint/2010/main" val="2270867041"/>
+        <p14:creationId xmlns:p14="http://schemas.microsoft.com/office/powerpoint/2010/main" val="3808962679"/>
       </p:ext>
     </p:extLst>
   </p:cSld>
@@ -3199,7 +3513,7 @@
     </p:spTree>
     <p:extLst>
       <p:ext uri="{BB962C8B-B14F-4D97-AF65-F5344CB8AC3E}">
-        <p14:creationId xmlns:p14="http://schemas.microsoft.com/office/powerpoint/2010/main" val="3323519279"/>
+        <p14:creationId xmlns:p14="http://schemas.microsoft.com/office/powerpoint/2010/main" val="2270867041"/>
       </p:ext>
     </p:extLst>
   </p:cSld>
@@ -3355,7 +3669,7 @@
     </p:spTree>
     <p:extLst>
       <p:ext uri="{BB962C8B-B14F-4D97-AF65-F5344CB8AC3E}">
-        <p14:creationId xmlns:p14="http://schemas.microsoft.com/office/powerpoint/2010/main" val="2198404689"/>
+        <p14:creationId xmlns:p14="http://schemas.microsoft.com/office/powerpoint/2010/main" val="3323519279"/>
       </p:ext>
     </p:extLst>
   </p:cSld>
@@ -16633,10 +16947,10 @@
       </p:cxnSp>
       <p:sp>
         <p:nvSpPr>
-          <p:cNvPr id="9" name="CaixaDeTexto 8">
+          <p:cNvPr id="8" name="CaixaDeTexto 7">
             <a:extLst>
               <a:ext uri="{FF2B5EF4-FFF2-40B4-BE49-F238E27FC236}">
-                <a16:creationId xmlns:a16="http://schemas.microsoft.com/office/drawing/2014/main" id="{E21B1250-A8A1-4771-8929-41EC66F5748E}"/>
+                <a16:creationId xmlns:a16="http://schemas.microsoft.com/office/drawing/2014/main" id="{4636108B-A405-4D07-A0DC-738CBB4E2677}"/>
               </a:ext>
             </a:extLst>
           </p:cNvPr>
@@ -16646,7 +16960,7 @@
         <p:spPr>
           <a:xfrm>
             <a:off x="1195262" y="1947738"/>
-            <a:ext cx="7132318" cy="2862322"/>
+            <a:ext cx="7132318" cy="1754326"/>
           </a:xfrm>
           <a:prstGeom prst="rect">
             <a:avLst/>
@@ -16671,7 +16985,7 @@
                 <a:ea typeface="Verdana" panose="020B0604030504040204" pitchFamily="34" charset="0"/>
                 <a:cs typeface="Calibri" panose="020F0502020204030204" pitchFamily="34" charset="0"/>
               </a:rPr>
-              <a:t>O padrão Data Access </a:t>
+              <a:t>O objetivo principal do padrão </a:t>
             </a:r>
             <a:r>
               <a:rPr lang="pt-BR" sz="1800" dirty="0" err="1">
@@ -16684,7 +16998,7 @@
                 <a:ea typeface="Verdana" panose="020B0604030504040204" pitchFamily="34" charset="0"/>
                 <a:cs typeface="Calibri" panose="020F0502020204030204" pitchFamily="34" charset="0"/>
               </a:rPr>
-              <a:t>Object</a:t>
+              <a:t>Factory</a:t>
             </a:r>
             <a:r>
               <a:rPr lang="pt-BR" sz="1800" dirty="0">
@@ -16697,7 +17011,7 @@
                 <a:ea typeface="Verdana" panose="020B0604030504040204" pitchFamily="34" charset="0"/>
                 <a:cs typeface="Calibri" panose="020F0502020204030204" pitchFamily="34" charset="0"/>
               </a:rPr>
-              <a:t> (DAO) é um padrão estrutural que nos permite isolar a camada de modelo da camada de persistência, normalmente um banco de dados relacional.</a:t>
+              <a:t> é encapsular a criação ou instanciação de objetos, garantindo assim que a camada de modelo da aplicação fique isolada. </a:t>
             </a:r>
           </a:p>
           <a:p>
@@ -16726,36 +17040,7 @@
                 <a:ea typeface="Verdana" panose="020B0604030504040204" pitchFamily="34" charset="0"/>
                 <a:cs typeface="Calibri" panose="020F0502020204030204" pitchFamily="34" charset="0"/>
               </a:rPr>
-              <a:t>A sua principal  função é ocultar da camada de modelo toda a complexidade envolvida na execução de operações do tipo CRUD.</a:t>
-            </a:r>
-          </a:p>
-          <a:p>
-            <a:pPr algn="just"/>
-            <a:endParaRPr lang="pt-BR" sz="1800" dirty="0">
-              <a:solidFill>
-                <a:schemeClr val="bg1">
-                  <a:lumMod val="85000"/>
-                </a:schemeClr>
-              </a:solidFill>
-              <a:latin typeface="Verdana" panose="020B0604030504040204" pitchFamily="34" charset="0"/>
-              <a:ea typeface="Verdana" panose="020B0604030504040204" pitchFamily="34" charset="0"/>
-              <a:cs typeface="Calibri" panose="020F0502020204030204" pitchFamily="34" charset="0"/>
-            </a:endParaRPr>
-          </a:p>
-          <a:p>
-            <a:pPr algn="just"/>
-            <a:r>
-              <a:rPr lang="pt-BR" sz="1800" dirty="0">
-                <a:solidFill>
-                  <a:schemeClr val="bg1">
-                    <a:lumMod val="85000"/>
-                  </a:schemeClr>
-                </a:solidFill>
-                <a:latin typeface="Verdana" panose="020B0604030504040204" pitchFamily="34" charset="0"/>
-                <a:ea typeface="Verdana" panose="020B0604030504040204" pitchFamily="34" charset="0"/>
-                <a:cs typeface="Calibri" panose="020F0502020204030204" pitchFamily="34" charset="0"/>
-              </a:rPr>
-              <a:t>Isso permite que as duas camadas evoluam separadamente sem saber nada uma da outra.</a:t>
+              <a:t>Por exemplo, uma fábrica de conexões com banco de dados.</a:t>
             </a:r>
           </a:p>
         </p:txBody>
@@ -16763,7 +17048,7 @@
     </p:spTree>
     <p:extLst>
       <p:ext uri="{BB962C8B-B14F-4D97-AF65-F5344CB8AC3E}">
-        <p14:creationId xmlns:p14="http://schemas.microsoft.com/office/powerpoint/2010/main" val="829373984"/>
+        <p14:creationId xmlns:p14="http://schemas.microsoft.com/office/powerpoint/2010/main" val="2495615617"/>
       </p:ext>
     </p:extLst>
   </p:cSld>
@@ -17029,8 +17314,8 @@
         </p:nvSpPr>
         <p:spPr>
           <a:xfrm>
-            <a:off x="1195262" y="829993"/>
-            <a:ext cx="7132318" cy="754053"/>
+            <a:off x="1195262" y="3024956"/>
+            <a:ext cx="7132318" cy="707886"/>
           </a:xfrm>
           <a:prstGeom prst="rect">
             <a:avLst/>
@@ -17043,9 +17328,15 @@
           </a:bodyPr>
           <a:lstStyle/>
           <a:p>
-            <a:pPr algn="just"/>
-            <a:r>
-              <a:rPr lang="pt-BR" sz="2500" dirty="0">
+            <a:pPr algn="ctr">
+              <a:buClr>
+                <a:schemeClr val="bg1">
+                  <a:lumMod val="85000"/>
+                </a:schemeClr>
+              </a:buClr>
+            </a:pPr>
+            <a:r>
+              <a:rPr lang="pt-BR" sz="4000" dirty="0">
                 <a:solidFill>
                   <a:schemeClr val="bg1">
                     <a:lumMod val="85000"/>
@@ -17055,643 +17346,7 @@
                 <a:ea typeface="Verdana" panose="020B0604030504040204" pitchFamily="34" charset="0"/>
                 <a:cs typeface="Calibri" panose="020F0502020204030204" pitchFamily="34" charset="0"/>
               </a:rPr>
-              <a:t>1º - </a:t>
-            </a:r>
-            <a:r>
-              <a:rPr lang="pt-BR" sz="1800" dirty="0">
-                <a:solidFill>
-                  <a:schemeClr val="bg1">
-                    <a:lumMod val="85000"/>
-                  </a:schemeClr>
-                </a:solidFill>
-                <a:latin typeface="Verdana" panose="020B0604030504040204" pitchFamily="34" charset="0"/>
-                <a:ea typeface="Verdana" panose="020B0604030504040204" pitchFamily="34" charset="0"/>
-                <a:cs typeface="Calibri" panose="020F0502020204030204" pitchFamily="34" charset="0"/>
-              </a:rPr>
-              <a:t>Vamos criar uma interface para padronizar o acesso aos métodos do nosso DAO  </a:t>
-            </a:r>
-          </a:p>
-        </p:txBody>
-      </p:sp>
-      <p:sp>
-        <p:nvSpPr>
-          <p:cNvPr id="8" name="CaixaDeTexto 7">
-            <a:extLst>
-              <a:ext uri="{FF2B5EF4-FFF2-40B4-BE49-F238E27FC236}">
-                <a16:creationId xmlns:a16="http://schemas.microsoft.com/office/drawing/2014/main" id="{F0E0CC6B-812B-4F4D-98D2-ED48DBF93802}"/>
-              </a:ext>
-            </a:extLst>
-          </p:cNvPr>
-          <p:cNvSpPr txBox="1"/>
-          <p:nvPr/>
-        </p:nvSpPr>
-        <p:spPr>
-          <a:xfrm>
-            <a:off x="2474386" y="2731400"/>
-            <a:ext cx="4574069" cy="3046988"/>
-          </a:xfrm>
-          <a:prstGeom prst="rect">
-            <a:avLst/>
-          </a:prstGeom>
-          <a:noFill/>
-        </p:spPr>
-        <p:txBody>
-          <a:bodyPr wrap="square" rtlCol="0">
-            <a:spAutoFit/>
-          </a:bodyPr>
-          <a:lstStyle/>
-          <a:p>
-            <a:r>
-              <a:rPr lang="pt-BR" sz="1600" dirty="0" err="1">
-                <a:solidFill>
-                  <a:srgbClr val="569CD6"/>
-                </a:solidFill>
-                <a:latin typeface="Consolas" panose="020B0609020204030204" pitchFamily="49" charset="0"/>
-              </a:rPr>
-              <a:t>public</a:t>
-            </a:r>
-            <a:r>
-              <a:rPr lang="pt-BR" sz="1600" dirty="0">
-                <a:solidFill>
-                  <a:srgbClr val="D4D4D4"/>
-                </a:solidFill>
-                <a:latin typeface="Consolas" panose="020B0609020204030204" pitchFamily="49" charset="0"/>
-              </a:rPr>
-              <a:t> </a:t>
-            </a:r>
-            <a:r>
-              <a:rPr lang="pt-BR" sz="1600" dirty="0">
-                <a:solidFill>
-                  <a:srgbClr val="569CD6"/>
-                </a:solidFill>
-                <a:latin typeface="Consolas" panose="020B0609020204030204" pitchFamily="49" charset="0"/>
-              </a:rPr>
-              <a:t>interface</a:t>
-            </a:r>
-            <a:r>
-              <a:rPr lang="pt-BR" sz="1600" dirty="0">
-                <a:solidFill>
-                  <a:srgbClr val="D4D4D4"/>
-                </a:solidFill>
-                <a:latin typeface="Consolas" panose="020B0609020204030204" pitchFamily="49" charset="0"/>
-              </a:rPr>
-              <a:t> </a:t>
-            </a:r>
-            <a:r>
-              <a:rPr lang="pt-BR" sz="1600" dirty="0" err="1">
-                <a:solidFill>
-                  <a:srgbClr val="4EC9B0"/>
-                </a:solidFill>
-                <a:latin typeface="Consolas" panose="020B0609020204030204" pitchFamily="49" charset="0"/>
-              </a:rPr>
-              <a:t>IGuestDao</a:t>
-            </a:r>
-            <a:r>
-              <a:rPr lang="pt-BR" sz="1600" dirty="0">
-                <a:solidFill>
-                  <a:srgbClr val="D4D4D4"/>
-                </a:solidFill>
-                <a:latin typeface="Consolas" panose="020B0609020204030204" pitchFamily="49" charset="0"/>
-              </a:rPr>
-              <a:t> {</a:t>
-            </a:r>
-          </a:p>
-          <a:p>
-            <a:endParaRPr lang="pt-BR" sz="1600" dirty="0">
-              <a:solidFill>
-                <a:srgbClr val="D4D4D4"/>
-              </a:solidFill>
-              <a:latin typeface="Consolas" panose="020B0609020204030204" pitchFamily="49" charset="0"/>
-            </a:endParaRPr>
-          </a:p>
-          <a:p>
-            <a:r>
-              <a:rPr lang="pt-BR" sz="1600" dirty="0">
-                <a:solidFill>
-                  <a:srgbClr val="569CD6"/>
-                </a:solidFill>
-                <a:latin typeface="Consolas" panose="020B0609020204030204" pitchFamily="49" charset="0"/>
-              </a:rPr>
-              <a:t>   </a:t>
-            </a:r>
-            <a:r>
-              <a:rPr lang="pt-BR" sz="1600" dirty="0" err="1">
-                <a:solidFill>
-                  <a:srgbClr val="569CD6"/>
-                </a:solidFill>
-                <a:latin typeface="Consolas" panose="020B0609020204030204" pitchFamily="49" charset="0"/>
-              </a:rPr>
-              <a:t>public</a:t>
-            </a:r>
-            <a:r>
-              <a:rPr lang="pt-BR" sz="1600" dirty="0">
-                <a:solidFill>
-                  <a:srgbClr val="D4D4D4"/>
-                </a:solidFill>
-                <a:latin typeface="Consolas" panose="020B0609020204030204" pitchFamily="49" charset="0"/>
-              </a:rPr>
-              <a:t> </a:t>
-            </a:r>
-            <a:r>
-              <a:rPr lang="pt-BR" sz="1600" dirty="0" err="1">
-                <a:solidFill>
-                  <a:srgbClr val="4EC9B0"/>
-                </a:solidFill>
-                <a:latin typeface="Consolas" panose="020B0609020204030204" pitchFamily="49" charset="0"/>
-              </a:rPr>
-              <a:t>void</a:t>
-            </a:r>
-            <a:r>
-              <a:rPr lang="pt-BR" sz="1600" dirty="0">
-                <a:solidFill>
-                  <a:srgbClr val="D4D4D4"/>
-                </a:solidFill>
-                <a:latin typeface="Consolas" panose="020B0609020204030204" pitchFamily="49" charset="0"/>
-              </a:rPr>
-              <a:t> </a:t>
-            </a:r>
-            <a:r>
-              <a:rPr lang="pt-BR" sz="1600" dirty="0" err="1">
-                <a:solidFill>
-                  <a:srgbClr val="DCDCAA"/>
-                </a:solidFill>
-                <a:latin typeface="Consolas" panose="020B0609020204030204" pitchFamily="49" charset="0"/>
-              </a:rPr>
-              <a:t>create</a:t>
-            </a:r>
-            <a:r>
-              <a:rPr lang="pt-BR" sz="1600" dirty="0">
-                <a:solidFill>
-                  <a:srgbClr val="D4D4D4"/>
-                </a:solidFill>
-                <a:latin typeface="Consolas" panose="020B0609020204030204" pitchFamily="49" charset="0"/>
-              </a:rPr>
-              <a:t>(</a:t>
-            </a:r>
-            <a:r>
-              <a:rPr lang="pt-BR" sz="1600" dirty="0" err="1">
-                <a:solidFill>
-                  <a:srgbClr val="4EC9B0"/>
-                </a:solidFill>
-                <a:latin typeface="Consolas" panose="020B0609020204030204" pitchFamily="49" charset="0"/>
-              </a:rPr>
-              <a:t>Guest</a:t>
-            </a:r>
-            <a:r>
-              <a:rPr lang="pt-BR" sz="1600" dirty="0">
-                <a:solidFill>
-                  <a:srgbClr val="D4D4D4"/>
-                </a:solidFill>
-                <a:latin typeface="Consolas" panose="020B0609020204030204" pitchFamily="49" charset="0"/>
-              </a:rPr>
-              <a:t> </a:t>
-            </a:r>
-            <a:r>
-              <a:rPr lang="pt-BR" sz="1600" dirty="0" err="1">
-                <a:solidFill>
-                  <a:srgbClr val="9CDCFE"/>
-                </a:solidFill>
-                <a:latin typeface="Consolas" panose="020B0609020204030204" pitchFamily="49" charset="0"/>
-              </a:rPr>
-              <a:t>guest</a:t>
-            </a:r>
-            <a:r>
-              <a:rPr lang="pt-BR" sz="1600" dirty="0">
-                <a:solidFill>
-                  <a:srgbClr val="D4D4D4"/>
-                </a:solidFill>
-                <a:latin typeface="Consolas" panose="020B0609020204030204" pitchFamily="49" charset="0"/>
-              </a:rPr>
-              <a:t>);</a:t>
-            </a:r>
-          </a:p>
-          <a:p>
-            <a:br>
-              <a:rPr lang="pt-BR" sz="1600" dirty="0">
-                <a:solidFill>
-                  <a:srgbClr val="D4D4D4"/>
-                </a:solidFill>
-                <a:latin typeface="Consolas" panose="020B0609020204030204" pitchFamily="49" charset="0"/>
-              </a:rPr>
-            </a:br>
-            <a:r>
-              <a:rPr lang="pt-BR" sz="1600" dirty="0">
-                <a:solidFill>
-                  <a:srgbClr val="D4D4D4"/>
-                </a:solidFill>
-                <a:latin typeface="Consolas" panose="020B0609020204030204" pitchFamily="49" charset="0"/>
-              </a:rPr>
-              <a:t>   </a:t>
-            </a:r>
-            <a:r>
-              <a:rPr lang="pt-BR" sz="1600" dirty="0" err="1">
-                <a:solidFill>
-                  <a:srgbClr val="569CD6"/>
-                </a:solidFill>
-                <a:latin typeface="Consolas" panose="020B0609020204030204" pitchFamily="49" charset="0"/>
-              </a:rPr>
-              <a:t>public</a:t>
-            </a:r>
-            <a:r>
-              <a:rPr lang="pt-BR" sz="1600" dirty="0">
-                <a:solidFill>
-                  <a:srgbClr val="D4D4D4"/>
-                </a:solidFill>
-                <a:latin typeface="Consolas" panose="020B0609020204030204" pitchFamily="49" charset="0"/>
-              </a:rPr>
-              <a:t> </a:t>
-            </a:r>
-            <a:r>
-              <a:rPr lang="pt-BR" sz="1600" dirty="0" err="1">
-                <a:solidFill>
-                  <a:srgbClr val="4EC9B0"/>
-                </a:solidFill>
-                <a:latin typeface="Consolas" panose="020B0609020204030204" pitchFamily="49" charset="0"/>
-              </a:rPr>
-              <a:t>List</a:t>
-            </a:r>
-            <a:r>
-              <a:rPr lang="pt-BR" sz="1600" dirty="0">
-                <a:solidFill>
-                  <a:srgbClr val="D4D4D4"/>
-                </a:solidFill>
-                <a:latin typeface="Consolas" panose="020B0609020204030204" pitchFamily="49" charset="0"/>
-              </a:rPr>
-              <a:t>&lt;</a:t>
-            </a:r>
-            <a:r>
-              <a:rPr lang="pt-BR" sz="1600" dirty="0" err="1">
-                <a:solidFill>
-                  <a:srgbClr val="4EC9B0"/>
-                </a:solidFill>
-                <a:latin typeface="Consolas" panose="020B0609020204030204" pitchFamily="49" charset="0"/>
-              </a:rPr>
-              <a:t>Guest</a:t>
-            </a:r>
-            <a:r>
-              <a:rPr lang="pt-BR" sz="1600" dirty="0">
-                <a:solidFill>
-                  <a:srgbClr val="D4D4D4"/>
-                </a:solidFill>
-                <a:latin typeface="Consolas" panose="020B0609020204030204" pitchFamily="49" charset="0"/>
-              </a:rPr>
-              <a:t>&gt; </a:t>
-            </a:r>
-            <a:r>
-              <a:rPr lang="pt-BR" sz="1600" dirty="0" err="1">
-                <a:solidFill>
-                  <a:srgbClr val="DCDCAA"/>
-                </a:solidFill>
-                <a:latin typeface="Consolas" panose="020B0609020204030204" pitchFamily="49" charset="0"/>
-              </a:rPr>
-              <a:t>readAll</a:t>
-            </a:r>
-            <a:r>
-              <a:rPr lang="pt-BR" sz="1600" dirty="0">
-                <a:solidFill>
-                  <a:srgbClr val="D4D4D4"/>
-                </a:solidFill>
-                <a:latin typeface="Consolas" panose="020B0609020204030204" pitchFamily="49" charset="0"/>
-              </a:rPr>
-              <a:t>();</a:t>
-            </a:r>
-          </a:p>
-          <a:p>
-            <a:br>
-              <a:rPr lang="pt-BR" sz="1600" dirty="0">
-                <a:solidFill>
-                  <a:srgbClr val="D4D4D4"/>
-                </a:solidFill>
-                <a:latin typeface="Consolas" panose="020B0609020204030204" pitchFamily="49" charset="0"/>
-              </a:rPr>
-            </a:br>
-            <a:r>
-              <a:rPr lang="pt-BR" sz="1600" dirty="0">
-                <a:solidFill>
-                  <a:srgbClr val="D4D4D4"/>
-                </a:solidFill>
-                <a:latin typeface="Consolas" panose="020B0609020204030204" pitchFamily="49" charset="0"/>
-              </a:rPr>
-              <a:t>   </a:t>
-            </a:r>
-            <a:r>
-              <a:rPr lang="pt-BR" sz="1600" dirty="0" err="1">
-                <a:solidFill>
-                  <a:srgbClr val="569CD6"/>
-                </a:solidFill>
-                <a:latin typeface="Consolas" panose="020B0609020204030204" pitchFamily="49" charset="0"/>
-              </a:rPr>
-              <a:t>public</a:t>
-            </a:r>
-            <a:r>
-              <a:rPr lang="pt-BR" sz="1600" dirty="0">
-                <a:solidFill>
-                  <a:srgbClr val="D4D4D4"/>
-                </a:solidFill>
-                <a:latin typeface="Consolas" panose="020B0609020204030204" pitchFamily="49" charset="0"/>
-              </a:rPr>
-              <a:t> </a:t>
-            </a:r>
-            <a:r>
-              <a:rPr lang="pt-BR" sz="1600" dirty="0" err="1">
-                <a:solidFill>
-                  <a:srgbClr val="4EC9B0"/>
-                </a:solidFill>
-                <a:latin typeface="Consolas" panose="020B0609020204030204" pitchFamily="49" charset="0"/>
-              </a:rPr>
-              <a:t>Guest</a:t>
-            </a:r>
-            <a:r>
-              <a:rPr lang="pt-BR" sz="1600" dirty="0">
-                <a:solidFill>
-                  <a:srgbClr val="D4D4D4"/>
-                </a:solidFill>
-                <a:latin typeface="Consolas" panose="020B0609020204030204" pitchFamily="49" charset="0"/>
-              </a:rPr>
-              <a:t> </a:t>
-            </a:r>
-            <a:r>
-              <a:rPr lang="pt-BR" sz="1600" dirty="0" err="1">
-                <a:solidFill>
-                  <a:srgbClr val="DCDCAA"/>
-                </a:solidFill>
-                <a:latin typeface="Consolas" panose="020B0609020204030204" pitchFamily="49" charset="0"/>
-              </a:rPr>
-              <a:t>readById</a:t>
-            </a:r>
-            <a:r>
-              <a:rPr lang="pt-BR" sz="1600" dirty="0">
-                <a:solidFill>
-                  <a:srgbClr val="D4D4D4"/>
-                </a:solidFill>
-                <a:latin typeface="Consolas" panose="020B0609020204030204" pitchFamily="49" charset="0"/>
-              </a:rPr>
-              <a:t>(</a:t>
-            </a:r>
-            <a:r>
-              <a:rPr lang="pt-BR" sz="1600" dirty="0" err="1">
-                <a:solidFill>
-                  <a:srgbClr val="4EC9B0"/>
-                </a:solidFill>
-                <a:latin typeface="Consolas" panose="020B0609020204030204" pitchFamily="49" charset="0"/>
-              </a:rPr>
-              <a:t>long</a:t>
-            </a:r>
-            <a:r>
-              <a:rPr lang="pt-BR" sz="1600" dirty="0">
-                <a:solidFill>
-                  <a:srgbClr val="D4D4D4"/>
-                </a:solidFill>
-                <a:latin typeface="Consolas" panose="020B0609020204030204" pitchFamily="49" charset="0"/>
-              </a:rPr>
-              <a:t> </a:t>
-            </a:r>
-            <a:r>
-              <a:rPr lang="pt-BR" sz="1600" dirty="0">
-                <a:solidFill>
-                  <a:srgbClr val="9CDCFE"/>
-                </a:solidFill>
-                <a:latin typeface="Consolas" panose="020B0609020204030204" pitchFamily="49" charset="0"/>
-              </a:rPr>
-              <a:t>id</a:t>
-            </a:r>
-            <a:r>
-              <a:rPr lang="pt-BR" sz="1600" dirty="0">
-                <a:solidFill>
-                  <a:srgbClr val="D4D4D4"/>
-                </a:solidFill>
-                <a:latin typeface="Consolas" panose="020B0609020204030204" pitchFamily="49" charset="0"/>
-              </a:rPr>
-              <a:t>);</a:t>
-            </a:r>
-          </a:p>
-          <a:p>
-            <a:br>
-              <a:rPr lang="pt-BR" sz="1600" dirty="0">
-                <a:solidFill>
-                  <a:srgbClr val="D4D4D4"/>
-                </a:solidFill>
-                <a:latin typeface="Consolas" panose="020B0609020204030204" pitchFamily="49" charset="0"/>
-              </a:rPr>
-            </a:br>
-            <a:r>
-              <a:rPr lang="pt-BR" sz="1600" dirty="0">
-                <a:solidFill>
-                  <a:srgbClr val="D4D4D4"/>
-                </a:solidFill>
-                <a:latin typeface="Consolas" panose="020B0609020204030204" pitchFamily="49" charset="0"/>
-              </a:rPr>
-              <a:t>   </a:t>
-            </a:r>
-            <a:r>
-              <a:rPr lang="pt-BR" sz="1600" dirty="0" err="1">
-                <a:solidFill>
-                  <a:srgbClr val="569CD6"/>
-                </a:solidFill>
-                <a:latin typeface="Consolas" panose="020B0609020204030204" pitchFamily="49" charset="0"/>
-              </a:rPr>
-              <a:t>public</a:t>
-            </a:r>
-            <a:r>
-              <a:rPr lang="pt-BR" sz="1600" dirty="0">
-                <a:solidFill>
-                  <a:srgbClr val="D4D4D4"/>
-                </a:solidFill>
-                <a:latin typeface="Consolas" panose="020B0609020204030204" pitchFamily="49" charset="0"/>
-              </a:rPr>
-              <a:t> </a:t>
-            </a:r>
-            <a:r>
-              <a:rPr lang="pt-BR" sz="1600" dirty="0" err="1">
-                <a:solidFill>
-                  <a:srgbClr val="4EC9B0"/>
-                </a:solidFill>
-                <a:latin typeface="Consolas" panose="020B0609020204030204" pitchFamily="49" charset="0"/>
-              </a:rPr>
-              <a:t>void</a:t>
-            </a:r>
-            <a:r>
-              <a:rPr lang="pt-BR" sz="1600" dirty="0">
-                <a:solidFill>
-                  <a:srgbClr val="D4D4D4"/>
-                </a:solidFill>
-                <a:latin typeface="Consolas" panose="020B0609020204030204" pitchFamily="49" charset="0"/>
-              </a:rPr>
-              <a:t> </a:t>
-            </a:r>
-            <a:r>
-              <a:rPr lang="pt-BR" sz="1600" dirty="0">
-                <a:solidFill>
-                  <a:srgbClr val="DCDCAA"/>
-                </a:solidFill>
-                <a:latin typeface="Consolas" panose="020B0609020204030204" pitchFamily="49" charset="0"/>
-              </a:rPr>
-              <a:t>update</a:t>
-            </a:r>
-            <a:r>
-              <a:rPr lang="pt-BR" sz="1600" dirty="0">
-                <a:solidFill>
-                  <a:srgbClr val="D4D4D4"/>
-                </a:solidFill>
-                <a:latin typeface="Consolas" panose="020B0609020204030204" pitchFamily="49" charset="0"/>
-              </a:rPr>
-              <a:t>(</a:t>
-            </a:r>
-            <a:r>
-              <a:rPr lang="pt-BR" sz="1600" dirty="0" err="1">
-                <a:solidFill>
-                  <a:srgbClr val="4EC9B0"/>
-                </a:solidFill>
-                <a:latin typeface="Consolas" panose="020B0609020204030204" pitchFamily="49" charset="0"/>
-              </a:rPr>
-              <a:t>Guest</a:t>
-            </a:r>
-            <a:r>
-              <a:rPr lang="pt-BR" sz="1600" dirty="0">
-                <a:solidFill>
-                  <a:srgbClr val="D4D4D4"/>
-                </a:solidFill>
-                <a:latin typeface="Consolas" panose="020B0609020204030204" pitchFamily="49" charset="0"/>
-              </a:rPr>
-              <a:t> </a:t>
-            </a:r>
-            <a:r>
-              <a:rPr lang="pt-BR" sz="1600" dirty="0" err="1">
-                <a:solidFill>
-                  <a:srgbClr val="9CDCFE"/>
-                </a:solidFill>
-                <a:latin typeface="Consolas" panose="020B0609020204030204" pitchFamily="49" charset="0"/>
-              </a:rPr>
-              <a:t>guest</a:t>
-            </a:r>
-            <a:r>
-              <a:rPr lang="pt-BR" sz="1600" dirty="0">
-                <a:solidFill>
-                  <a:srgbClr val="D4D4D4"/>
-                </a:solidFill>
-                <a:latin typeface="Consolas" panose="020B0609020204030204" pitchFamily="49" charset="0"/>
-              </a:rPr>
-              <a:t>);</a:t>
-            </a:r>
-          </a:p>
-          <a:p>
-            <a:br>
-              <a:rPr lang="pt-BR" sz="1600" dirty="0">
-                <a:solidFill>
-                  <a:srgbClr val="D4D4D4"/>
-                </a:solidFill>
-                <a:latin typeface="Consolas" panose="020B0609020204030204" pitchFamily="49" charset="0"/>
-              </a:rPr>
-            </a:br>
-            <a:r>
-              <a:rPr lang="pt-BR" sz="1600" dirty="0">
-                <a:solidFill>
-                  <a:srgbClr val="D4D4D4"/>
-                </a:solidFill>
-                <a:latin typeface="Consolas" panose="020B0609020204030204" pitchFamily="49" charset="0"/>
-              </a:rPr>
-              <a:t>   </a:t>
-            </a:r>
-            <a:r>
-              <a:rPr lang="pt-BR" sz="1600" dirty="0" err="1">
-                <a:solidFill>
-                  <a:srgbClr val="569CD6"/>
-                </a:solidFill>
-                <a:latin typeface="Consolas" panose="020B0609020204030204" pitchFamily="49" charset="0"/>
-              </a:rPr>
-              <a:t>public</a:t>
-            </a:r>
-            <a:r>
-              <a:rPr lang="pt-BR" sz="1600" dirty="0">
-                <a:solidFill>
-                  <a:srgbClr val="D4D4D4"/>
-                </a:solidFill>
-                <a:latin typeface="Consolas" panose="020B0609020204030204" pitchFamily="49" charset="0"/>
-              </a:rPr>
-              <a:t> </a:t>
-            </a:r>
-            <a:r>
-              <a:rPr lang="pt-BR" sz="1600" dirty="0" err="1">
-                <a:solidFill>
-                  <a:srgbClr val="4EC9B0"/>
-                </a:solidFill>
-                <a:latin typeface="Consolas" panose="020B0609020204030204" pitchFamily="49" charset="0"/>
-              </a:rPr>
-              <a:t>void</a:t>
-            </a:r>
-            <a:r>
-              <a:rPr lang="pt-BR" sz="1600" dirty="0">
-                <a:solidFill>
-                  <a:srgbClr val="D4D4D4"/>
-                </a:solidFill>
-                <a:latin typeface="Consolas" panose="020B0609020204030204" pitchFamily="49" charset="0"/>
-              </a:rPr>
-              <a:t> </a:t>
-            </a:r>
-            <a:r>
-              <a:rPr lang="pt-BR" sz="1600" dirty="0">
-                <a:solidFill>
-                  <a:srgbClr val="DCDCAA"/>
-                </a:solidFill>
-                <a:latin typeface="Consolas" panose="020B0609020204030204" pitchFamily="49" charset="0"/>
-              </a:rPr>
-              <a:t>delete</a:t>
-            </a:r>
-            <a:r>
-              <a:rPr lang="pt-BR" sz="1600" dirty="0">
-                <a:solidFill>
-                  <a:srgbClr val="D4D4D4"/>
-                </a:solidFill>
-                <a:latin typeface="Consolas" panose="020B0609020204030204" pitchFamily="49" charset="0"/>
-              </a:rPr>
-              <a:t>(</a:t>
-            </a:r>
-            <a:r>
-              <a:rPr lang="pt-BR" sz="1600" dirty="0" err="1">
-                <a:solidFill>
-                  <a:srgbClr val="4EC9B0"/>
-                </a:solidFill>
-                <a:latin typeface="Consolas" panose="020B0609020204030204" pitchFamily="49" charset="0"/>
-              </a:rPr>
-              <a:t>Guest</a:t>
-            </a:r>
-            <a:r>
-              <a:rPr lang="pt-BR" sz="1600" dirty="0">
-                <a:solidFill>
-                  <a:srgbClr val="D4D4D4"/>
-                </a:solidFill>
-                <a:latin typeface="Consolas" panose="020B0609020204030204" pitchFamily="49" charset="0"/>
-              </a:rPr>
-              <a:t> </a:t>
-            </a:r>
-            <a:r>
-              <a:rPr lang="pt-BR" sz="1600" dirty="0" err="1">
-                <a:solidFill>
-                  <a:srgbClr val="9CDCFE"/>
-                </a:solidFill>
-                <a:latin typeface="Consolas" panose="020B0609020204030204" pitchFamily="49" charset="0"/>
-              </a:rPr>
-              <a:t>guest</a:t>
-            </a:r>
-            <a:r>
-              <a:rPr lang="pt-BR" sz="1600" dirty="0">
-                <a:solidFill>
-                  <a:srgbClr val="D4D4D4"/>
-                </a:solidFill>
-                <a:latin typeface="Consolas" panose="020B0609020204030204" pitchFamily="49" charset="0"/>
-              </a:rPr>
-              <a:t>);</a:t>
-            </a:r>
-          </a:p>
-          <a:p>
-            <a:r>
-              <a:rPr lang="pt-BR" sz="1600" dirty="0">
-                <a:solidFill>
-                  <a:srgbClr val="D4D4D4"/>
-                </a:solidFill>
-                <a:latin typeface="Consolas" panose="020B0609020204030204" pitchFamily="49" charset="0"/>
-              </a:rPr>
-              <a:t>}</a:t>
+              <a:t>DAO</a:t>
             </a:r>
           </a:p>
         </p:txBody>
@@ -17699,7 +17354,7 @@
     </p:spTree>
     <p:extLst>
       <p:ext uri="{BB962C8B-B14F-4D97-AF65-F5344CB8AC3E}">
-        <p14:creationId xmlns:p14="http://schemas.microsoft.com/office/powerpoint/2010/main" val="497262610"/>
+        <p14:creationId xmlns:p14="http://schemas.microsoft.com/office/powerpoint/2010/main" val="734261597"/>
       </p:ext>
     </p:extLst>
   </p:cSld>
@@ -17965,6 +17620,1326 @@
         </p:nvSpPr>
         <p:spPr>
           <a:xfrm>
+            <a:off x="1195262" y="1947738"/>
+            <a:ext cx="7132318" cy="3139321"/>
+          </a:xfrm>
+          <a:prstGeom prst="rect">
+            <a:avLst/>
+          </a:prstGeom>
+          <a:noFill/>
+        </p:spPr>
+        <p:txBody>
+          <a:bodyPr wrap="square" rtlCol="0">
+            <a:spAutoFit/>
+          </a:bodyPr>
+          <a:lstStyle/>
+          <a:p>
+            <a:pPr algn="just"/>
+            <a:r>
+              <a:rPr lang="pt-BR" sz="1800" dirty="0">
+                <a:solidFill>
+                  <a:schemeClr val="bg1">
+                    <a:lumMod val="85000"/>
+                  </a:schemeClr>
+                </a:solidFill>
+                <a:latin typeface="Verdana" panose="020B0604030504040204" pitchFamily="34" charset="0"/>
+                <a:ea typeface="Verdana" panose="020B0604030504040204" pitchFamily="34" charset="0"/>
+                <a:cs typeface="Calibri" panose="020F0502020204030204" pitchFamily="34" charset="0"/>
+              </a:rPr>
+              <a:t>O padrão Data Access </a:t>
+            </a:r>
+            <a:r>
+              <a:rPr lang="pt-BR" sz="1800" dirty="0" err="1">
+                <a:solidFill>
+                  <a:schemeClr val="bg1">
+                    <a:lumMod val="85000"/>
+                  </a:schemeClr>
+                </a:solidFill>
+                <a:latin typeface="Verdana" panose="020B0604030504040204" pitchFamily="34" charset="0"/>
+                <a:ea typeface="Verdana" panose="020B0604030504040204" pitchFamily="34" charset="0"/>
+                <a:cs typeface="Calibri" panose="020F0502020204030204" pitchFamily="34" charset="0"/>
+              </a:rPr>
+              <a:t>Object</a:t>
+            </a:r>
+            <a:r>
+              <a:rPr lang="pt-BR" sz="1800" dirty="0">
+                <a:solidFill>
+                  <a:schemeClr val="bg1">
+                    <a:lumMod val="85000"/>
+                  </a:schemeClr>
+                </a:solidFill>
+                <a:latin typeface="Verdana" panose="020B0604030504040204" pitchFamily="34" charset="0"/>
+                <a:ea typeface="Verdana" panose="020B0604030504040204" pitchFamily="34" charset="0"/>
+                <a:cs typeface="Calibri" panose="020F0502020204030204" pitchFamily="34" charset="0"/>
+              </a:rPr>
+              <a:t> (DAO) é um padrão estrutural que também nos permite isolar a camada de modelo da camada de persistência, normalmente classes Java que fazem a conexão com um banco de dados relacional.</a:t>
+            </a:r>
+          </a:p>
+          <a:p>
+            <a:pPr algn="just"/>
+            <a:endParaRPr lang="pt-BR" sz="1800" dirty="0">
+              <a:solidFill>
+                <a:schemeClr val="bg1">
+                  <a:lumMod val="85000"/>
+                </a:schemeClr>
+              </a:solidFill>
+              <a:latin typeface="Verdana" panose="020B0604030504040204" pitchFamily="34" charset="0"/>
+              <a:ea typeface="Verdana" panose="020B0604030504040204" pitchFamily="34" charset="0"/>
+              <a:cs typeface="Calibri" panose="020F0502020204030204" pitchFamily="34" charset="0"/>
+            </a:endParaRPr>
+          </a:p>
+          <a:p>
+            <a:pPr algn="just"/>
+            <a:r>
+              <a:rPr lang="pt-BR" sz="1800" dirty="0">
+                <a:solidFill>
+                  <a:schemeClr val="bg1">
+                    <a:lumMod val="85000"/>
+                  </a:schemeClr>
+                </a:solidFill>
+                <a:latin typeface="Verdana" panose="020B0604030504040204" pitchFamily="34" charset="0"/>
+                <a:ea typeface="Verdana" panose="020B0604030504040204" pitchFamily="34" charset="0"/>
+                <a:cs typeface="Calibri" panose="020F0502020204030204" pitchFamily="34" charset="0"/>
+              </a:rPr>
+              <a:t>A sua principal  função é ocultar da camada de modelo toda a complexidade envolvida na execução de operações do tipo CRUD.</a:t>
+            </a:r>
+          </a:p>
+          <a:p>
+            <a:pPr algn="just"/>
+            <a:endParaRPr lang="pt-BR" sz="1800" dirty="0">
+              <a:solidFill>
+                <a:schemeClr val="bg1">
+                  <a:lumMod val="85000"/>
+                </a:schemeClr>
+              </a:solidFill>
+              <a:latin typeface="Verdana" panose="020B0604030504040204" pitchFamily="34" charset="0"/>
+              <a:ea typeface="Verdana" panose="020B0604030504040204" pitchFamily="34" charset="0"/>
+              <a:cs typeface="Calibri" panose="020F0502020204030204" pitchFamily="34" charset="0"/>
+            </a:endParaRPr>
+          </a:p>
+          <a:p>
+            <a:pPr algn="just"/>
+            <a:r>
+              <a:rPr lang="pt-BR" sz="1800" dirty="0">
+                <a:solidFill>
+                  <a:schemeClr val="bg1">
+                    <a:lumMod val="85000"/>
+                  </a:schemeClr>
+                </a:solidFill>
+                <a:latin typeface="Verdana" panose="020B0604030504040204" pitchFamily="34" charset="0"/>
+                <a:ea typeface="Verdana" panose="020B0604030504040204" pitchFamily="34" charset="0"/>
+                <a:cs typeface="Calibri" panose="020F0502020204030204" pitchFamily="34" charset="0"/>
+              </a:rPr>
+              <a:t>Isso permite que as duas camadas evoluam separadamente sem saber nada uma da outra.</a:t>
+            </a:r>
+          </a:p>
+        </p:txBody>
+      </p:sp>
+    </p:spTree>
+    <p:extLst>
+      <p:ext uri="{BB962C8B-B14F-4D97-AF65-F5344CB8AC3E}">
+        <p14:creationId xmlns:p14="http://schemas.microsoft.com/office/powerpoint/2010/main" val="829373984"/>
+      </p:ext>
+    </p:extLst>
+  </p:cSld>
+  <p:clrMapOvr>
+    <a:masterClrMapping/>
+  </p:clrMapOvr>
+</p:sld>
+</file>
+
+<file path=ppt/slides/slide13.xml><?xml version="1.0" encoding="utf-8"?>
+<p:sld xmlns:a="http://schemas.openxmlformats.org/drawingml/2006/main" xmlns:r="http://schemas.openxmlformats.org/officeDocument/2006/relationships" xmlns:p="http://schemas.openxmlformats.org/presentationml/2006/main">
+  <p:cSld>
+    <p:bg>
+      <p:bgPr>
+        <a:solidFill>
+          <a:srgbClr val="54416B"/>
+        </a:solidFill>
+        <a:effectLst/>
+      </p:bgPr>
+    </p:bg>
+    <p:spTree>
+      <p:nvGrpSpPr>
+        <p:cNvPr id="1" name="Shape 97"/>
+        <p:cNvGrpSpPr/>
+        <p:nvPr/>
+      </p:nvGrpSpPr>
+      <p:grpSpPr>
+        <a:xfrm>
+          <a:off x="0" y="0"/>
+          <a:ext cx="0" cy="0"/>
+          <a:chOff x="0" y="0"/>
+          <a:chExt cx="0" cy="0"/>
+        </a:xfrm>
+      </p:grpSpPr>
+      <p:pic>
+        <p:nvPicPr>
+          <p:cNvPr id="7" name="Imagem 6">
+            <a:extLst>
+              <a:ext uri="{FF2B5EF4-FFF2-40B4-BE49-F238E27FC236}">
+                <a16:creationId xmlns:a16="http://schemas.microsoft.com/office/drawing/2014/main" id="{D6C112AC-0AED-409F-A046-42B8C81D7BFA}"/>
+              </a:ext>
+            </a:extLst>
+          </p:cNvPr>
+          <p:cNvPicPr>
+            <a:picLocks noChangeAspect="1"/>
+          </p:cNvPicPr>
+          <p:nvPr/>
+        </p:nvPicPr>
+        <p:blipFill>
+          <a:blip r:embed="rId3"/>
+          <a:stretch>
+            <a:fillRect/>
+          </a:stretch>
+        </p:blipFill>
+        <p:spPr>
+          <a:xfrm>
+            <a:off x="632061" y="174580"/>
+            <a:ext cx="746574" cy="358356"/>
+          </a:xfrm>
+          <a:prstGeom prst="rect">
+            <a:avLst/>
+          </a:prstGeom>
+        </p:spPr>
+      </p:pic>
+      <p:sp>
+        <p:nvSpPr>
+          <p:cNvPr id="12" name="Retângulo 11">
+            <a:extLst>
+              <a:ext uri="{FF2B5EF4-FFF2-40B4-BE49-F238E27FC236}">
+                <a16:creationId xmlns:a16="http://schemas.microsoft.com/office/drawing/2014/main" id="{271F94DF-0C4F-4EC5-8956-4969FA418718}"/>
+              </a:ext>
+            </a:extLst>
+          </p:cNvPr>
+          <p:cNvSpPr/>
+          <p:nvPr/>
+        </p:nvSpPr>
+        <p:spPr>
+          <a:xfrm>
+            <a:off x="0" y="0"/>
+            <a:ext cx="450166" cy="6858000"/>
+          </a:xfrm>
+          <a:prstGeom prst="rect">
+            <a:avLst/>
+          </a:prstGeom>
+          <a:gradFill>
+            <a:gsLst>
+              <a:gs pos="0">
+                <a:schemeClr val="accent1">
+                  <a:lumMod val="5000"/>
+                  <a:lumOff val="95000"/>
+                </a:schemeClr>
+              </a:gs>
+              <a:gs pos="100000">
+                <a:srgbClr val="54416B"/>
+              </a:gs>
+            </a:gsLst>
+            <a:path path="circle">
+              <a:fillToRect l="100000" t="100000"/>
+            </a:path>
+          </a:gradFill>
+          <a:ln>
+            <a:noFill/>
+          </a:ln>
+        </p:spPr>
+        <p:style>
+          <a:lnRef idx="2">
+            <a:schemeClr val="accent1">
+              <a:shade val="50000"/>
+            </a:schemeClr>
+          </a:lnRef>
+          <a:fillRef idx="1">
+            <a:schemeClr val="accent1"/>
+          </a:fillRef>
+          <a:effectRef idx="0">
+            <a:schemeClr val="accent1"/>
+          </a:effectRef>
+          <a:fontRef idx="minor">
+            <a:schemeClr val="lt1"/>
+          </a:fontRef>
+        </p:style>
+        <p:txBody>
+          <a:bodyPr rtlCol="0" anchor="ctr"/>
+          <a:lstStyle/>
+          <a:p>
+            <a:pPr algn="ctr"/>
+            <a:endParaRPr lang="pt-BR"/>
+          </a:p>
+        </p:txBody>
+      </p:sp>
+      <p:pic>
+        <p:nvPicPr>
+          <p:cNvPr id="13" name="Imagem 12">
+            <a:extLst>
+              <a:ext uri="{FF2B5EF4-FFF2-40B4-BE49-F238E27FC236}">
+                <a16:creationId xmlns:a16="http://schemas.microsoft.com/office/drawing/2014/main" id="{445294E5-3ADA-46DE-9D79-9BCEAAF12DBB}"/>
+              </a:ext>
+            </a:extLst>
+          </p:cNvPr>
+          <p:cNvPicPr>
+            <a:picLocks noChangeAspect="1"/>
+          </p:cNvPicPr>
+          <p:nvPr/>
+        </p:nvPicPr>
+        <p:blipFill>
+          <a:blip r:embed="rId3"/>
+          <a:stretch>
+            <a:fillRect/>
+          </a:stretch>
+        </p:blipFill>
+        <p:spPr>
+          <a:xfrm rot="16200000">
+            <a:off x="-148204" y="6213725"/>
+            <a:ext cx="746574" cy="358356"/>
+          </a:xfrm>
+          <a:prstGeom prst="rect">
+            <a:avLst/>
+          </a:prstGeom>
+        </p:spPr>
+      </p:pic>
+      <p:sp>
+        <p:nvSpPr>
+          <p:cNvPr id="14" name="CaixaDeTexto 13">
+            <a:extLst>
+              <a:ext uri="{FF2B5EF4-FFF2-40B4-BE49-F238E27FC236}">
+                <a16:creationId xmlns:a16="http://schemas.microsoft.com/office/drawing/2014/main" id="{F0069CE5-7C5D-4662-AABB-EB02AB282D94}"/>
+              </a:ext>
+            </a:extLst>
+          </p:cNvPr>
+          <p:cNvSpPr txBox="1"/>
+          <p:nvPr/>
+        </p:nvSpPr>
+        <p:spPr>
+          <a:xfrm rot="16200000">
+            <a:off x="-2323823" y="3225011"/>
+            <a:ext cx="5097813" cy="307777"/>
+          </a:xfrm>
+          <a:prstGeom prst="rect">
+            <a:avLst/>
+          </a:prstGeom>
+          <a:noFill/>
+        </p:spPr>
+        <p:txBody>
+          <a:bodyPr wrap="square" rtlCol="0">
+            <a:spAutoFit/>
+          </a:bodyPr>
+          <a:lstStyle/>
+          <a:p>
+            <a:r>
+              <a:rPr lang="pt-BR" dirty="0">
+                <a:latin typeface="Calibri" panose="020F0502020204030204" pitchFamily="34" charset="0"/>
+                <a:cs typeface="Calibri" panose="020F0502020204030204" pitchFamily="34" charset="0"/>
+              </a:rPr>
+              <a:t>FAI - Centro de Ensino Superior em Gestão, Tecnologia e Educação</a:t>
+            </a:r>
+          </a:p>
+        </p:txBody>
+      </p:sp>
+      <p:cxnSp>
+        <p:nvCxnSpPr>
+          <p:cNvPr id="16" name="Conector reto 15">
+            <a:extLst>
+              <a:ext uri="{FF2B5EF4-FFF2-40B4-BE49-F238E27FC236}">
+                <a16:creationId xmlns:a16="http://schemas.microsoft.com/office/drawing/2014/main" id="{6116879A-0ED7-47C5-A7F1-3BE9B9E35DD5}"/>
+              </a:ext>
+            </a:extLst>
+          </p:cNvPr>
+          <p:cNvCxnSpPr>
+            <a:cxnSpLocks/>
+          </p:cNvCxnSpPr>
+          <p:nvPr/>
+        </p:nvCxnSpPr>
+        <p:spPr>
+          <a:xfrm>
+            <a:off x="632061" y="633045"/>
+            <a:ext cx="8258721" cy="0"/>
+          </a:xfrm>
+          <a:prstGeom prst="line">
+            <a:avLst/>
+          </a:prstGeom>
+          <a:ln>
+            <a:gradFill flip="none" rotWithShape="1">
+              <a:gsLst>
+                <a:gs pos="0">
+                  <a:schemeClr val="accent3">
+                    <a:lumMod val="75000"/>
+                  </a:schemeClr>
+                </a:gs>
+                <a:gs pos="100000">
+                  <a:srgbClr val="4F6228"/>
+                </a:gs>
+              </a:gsLst>
+              <a:lin ang="0" scaled="1"/>
+              <a:tileRect/>
+            </a:gradFill>
+          </a:ln>
+        </p:spPr>
+        <p:style>
+          <a:lnRef idx="1">
+            <a:schemeClr val="accent1"/>
+          </a:lnRef>
+          <a:fillRef idx="0">
+            <a:schemeClr val="accent1"/>
+          </a:fillRef>
+          <a:effectRef idx="0">
+            <a:schemeClr val="accent1"/>
+          </a:effectRef>
+          <a:fontRef idx="minor">
+            <a:schemeClr val="tx1"/>
+          </a:fontRef>
+        </p:style>
+      </p:cxnSp>
+      <p:sp>
+        <p:nvSpPr>
+          <p:cNvPr id="9" name="CaixaDeTexto 8">
+            <a:extLst>
+              <a:ext uri="{FF2B5EF4-FFF2-40B4-BE49-F238E27FC236}">
+                <a16:creationId xmlns:a16="http://schemas.microsoft.com/office/drawing/2014/main" id="{E21B1250-A8A1-4771-8929-41EC66F5748E}"/>
+              </a:ext>
+            </a:extLst>
+          </p:cNvPr>
+          <p:cNvSpPr txBox="1"/>
+          <p:nvPr/>
+        </p:nvSpPr>
+        <p:spPr>
+          <a:xfrm>
+            <a:off x="1195262" y="829993"/>
+            <a:ext cx="7132318" cy="754053"/>
+          </a:xfrm>
+          <a:prstGeom prst="rect">
+            <a:avLst/>
+          </a:prstGeom>
+          <a:noFill/>
+        </p:spPr>
+        <p:txBody>
+          <a:bodyPr wrap="square" rtlCol="0">
+            <a:spAutoFit/>
+          </a:bodyPr>
+          <a:lstStyle/>
+          <a:p>
+            <a:pPr algn="just"/>
+            <a:r>
+              <a:rPr lang="pt-BR" sz="2500" dirty="0">
+                <a:solidFill>
+                  <a:schemeClr val="bg1">
+                    <a:lumMod val="85000"/>
+                  </a:schemeClr>
+                </a:solidFill>
+                <a:latin typeface="Verdana" panose="020B0604030504040204" pitchFamily="34" charset="0"/>
+                <a:ea typeface="Verdana" panose="020B0604030504040204" pitchFamily="34" charset="0"/>
+                <a:cs typeface="Calibri" panose="020F0502020204030204" pitchFamily="34" charset="0"/>
+              </a:rPr>
+              <a:t>1º - </a:t>
+            </a:r>
+            <a:r>
+              <a:rPr lang="pt-BR" sz="1800" dirty="0">
+                <a:solidFill>
+                  <a:schemeClr val="bg1">
+                    <a:lumMod val="85000"/>
+                  </a:schemeClr>
+                </a:solidFill>
+                <a:latin typeface="Verdana" panose="020B0604030504040204" pitchFamily="34" charset="0"/>
+                <a:ea typeface="Verdana" panose="020B0604030504040204" pitchFamily="34" charset="0"/>
+                <a:cs typeface="Calibri" panose="020F0502020204030204" pitchFamily="34" charset="0"/>
+              </a:rPr>
+              <a:t>Vamos criar uma interface para padronizar o acesso aos métodos do nosso DAO  </a:t>
+            </a:r>
+          </a:p>
+        </p:txBody>
+      </p:sp>
+      <p:sp>
+        <p:nvSpPr>
+          <p:cNvPr id="8" name="CaixaDeTexto 7">
+            <a:extLst>
+              <a:ext uri="{FF2B5EF4-FFF2-40B4-BE49-F238E27FC236}">
+                <a16:creationId xmlns:a16="http://schemas.microsoft.com/office/drawing/2014/main" id="{F0E0CC6B-812B-4F4D-98D2-ED48DBF93802}"/>
+              </a:ext>
+            </a:extLst>
+          </p:cNvPr>
+          <p:cNvSpPr txBox="1"/>
+          <p:nvPr/>
+        </p:nvSpPr>
+        <p:spPr>
+          <a:xfrm>
+            <a:off x="2474386" y="2731400"/>
+            <a:ext cx="4574069" cy="3046988"/>
+          </a:xfrm>
+          <a:prstGeom prst="rect">
+            <a:avLst/>
+          </a:prstGeom>
+          <a:noFill/>
+        </p:spPr>
+        <p:txBody>
+          <a:bodyPr wrap="square" rtlCol="0">
+            <a:spAutoFit/>
+          </a:bodyPr>
+          <a:lstStyle/>
+          <a:p>
+            <a:r>
+              <a:rPr lang="pt-BR" sz="1600" dirty="0" err="1">
+                <a:solidFill>
+                  <a:srgbClr val="569CD6"/>
+                </a:solidFill>
+                <a:latin typeface="Consolas" panose="020B0609020204030204" pitchFamily="49" charset="0"/>
+              </a:rPr>
+              <a:t>public</a:t>
+            </a:r>
+            <a:r>
+              <a:rPr lang="pt-BR" sz="1600" dirty="0">
+                <a:solidFill>
+                  <a:srgbClr val="D4D4D4"/>
+                </a:solidFill>
+                <a:latin typeface="Consolas" panose="020B0609020204030204" pitchFamily="49" charset="0"/>
+              </a:rPr>
+              <a:t> </a:t>
+            </a:r>
+            <a:r>
+              <a:rPr lang="pt-BR" sz="1600" dirty="0">
+                <a:solidFill>
+                  <a:srgbClr val="569CD6"/>
+                </a:solidFill>
+                <a:latin typeface="Consolas" panose="020B0609020204030204" pitchFamily="49" charset="0"/>
+              </a:rPr>
+              <a:t>interface</a:t>
+            </a:r>
+            <a:r>
+              <a:rPr lang="pt-BR" sz="1600" dirty="0">
+                <a:solidFill>
+                  <a:srgbClr val="D4D4D4"/>
+                </a:solidFill>
+                <a:latin typeface="Consolas" panose="020B0609020204030204" pitchFamily="49" charset="0"/>
+              </a:rPr>
+              <a:t> </a:t>
+            </a:r>
+            <a:r>
+              <a:rPr lang="pt-BR" sz="1600" dirty="0" err="1">
+                <a:solidFill>
+                  <a:srgbClr val="4EC9B0"/>
+                </a:solidFill>
+                <a:latin typeface="Consolas" panose="020B0609020204030204" pitchFamily="49" charset="0"/>
+              </a:rPr>
+              <a:t>IGuestDao</a:t>
+            </a:r>
+            <a:r>
+              <a:rPr lang="pt-BR" sz="1600" dirty="0">
+                <a:solidFill>
+                  <a:srgbClr val="D4D4D4"/>
+                </a:solidFill>
+                <a:latin typeface="Consolas" panose="020B0609020204030204" pitchFamily="49" charset="0"/>
+              </a:rPr>
+              <a:t> {</a:t>
+            </a:r>
+          </a:p>
+          <a:p>
+            <a:endParaRPr lang="pt-BR" sz="1600" dirty="0">
+              <a:solidFill>
+                <a:srgbClr val="D4D4D4"/>
+              </a:solidFill>
+              <a:latin typeface="Consolas" panose="020B0609020204030204" pitchFamily="49" charset="0"/>
+            </a:endParaRPr>
+          </a:p>
+          <a:p>
+            <a:r>
+              <a:rPr lang="pt-BR" sz="1600" dirty="0">
+                <a:solidFill>
+                  <a:srgbClr val="569CD6"/>
+                </a:solidFill>
+                <a:latin typeface="Consolas" panose="020B0609020204030204" pitchFamily="49" charset="0"/>
+              </a:rPr>
+              <a:t>   </a:t>
+            </a:r>
+            <a:r>
+              <a:rPr lang="pt-BR" sz="1600" dirty="0" err="1">
+                <a:solidFill>
+                  <a:srgbClr val="569CD6"/>
+                </a:solidFill>
+                <a:latin typeface="Consolas" panose="020B0609020204030204" pitchFamily="49" charset="0"/>
+              </a:rPr>
+              <a:t>public</a:t>
+            </a:r>
+            <a:r>
+              <a:rPr lang="pt-BR" sz="1600" dirty="0">
+                <a:solidFill>
+                  <a:srgbClr val="D4D4D4"/>
+                </a:solidFill>
+                <a:latin typeface="Consolas" panose="020B0609020204030204" pitchFamily="49" charset="0"/>
+              </a:rPr>
+              <a:t> </a:t>
+            </a:r>
+            <a:r>
+              <a:rPr lang="pt-BR" sz="1600" dirty="0" err="1">
+                <a:solidFill>
+                  <a:srgbClr val="4EC9B0"/>
+                </a:solidFill>
+                <a:latin typeface="Consolas" panose="020B0609020204030204" pitchFamily="49" charset="0"/>
+              </a:rPr>
+              <a:t>void</a:t>
+            </a:r>
+            <a:r>
+              <a:rPr lang="pt-BR" sz="1600" dirty="0">
+                <a:solidFill>
+                  <a:srgbClr val="D4D4D4"/>
+                </a:solidFill>
+                <a:latin typeface="Consolas" panose="020B0609020204030204" pitchFamily="49" charset="0"/>
+              </a:rPr>
+              <a:t> </a:t>
+            </a:r>
+            <a:r>
+              <a:rPr lang="pt-BR" sz="1600" dirty="0" err="1">
+                <a:solidFill>
+                  <a:srgbClr val="DCDCAA"/>
+                </a:solidFill>
+                <a:latin typeface="Consolas" panose="020B0609020204030204" pitchFamily="49" charset="0"/>
+              </a:rPr>
+              <a:t>create</a:t>
+            </a:r>
+            <a:r>
+              <a:rPr lang="pt-BR" sz="1600" dirty="0">
+                <a:solidFill>
+                  <a:srgbClr val="D4D4D4"/>
+                </a:solidFill>
+                <a:latin typeface="Consolas" panose="020B0609020204030204" pitchFamily="49" charset="0"/>
+              </a:rPr>
+              <a:t>(</a:t>
+            </a:r>
+            <a:r>
+              <a:rPr lang="pt-BR" sz="1600" dirty="0" err="1">
+                <a:solidFill>
+                  <a:srgbClr val="4EC9B0"/>
+                </a:solidFill>
+                <a:latin typeface="Consolas" panose="020B0609020204030204" pitchFamily="49" charset="0"/>
+              </a:rPr>
+              <a:t>Guest</a:t>
+            </a:r>
+            <a:r>
+              <a:rPr lang="pt-BR" sz="1600" dirty="0">
+                <a:solidFill>
+                  <a:srgbClr val="D4D4D4"/>
+                </a:solidFill>
+                <a:latin typeface="Consolas" panose="020B0609020204030204" pitchFamily="49" charset="0"/>
+              </a:rPr>
+              <a:t> </a:t>
+            </a:r>
+            <a:r>
+              <a:rPr lang="pt-BR" sz="1600" dirty="0" err="1">
+                <a:solidFill>
+                  <a:srgbClr val="9CDCFE"/>
+                </a:solidFill>
+                <a:latin typeface="Consolas" panose="020B0609020204030204" pitchFamily="49" charset="0"/>
+              </a:rPr>
+              <a:t>guest</a:t>
+            </a:r>
+            <a:r>
+              <a:rPr lang="pt-BR" sz="1600" dirty="0">
+                <a:solidFill>
+                  <a:srgbClr val="D4D4D4"/>
+                </a:solidFill>
+                <a:latin typeface="Consolas" panose="020B0609020204030204" pitchFamily="49" charset="0"/>
+              </a:rPr>
+              <a:t>);</a:t>
+            </a:r>
+          </a:p>
+          <a:p>
+            <a:br>
+              <a:rPr lang="pt-BR" sz="1600" dirty="0">
+                <a:solidFill>
+                  <a:srgbClr val="D4D4D4"/>
+                </a:solidFill>
+                <a:latin typeface="Consolas" panose="020B0609020204030204" pitchFamily="49" charset="0"/>
+              </a:rPr>
+            </a:br>
+            <a:r>
+              <a:rPr lang="pt-BR" sz="1600" dirty="0">
+                <a:solidFill>
+                  <a:srgbClr val="D4D4D4"/>
+                </a:solidFill>
+                <a:latin typeface="Consolas" panose="020B0609020204030204" pitchFamily="49" charset="0"/>
+              </a:rPr>
+              <a:t>   </a:t>
+            </a:r>
+            <a:r>
+              <a:rPr lang="pt-BR" sz="1600" dirty="0" err="1">
+                <a:solidFill>
+                  <a:srgbClr val="569CD6"/>
+                </a:solidFill>
+                <a:latin typeface="Consolas" panose="020B0609020204030204" pitchFamily="49" charset="0"/>
+              </a:rPr>
+              <a:t>public</a:t>
+            </a:r>
+            <a:r>
+              <a:rPr lang="pt-BR" sz="1600" dirty="0">
+                <a:solidFill>
+                  <a:srgbClr val="D4D4D4"/>
+                </a:solidFill>
+                <a:latin typeface="Consolas" panose="020B0609020204030204" pitchFamily="49" charset="0"/>
+              </a:rPr>
+              <a:t> </a:t>
+            </a:r>
+            <a:r>
+              <a:rPr lang="pt-BR" sz="1600" dirty="0" err="1">
+                <a:solidFill>
+                  <a:srgbClr val="4EC9B0"/>
+                </a:solidFill>
+                <a:latin typeface="Consolas" panose="020B0609020204030204" pitchFamily="49" charset="0"/>
+              </a:rPr>
+              <a:t>List</a:t>
+            </a:r>
+            <a:r>
+              <a:rPr lang="pt-BR" sz="1600" dirty="0">
+                <a:solidFill>
+                  <a:srgbClr val="D4D4D4"/>
+                </a:solidFill>
+                <a:latin typeface="Consolas" panose="020B0609020204030204" pitchFamily="49" charset="0"/>
+              </a:rPr>
+              <a:t>&lt;</a:t>
+            </a:r>
+            <a:r>
+              <a:rPr lang="pt-BR" sz="1600" dirty="0" err="1">
+                <a:solidFill>
+                  <a:srgbClr val="4EC9B0"/>
+                </a:solidFill>
+                <a:latin typeface="Consolas" panose="020B0609020204030204" pitchFamily="49" charset="0"/>
+              </a:rPr>
+              <a:t>Guest</a:t>
+            </a:r>
+            <a:r>
+              <a:rPr lang="pt-BR" sz="1600" dirty="0">
+                <a:solidFill>
+                  <a:srgbClr val="D4D4D4"/>
+                </a:solidFill>
+                <a:latin typeface="Consolas" panose="020B0609020204030204" pitchFamily="49" charset="0"/>
+              </a:rPr>
+              <a:t>&gt; </a:t>
+            </a:r>
+            <a:r>
+              <a:rPr lang="pt-BR" sz="1600" dirty="0" err="1">
+                <a:solidFill>
+                  <a:srgbClr val="DCDCAA"/>
+                </a:solidFill>
+                <a:latin typeface="Consolas" panose="020B0609020204030204" pitchFamily="49" charset="0"/>
+              </a:rPr>
+              <a:t>readAll</a:t>
+            </a:r>
+            <a:r>
+              <a:rPr lang="pt-BR" sz="1600" dirty="0">
+                <a:solidFill>
+                  <a:srgbClr val="D4D4D4"/>
+                </a:solidFill>
+                <a:latin typeface="Consolas" panose="020B0609020204030204" pitchFamily="49" charset="0"/>
+              </a:rPr>
+              <a:t>();</a:t>
+            </a:r>
+          </a:p>
+          <a:p>
+            <a:br>
+              <a:rPr lang="pt-BR" sz="1600" dirty="0">
+                <a:solidFill>
+                  <a:srgbClr val="D4D4D4"/>
+                </a:solidFill>
+                <a:latin typeface="Consolas" panose="020B0609020204030204" pitchFamily="49" charset="0"/>
+              </a:rPr>
+            </a:br>
+            <a:r>
+              <a:rPr lang="pt-BR" sz="1600" dirty="0">
+                <a:solidFill>
+                  <a:srgbClr val="D4D4D4"/>
+                </a:solidFill>
+                <a:latin typeface="Consolas" panose="020B0609020204030204" pitchFamily="49" charset="0"/>
+              </a:rPr>
+              <a:t>   </a:t>
+            </a:r>
+            <a:r>
+              <a:rPr lang="pt-BR" sz="1600" dirty="0" err="1">
+                <a:solidFill>
+                  <a:srgbClr val="569CD6"/>
+                </a:solidFill>
+                <a:latin typeface="Consolas" panose="020B0609020204030204" pitchFamily="49" charset="0"/>
+              </a:rPr>
+              <a:t>public</a:t>
+            </a:r>
+            <a:r>
+              <a:rPr lang="pt-BR" sz="1600" dirty="0">
+                <a:solidFill>
+                  <a:srgbClr val="D4D4D4"/>
+                </a:solidFill>
+                <a:latin typeface="Consolas" panose="020B0609020204030204" pitchFamily="49" charset="0"/>
+              </a:rPr>
+              <a:t> </a:t>
+            </a:r>
+            <a:r>
+              <a:rPr lang="pt-BR" sz="1600" dirty="0" err="1">
+                <a:solidFill>
+                  <a:srgbClr val="4EC9B0"/>
+                </a:solidFill>
+                <a:latin typeface="Consolas" panose="020B0609020204030204" pitchFamily="49" charset="0"/>
+              </a:rPr>
+              <a:t>Guest</a:t>
+            </a:r>
+            <a:r>
+              <a:rPr lang="pt-BR" sz="1600" dirty="0">
+                <a:solidFill>
+                  <a:srgbClr val="D4D4D4"/>
+                </a:solidFill>
+                <a:latin typeface="Consolas" panose="020B0609020204030204" pitchFamily="49" charset="0"/>
+              </a:rPr>
+              <a:t> </a:t>
+            </a:r>
+            <a:r>
+              <a:rPr lang="pt-BR" sz="1600" dirty="0" err="1">
+                <a:solidFill>
+                  <a:srgbClr val="DCDCAA"/>
+                </a:solidFill>
+                <a:latin typeface="Consolas" panose="020B0609020204030204" pitchFamily="49" charset="0"/>
+              </a:rPr>
+              <a:t>readById</a:t>
+            </a:r>
+            <a:r>
+              <a:rPr lang="pt-BR" sz="1600" dirty="0">
+                <a:solidFill>
+                  <a:srgbClr val="D4D4D4"/>
+                </a:solidFill>
+                <a:latin typeface="Consolas" panose="020B0609020204030204" pitchFamily="49" charset="0"/>
+              </a:rPr>
+              <a:t>(</a:t>
+            </a:r>
+            <a:r>
+              <a:rPr lang="pt-BR" sz="1600" dirty="0" err="1">
+                <a:solidFill>
+                  <a:srgbClr val="4EC9B0"/>
+                </a:solidFill>
+                <a:latin typeface="Consolas" panose="020B0609020204030204" pitchFamily="49" charset="0"/>
+              </a:rPr>
+              <a:t>long</a:t>
+            </a:r>
+            <a:r>
+              <a:rPr lang="pt-BR" sz="1600" dirty="0">
+                <a:solidFill>
+                  <a:srgbClr val="D4D4D4"/>
+                </a:solidFill>
+                <a:latin typeface="Consolas" panose="020B0609020204030204" pitchFamily="49" charset="0"/>
+              </a:rPr>
+              <a:t> </a:t>
+            </a:r>
+            <a:r>
+              <a:rPr lang="pt-BR" sz="1600" dirty="0">
+                <a:solidFill>
+                  <a:srgbClr val="9CDCFE"/>
+                </a:solidFill>
+                <a:latin typeface="Consolas" panose="020B0609020204030204" pitchFamily="49" charset="0"/>
+              </a:rPr>
+              <a:t>id</a:t>
+            </a:r>
+            <a:r>
+              <a:rPr lang="pt-BR" sz="1600" dirty="0">
+                <a:solidFill>
+                  <a:srgbClr val="D4D4D4"/>
+                </a:solidFill>
+                <a:latin typeface="Consolas" panose="020B0609020204030204" pitchFamily="49" charset="0"/>
+              </a:rPr>
+              <a:t>);</a:t>
+            </a:r>
+          </a:p>
+          <a:p>
+            <a:br>
+              <a:rPr lang="pt-BR" sz="1600" dirty="0">
+                <a:solidFill>
+                  <a:srgbClr val="D4D4D4"/>
+                </a:solidFill>
+                <a:latin typeface="Consolas" panose="020B0609020204030204" pitchFamily="49" charset="0"/>
+              </a:rPr>
+            </a:br>
+            <a:r>
+              <a:rPr lang="pt-BR" sz="1600" dirty="0">
+                <a:solidFill>
+                  <a:srgbClr val="D4D4D4"/>
+                </a:solidFill>
+                <a:latin typeface="Consolas" panose="020B0609020204030204" pitchFamily="49" charset="0"/>
+              </a:rPr>
+              <a:t>   </a:t>
+            </a:r>
+            <a:r>
+              <a:rPr lang="pt-BR" sz="1600" dirty="0" err="1">
+                <a:solidFill>
+                  <a:srgbClr val="569CD6"/>
+                </a:solidFill>
+                <a:latin typeface="Consolas" panose="020B0609020204030204" pitchFamily="49" charset="0"/>
+              </a:rPr>
+              <a:t>public</a:t>
+            </a:r>
+            <a:r>
+              <a:rPr lang="pt-BR" sz="1600" dirty="0">
+                <a:solidFill>
+                  <a:srgbClr val="D4D4D4"/>
+                </a:solidFill>
+                <a:latin typeface="Consolas" panose="020B0609020204030204" pitchFamily="49" charset="0"/>
+              </a:rPr>
+              <a:t> </a:t>
+            </a:r>
+            <a:r>
+              <a:rPr lang="pt-BR" sz="1600" dirty="0" err="1">
+                <a:solidFill>
+                  <a:srgbClr val="4EC9B0"/>
+                </a:solidFill>
+                <a:latin typeface="Consolas" panose="020B0609020204030204" pitchFamily="49" charset="0"/>
+              </a:rPr>
+              <a:t>void</a:t>
+            </a:r>
+            <a:r>
+              <a:rPr lang="pt-BR" sz="1600" dirty="0">
+                <a:solidFill>
+                  <a:srgbClr val="D4D4D4"/>
+                </a:solidFill>
+                <a:latin typeface="Consolas" panose="020B0609020204030204" pitchFamily="49" charset="0"/>
+              </a:rPr>
+              <a:t> </a:t>
+            </a:r>
+            <a:r>
+              <a:rPr lang="pt-BR" sz="1600" dirty="0">
+                <a:solidFill>
+                  <a:srgbClr val="DCDCAA"/>
+                </a:solidFill>
+                <a:latin typeface="Consolas" panose="020B0609020204030204" pitchFamily="49" charset="0"/>
+              </a:rPr>
+              <a:t>update</a:t>
+            </a:r>
+            <a:r>
+              <a:rPr lang="pt-BR" sz="1600" dirty="0">
+                <a:solidFill>
+                  <a:srgbClr val="D4D4D4"/>
+                </a:solidFill>
+                <a:latin typeface="Consolas" panose="020B0609020204030204" pitchFamily="49" charset="0"/>
+              </a:rPr>
+              <a:t>(</a:t>
+            </a:r>
+            <a:r>
+              <a:rPr lang="pt-BR" sz="1600" dirty="0" err="1">
+                <a:solidFill>
+                  <a:srgbClr val="4EC9B0"/>
+                </a:solidFill>
+                <a:latin typeface="Consolas" panose="020B0609020204030204" pitchFamily="49" charset="0"/>
+              </a:rPr>
+              <a:t>Guest</a:t>
+            </a:r>
+            <a:r>
+              <a:rPr lang="pt-BR" sz="1600" dirty="0">
+                <a:solidFill>
+                  <a:srgbClr val="D4D4D4"/>
+                </a:solidFill>
+                <a:latin typeface="Consolas" panose="020B0609020204030204" pitchFamily="49" charset="0"/>
+              </a:rPr>
+              <a:t> </a:t>
+            </a:r>
+            <a:r>
+              <a:rPr lang="pt-BR" sz="1600" dirty="0" err="1">
+                <a:solidFill>
+                  <a:srgbClr val="9CDCFE"/>
+                </a:solidFill>
+                <a:latin typeface="Consolas" panose="020B0609020204030204" pitchFamily="49" charset="0"/>
+              </a:rPr>
+              <a:t>guest</a:t>
+            </a:r>
+            <a:r>
+              <a:rPr lang="pt-BR" sz="1600" dirty="0">
+                <a:solidFill>
+                  <a:srgbClr val="D4D4D4"/>
+                </a:solidFill>
+                <a:latin typeface="Consolas" panose="020B0609020204030204" pitchFamily="49" charset="0"/>
+              </a:rPr>
+              <a:t>);</a:t>
+            </a:r>
+          </a:p>
+          <a:p>
+            <a:br>
+              <a:rPr lang="pt-BR" sz="1600" dirty="0">
+                <a:solidFill>
+                  <a:srgbClr val="D4D4D4"/>
+                </a:solidFill>
+                <a:latin typeface="Consolas" panose="020B0609020204030204" pitchFamily="49" charset="0"/>
+              </a:rPr>
+            </a:br>
+            <a:r>
+              <a:rPr lang="pt-BR" sz="1600" dirty="0">
+                <a:solidFill>
+                  <a:srgbClr val="D4D4D4"/>
+                </a:solidFill>
+                <a:latin typeface="Consolas" panose="020B0609020204030204" pitchFamily="49" charset="0"/>
+              </a:rPr>
+              <a:t>   </a:t>
+            </a:r>
+            <a:r>
+              <a:rPr lang="pt-BR" sz="1600" dirty="0" err="1">
+                <a:solidFill>
+                  <a:srgbClr val="569CD6"/>
+                </a:solidFill>
+                <a:latin typeface="Consolas" panose="020B0609020204030204" pitchFamily="49" charset="0"/>
+              </a:rPr>
+              <a:t>public</a:t>
+            </a:r>
+            <a:r>
+              <a:rPr lang="pt-BR" sz="1600" dirty="0">
+                <a:solidFill>
+                  <a:srgbClr val="D4D4D4"/>
+                </a:solidFill>
+                <a:latin typeface="Consolas" panose="020B0609020204030204" pitchFamily="49" charset="0"/>
+              </a:rPr>
+              <a:t> </a:t>
+            </a:r>
+            <a:r>
+              <a:rPr lang="pt-BR" sz="1600" dirty="0" err="1">
+                <a:solidFill>
+                  <a:srgbClr val="4EC9B0"/>
+                </a:solidFill>
+                <a:latin typeface="Consolas" panose="020B0609020204030204" pitchFamily="49" charset="0"/>
+              </a:rPr>
+              <a:t>void</a:t>
+            </a:r>
+            <a:r>
+              <a:rPr lang="pt-BR" sz="1600" dirty="0">
+                <a:solidFill>
+                  <a:srgbClr val="D4D4D4"/>
+                </a:solidFill>
+                <a:latin typeface="Consolas" panose="020B0609020204030204" pitchFamily="49" charset="0"/>
+              </a:rPr>
+              <a:t> </a:t>
+            </a:r>
+            <a:r>
+              <a:rPr lang="pt-BR" sz="1600" dirty="0">
+                <a:solidFill>
+                  <a:srgbClr val="DCDCAA"/>
+                </a:solidFill>
+                <a:latin typeface="Consolas" panose="020B0609020204030204" pitchFamily="49" charset="0"/>
+              </a:rPr>
+              <a:t>delete</a:t>
+            </a:r>
+            <a:r>
+              <a:rPr lang="pt-BR" sz="1600" dirty="0">
+                <a:solidFill>
+                  <a:srgbClr val="D4D4D4"/>
+                </a:solidFill>
+                <a:latin typeface="Consolas" panose="020B0609020204030204" pitchFamily="49" charset="0"/>
+              </a:rPr>
+              <a:t>(</a:t>
+            </a:r>
+            <a:r>
+              <a:rPr lang="pt-BR" sz="1600" dirty="0" err="1">
+                <a:solidFill>
+                  <a:srgbClr val="4EC9B0"/>
+                </a:solidFill>
+                <a:latin typeface="Consolas" panose="020B0609020204030204" pitchFamily="49" charset="0"/>
+              </a:rPr>
+              <a:t>Guest</a:t>
+            </a:r>
+            <a:r>
+              <a:rPr lang="pt-BR" sz="1600" dirty="0">
+                <a:solidFill>
+                  <a:srgbClr val="D4D4D4"/>
+                </a:solidFill>
+                <a:latin typeface="Consolas" panose="020B0609020204030204" pitchFamily="49" charset="0"/>
+              </a:rPr>
+              <a:t> </a:t>
+            </a:r>
+            <a:r>
+              <a:rPr lang="pt-BR" sz="1600" dirty="0" err="1">
+                <a:solidFill>
+                  <a:srgbClr val="9CDCFE"/>
+                </a:solidFill>
+                <a:latin typeface="Consolas" panose="020B0609020204030204" pitchFamily="49" charset="0"/>
+              </a:rPr>
+              <a:t>guest</a:t>
+            </a:r>
+            <a:r>
+              <a:rPr lang="pt-BR" sz="1600" dirty="0">
+                <a:solidFill>
+                  <a:srgbClr val="D4D4D4"/>
+                </a:solidFill>
+                <a:latin typeface="Consolas" panose="020B0609020204030204" pitchFamily="49" charset="0"/>
+              </a:rPr>
+              <a:t>);</a:t>
+            </a:r>
+          </a:p>
+          <a:p>
+            <a:r>
+              <a:rPr lang="pt-BR" sz="1600" dirty="0">
+                <a:solidFill>
+                  <a:srgbClr val="D4D4D4"/>
+                </a:solidFill>
+                <a:latin typeface="Consolas" panose="020B0609020204030204" pitchFamily="49" charset="0"/>
+              </a:rPr>
+              <a:t>}</a:t>
+            </a:r>
+          </a:p>
+        </p:txBody>
+      </p:sp>
+    </p:spTree>
+    <p:extLst>
+      <p:ext uri="{BB962C8B-B14F-4D97-AF65-F5344CB8AC3E}">
+        <p14:creationId xmlns:p14="http://schemas.microsoft.com/office/powerpoint/2010/main" val="497262610"/>
+      </p:ext>
+    </p:extLst>
+  </p:cSld>
+  <p:clrMapOvr>
+    <a:masterClrMapping/>
+  </p:clrMapOvr>
+</p:sld>
+</file>
+
+<file path=ppt/slides/slide14.xml><?xml version="1.0" encoding="utf-8"?>
+<p:sld xmlns:a="http://schemas.openxmlformats.org/drawingml/2006/main" xmlns:r="http://schemas.openxmlformats.org/officeDocument/2006/relationships" xmlns:p="http://schemas.openxmlformats.org/presentationml/2006/main">
+  <p:cSld>
+    <p:bg>
+      <p:bgPr>
+        <a:solidFill>
+          <a:srgbClr val="54416B"/>
+        </a:solidFill>
+        <a:effectLst/>
+      </p:bgPr>
+    </p:bg>
+    <p:spTree>
+      <p:nvGrpSpPr>
+        <p:cNvPr id="1" name="Shape 97"/>
+        <p:cNvGrpSpPr/>
+        <p:nvPr/>
+      </p:nvGrpSpPr>
+      <p:grpSpPr>
+        <a:xfrm>
+          <a:off x="0" y="0"/>
+          <a:ext cx="0" cy="0"/>
+          <a:chOff x="0" y="0"/>
+          <a:chExt cx="0" cy="0"/>
+        </a:xfrm>
+      </p:grpSpPr>
+      <p:pic>
+        <p:nvPicPr>
+          <p:cNvPr id="7" name="Imagem 6">
+            <a:extLst>
+              <a:ext uri="{FF2B5EF4-FFF2-40B4-BE49-F238E27FC236}">
+                <a16:creationId xmlns:a16="http://schemas.microsoft.com/office/drawing/2014/main" id="{D6C112AC-0AED-409F-A046-42B8C81D7BFA}"/>
+              </a:ext>
+            </a:extLst>
+          </p:cNvPr>
+          <p:cNvPicPr>
+            <a:picLocks noChangeAspect="1"/>
+          </p:cNvPicPr>
+          <p:nvPr/>
+        </p:nvPicPr>
+        <p:blipFill>
+          <a:blip r:embed="rId3"/>
+          <a:stretch>
+            <a:fillRect/>
+          </a:stretch>
+        </p:blipFill>
+        <p:spPr>
+          <a:xfrm>
+            <a:off x="632061" y="174580"/>
+            <a:ext cx="746574" cy="358356"/>
+          </a:xfrm>
+          <a:prstGeom prst="rect">
+            <a:avLst/>
+          </a:prstGeom>
+        </p:spPr>
+      </p:pic>
+      <p:sp>
+        <p:nvSpPr>
+          <p:cNvPr id="12" name="Retângulo 11">
+            <a:extLst>
+              <a:ext uri="{FF2B5EF4-FFF2-40B4-BE49-F238E27FC236}">
+                <a16:creationId xmlns:a16="http://schemas.microsoft.com/office/drawing/2014/main" id="{271F94DF-0C4F-4EC5-8956-4969FA418718}"/>
+              </a:ext>
+            </a:extLst>
+          </p:cNvPr>
+          <p:cNvSpPr/>
+          <p:nvPr/>
+        </p:nvSpPr>
+        <p:spPr>
+          <a:xfrm>
+            <a:off x="0" y="0"/>
+            <a:ext cx="450166" cy="6858000"/>
+          </a:xfrm>
+          <a:prstGeom prst="rect">
+            <a:avLst/>
+          </a:prstGeom>
+          <a:gradFill>
+            <a:gsLst>
+              <a:gs pos="0">
+                <a:schemeClr val="accent1">
+                  <a:lumMod val="5000"/>
+                  <a:lumOff val="95000"/>
+                </a:schemeClr>
+              </a:gs>
+              <a:gs pos="100000">
+                <a:srgbClr val="54416B"/>
+              </a:gs>
+            </a:gsLst>
+            <a:path path="circle">
+              <a:fillToRect l="100000" t="100000"/>
+            </a:path>
+          </a:gradFill>
+          <a:ln>
+            <a:noFill/>
+          </a:ln>
+        </p:spPr>
+        <p:style>
+          <a:lnRef idx="2">
+            <a:schemeClr val="accent1">
+              <a:shade val="50000"/>
+            </a:schemeClr>
+          </a:lnRef>
+          <a:fillRef idx="1">
+            <a:schemeClr val="accent1"/>
+          </a:fillRef>
+          <a:effectRef idx="0">
+            <a:schemeClr val="accent1"/>
+          </a:effectRef>
+          <a:fontRef idx="minor">
+            <a:schemeClr val="lt1"/>
+          </a:fontRef>
+        </p:style>
+        <p:txBody>
+          <a:bodyPr rtlCol="0" anchor="ctr"/>
+          <a:lstStyle/>
+          <a:p>
+            <a:pPr algn="ctr"/>
+            <a:endParaRPr lang="pt-BR"/>
+          </a:p>
+        </p:txBody>
+      </p:sp>
+      <p:pic>
+        <p:nvPicPr>
+          <p:cNvPr id="13" name="Imagem 12">
+            <a:extLst>
+              <a:ext uri="{FF2B5EF4-FFF2-40B4-BE49-F238E27FC236}">
+                <a16:creationId xmlns:a16="http://schemas.microsoft.com/office/drawing/2014/main" id="{445294E5-3ADA-46DE-9D79-9BCEAAF12DBB}"/>
+              </a:ext>
+            </a:extLst>
+          </p:cNvPr>
+          <p:cNvPicPr>
+            <a:picLocks noChangeAspect="1"/>
+          </p:cNvPicPr>
+          <p:nvPr/>
+        </p:nvPicPr>
+        <p:blipFill>
+          <a:blip r:embed="rId3"/>
+          <a:stretch>
+            <a:fillRect/>
+          </a:stretch>
+        </p:blipFill>
+        <p:spPr>
+          <a:xfrm rot="16200000">
+            <a:off x="-148204" y="6213725"/>
+            <a:ext cx="746574" cy="358356"/>
+          </a:xfrm>
+          <a:prstGeom prst="rect">
+            <a:avLst/>
+          </a:prstGeom>
+        </p:spPr>
+      </p:pic>
+      <p:sp>
+        <p:nvSpPr>
+          <p:cNvPr id="14" name="CaixaDeTexto 13">
+            <a:extLst>
+              <a:ext uri="{FF2B5EF4-FFF2-40B4-BE49-F238E27FC236}">
+                <a16:creationId xmlns:a16="http://schemas.microsoft.com/office/drawing/2014/main" id="{F0069CE5-7C5D-4662-AABB-EB02AB282D94}"/>
+              </a:ext>
+            </a:extLst>
+          </p:cNvPr>
+          <p:cNvSpPr txBox="1"/>
+          <p:nvPr/>
+        </p:nvSpPr>
+        <p:spPr>
+          <a:xfrm rot="16200000">
+            <a:off x="-2323823" y="3225011"/>
+            <a:ext cx="5097813" cy="307777"/>
+          </a:xfrm>
+          <a:prstGeom prst="rect">
+            <a:avLst/>
+          </a:prstGeom>
+          <a:noFill/>
+        </p:spPr>
+        <p:txBody>
+          <a:bodyPr wrap="square" rtlCol="0">
+            <a:spAutoFit/>
+          </a:bodyPr>
+          <a:lstStyle/>
+          <a:p>
+            <a:r>
+              <a:rPr lang="pt-BR" dirty="0">
+                <a:latin typeface="Calibri" panose="020F0502020204030204" pitchFamily="34" charset="0"/>
+                <a:cs typeface="Calibri" panose="020F0502020204030204" pitchFamily="34" charset="0"/>
+              </a:rPr>
+              <a:t>FAI - Centro de Ensino Superior em Gestão, Tecnologia e Educação</a:t>
+            </a:r>
+          </a:p>
+        </p:txBody>
+      </p:sp>
+      <p:cxnSp>
+        <p:nvCxnSpPr>
+          <p:cNvPr id="16" name="Conector reto 15">
+            <a:extLst>
+              <a:ext uri="{FF2B5EF4-FFF2-40B4-BE49-F238E27FC236}">
+                <a16:creationId xmlns:a16="http://schemas.microsoft.com/office/drawing/2014/main" id="{6116879A-0ED7-47C5-A7F1-3BE9B9E35DD5}"/>
+              </a:ext>
+            </a:extLst>
+          </p:cNvPr>
+          <p:cNvCxnSpPr>
+            <a:cxnSpLocks/>
+          </p:cNvCxnSpPr>
+          <p:nvPr/>
+        </p:nvCxnSpPr>
+        <p:spPr>
+          <a:xfrm>
+            <a:off x="632061" y="633045"/>
+            <a:ext cx="8258721" cy="0"/>
+          </a:xfrm>
+          <a:prstGeom prst="line">
+            <a:avLst/>
+          </a:prstGeom>
+          <a:ln>
+            <a:gradFill flip="none" rotWithShape="1">
+              <a:gsLst>
+                <a:gs pos="0">
+                  <a:schemeClr val="accent3">
+                    <a:lumMod val="75000"/>
+                  </a:schemeClr>
+                </a:gs>
+                <a:gs pos="100000">
+                  <a:srgbClr val="4F6228"/>
+                </a:gs>
+              </a:gsLst>
+              <a:lin ang="0" scaled="1"/>
+              <a:tileRect/>
+            </a:gradFill>
+          </a:ln>
+        </p:spPr>
+        <p:style>
+          <a:lnRef idx="1">
+            <a:schemeClr val="accent1"/>
+          </a:lnRef>
+          <a:fillRef idx="0">
+            <a:schemeClr val="accent1"/>
+          </a:fillRef>
+          <a:effectRef idx="0">
+            <a:schemeClr val="accent1"/>
+          </a:effectRef>
+          <a:fontRef idx="minor">
+            <a:schemeClr val="tx1"/>
+          </a:fontRef>
+        </p:style>
+      </p:cxnSp>
+      <p:sp>
+        <p:nvSpPr>
+          <p:cNvPr id="9" name="CaixaDeTexto 8">
+            <a:extLst>
+              <a:ext uri="{FF2B5EF4-FFF2-40B4-BE49-F238E27FC236}">
+                <a16:creationId xmlns:a16="http://schemas.microsoft.com/office/drawing/2014/main" id="{E21B1250-A8A1-4771-8929-41EC66F5748E}"/>
+              </a:ext>
+            </a:extLst>
+          </p:cNvPr>
+          <p:cNvSpPr txBox="1"/>
+          <p:nvPr/>
+        </p:nvSpPr>
+        <p:spPr>
+          <a:xfrm>
             <a:off x="1195262" y="829993"/>
             <a:ext cx="7132318" cy="477054"/>
           </a:xfrm>
@@ -17991,10 +18966,10 @@
                 <a:ea typeface="Verdana" panose="020B0604030504040204" pitchFamily="34" charset="0"/>
                 <a:cs typeface="Calibri" panose="020F0502020204030204" pitchFamily="34" charset="0"/>
               </a:rPr>
-              <a:t>2º - </a:t>
-            </a:r>
-            <a:r>
-              <a:rPr lang="pt-BR" sz="1800" dirty="0">
+              <a:t>2º </a:t>
+            </a:r>
+            <a:r>
+              <a:rPr lang="pt-BR" sz="2500">
                 <a:solidFill>
                   <a:schemeClr val="bg1">
                     <a:lumMod val="85000"/>
@@ -18004,7 +18979,33 @@
                 <a:ea typeface="Verdana" panose="020B0604030504040204" pitchFamily="34" charset="0"/>
                 <a:cs typeface="Calibri" panose="020F0502020204030204" pitchFamily="34" charset="0"/>
               </a:rPr>
-              <a:t>Agora, criamos e implementamos nossa classe DAO</a:t>
+              <a:t>- </a:t>
+            </a:r>
+            <a:r>
+              <a:rPr lang="pt-BR" sz="1800">
+                <a:solidFill>
+                  <a:schemeClr val="bg1">
+                    <a:lumMod val="85000"/>
+                  </a:schemeClr>
+                </a:solidFill>
+                <a:latin typeface="Verdana" panose="020B0604030504040204" pitchFamily="34" charset="0"/>
+                <a:ea typeface="Verdana" panose="020B0604030504040204" pitchFamily="34" charset="0"/>
+                <a:cs typeface="Calibri" panose="020F0502020204030204" pitchFamily="34" charset="0"/>
+              </a:rPr>
+              <a:t>Criamos </a:t>
+            </a:r>
+            <a:r>
+              <a:rPr lang="pt-BR" sz="1800" dirty="0">
+                <a:solidFill>
+                  <a:schemeClr val="bg1">
+                    <a:lumMod val="85000"/>
+                  </a:schemeClr>
+                </a:solidFill>
+                <a:latin typeface="Verdana" panose="020B0604030504040204" pitchFamily="34" charset="0"/>
+                <a:ea typeface="Verdana" panose="020B0604030504040204" pitchFamily="34" charset="0"/>
+                <a:cs typeface="Calibri" panose="020F0502020204030204" pitchFamily="34" charset="0"/>
+              </a:rPr>
+              <a:t>e implementamos nossa classe DAO</a:t>
             </a:r>
           </a:p>
         </p:txBody>
@@ -19618,7 +20619,7 @@
                 <a:ea typeface="Verdana" panose="020B0604030504040204" pitchFamily="34" charset="0"/>
                 <a:cs typeface="Calibri" panose="020F0502020204030204" pitchFamily="34" charset="0"/>
               </a:rPr>
-              <a:t>Não se trata de um framework ou um código pronto, mas de uma definição de alto nível de como um problema comum pode ser solucionado.</a:t>
+              <a:t>Não se trata de um framework ou um código pronto, mas de uma definição de como um problema comum pode ser solucionado.</a:t>
             </a:r>
           </a:p>
         </p:txBody>
@@ -20617,7 +21618,7 @@
         <p:spPr>
           <a:xfrm>
             <a:off x="1005349" y="998760"/>
-            <a:ext cx="7692084" cy="5478423"/>
+            <a:ext cx="7692084" cy="5693866"/>
           </a:xfrm>
           <a:prstGeom prst="rect">
             <a:avLst/>
@@ -21251,6 +22252,14 @@
               </a:rPr>
               <a:t>;</a:t>
             </a:r>
+          </a:p>
+          <a:p>
+            <a:endParaRPr lang="pt-BR" dirty="0">
+              <a:solidFill>
+                <a:srgbClr val="D4D4D4"/>
+              </a:solidFill>
+              <a:latin typeface="Consolas" panose="020B0609020204030204" pitchFamily="49" charset="0"/>
+            </a:endParaRPr>
           </a:p>
           <a:p>
             <a:r>
@@ -22178,6 +23187,332 @@
       </p:cxnSp>
       <p:sp>
         <p:nvSpPr>
+          <p:cNvPr id="8" name="CaixaDeTexto 7">
+            <a:extLst>
+              <a:ext uri="{FF2B5EF4-FFF2-40B4-BE49-F238E27FC236}">
+                <a16:creationId xmlns:a16="http://schemas.microsoft.com/office/drawing/2014/main" id="{4636108B-A405-4D07-A0DC-738CBB4E2677}"/>
+              </a:ext>
+            </a:extLst>
+          </p:cNvPr>
+          <p:cNvSpPr txBox="1"/>
+          <p:nvPr/>
+        </p:nvSpPr>
+        <p:spPr>
+          <a:xfrm>
+            <a:off x="1195262" y="1947738"/>
+            <a:ext cx="7132318" cy="923330"/>
+          </a:xfrm>
+          <a:prstGeom prst="rect">
+            <a:avLst/>
+          </a:prstGeom>
+          <a:noFill/>
+        </p:spPr>
+        <p:txBody>
+          <a:bodyPr wrap="square" rtlCol="0">
+            <a:spAutoFit/>
+          </a:bodyPr>
+          <a:lstStyle/>
+          <a:p>
+            <a:pPr algn="just"/>
+            <a:r>
+              <a:rPr lang="pt-BR" sz="1800" dirty="0">
+                <a:solidFill>
+                  <a:schemeClr val="bg1">
+                    <a:lumMod val="85000"/>
+                  </a:schemeClr>
+                </a:solidFill>
+                <a:latin typeface="Verdana" panose="020B0604030504040204" pitchFamily="34" charset="0"/>
+                <a:ea typeface="Verdana" panose="020B0604030504040204" pitchFamily="34" charset="0"/>
+                <a:cs typeface="Calibri" panose="020F0502020204030204" pitchFamily="34" charset="0"/>
+              </a:rPr>
+              <a:t>O padrão </a:t>
+            </a:r>
+            <a:r>
+              <a:rPr lang="pt-BR" sz="1800" dirty="0" err="1">
+                <a:solidFill>
+                  <a:schemeClr val="bg1">
+                    <a:lumMod val="85000"/>
+                  </a:schemeClr>
+                </a:solidFill>
+                <a:latin typeface="Verdana" panose="020B0604030504040204" pitchFamily="34" charset="0"/>
+                <a:ea typeface="Verdana" panose="020B0604030504040204" pitchFamily="34" charset="0"/>
+                <a:cs typeface="Calibri" panose="020F0502020204030204" pitchFamily="34" charset="0"/>
+              </a:rPr>
+              <a:t>Singleton</a:t>
+            </a:r>
+            <a:r>
+              <a:rPr lang="pt-BR" sz="1800" dirty="0">
+                <a:solidFill>
+                  <a:schemeClr val="bg1">
+                    <a:lumMod val="85000"/>
+                  </a:schemeClr>
+                </a:solidFill>
+                <a:latin typeface="Verdana" panose="020B0604030504040204" pitchFamily="34" charset="0"/>
+                <a:ea typeface="Verdana" panose="020B0604030504040204" pitchFamily="34" charset="0"/>
+                <a:cs typeface="Calibri" panose="020F0502020204030204" pitchFamily="34" charset="0"/>
+              </a:rPr>
+              <a:t> garante a existência de apenas uma instância de determinada classe, mantendo um ponto  global de acesso ao objeto criado.</a:t>
+            </a:r>
+          </a:p>
+        </p:txBody>
+      </p:sp>
+    </p:spTree>
+    <p:extLst>
+      <p:ext uri="{BB962C8B-B14F-4D97-AF65-F5344CB8AC3E}">
+        <p14:creationId xmlns:p14="http://schemas.microsoft.com/office/powerpoint/2010/main" val="1453951824"/>
+      </p:ext>
+    </p:extLst>
+  </p:cSld>
+  <p:clrMapOvr>
+    <a:masterClrMapping/>
+  </p:clrMapOvr>
+</p:sld>
+</file>
+
+<file path=ppt/slides/slide8.xml><?xml version="1.0" encoding="utf-8"?>
+<p:sld xmlns:a="http://schemas.openxmlformats.org/drawingml/2006/main" xmlns:r="http://schemas.openxmlformats.org/officeDocument/2006/relationships" xmlns:p="http://schemas.openxmlformats.org/presentationml/2006/main">
+  <p:cSld>
+    <p:bg>
+      <p:bgPr>
+        <a:solidFill>
+          <a:srgbClr val="54416B"/>
+        </a:solidFill>
+        <a:effectLst/>
+      </p:bgPr>
+    </p:bg>
+    <p:spTree>
+      <p:nvGrpSpPr>
+        <p:cNvPr id="1" name="Shape 97"/>
+        <p:cNvGrpSpPr/>
+        <p:nvPr/>
+      </p:nvGrpSpPr>
+      <p:grpSpPr>
+        <a:xfrm>
+          <a:off x="0" y="0"/>
+          <a:ext cx="0" cy="0"/>
+          <a:chOff x="0" y="0"/>
+          <a:chExt cx="0" cy="0"/>
+        </a:xfrm>
+      </p:grpSpPr>
+      <p:pic>
+        <p:nvPicPr>
+          <p:cNvPr id="7" name="Imagem 6">
+            <a:extLst>
+              <a:ext uri="{FF2B5EF4-FFF2-40B4-BE49-F238E27FC236}">
+                <a16:creationId xmlns:a16="http://schemas.microsoft.com/office/drawing/2014/main" id="{D6C112AC-0AED-409F-A046-42B8C81D7BFA}"/>
+              </a:ext>
+            </a:extLst>
+          </p:cNvPr>
+          <p:cNvPicPr>
+            <a:picLocks noChangeAspect="1"/>
+          </p:cNvPicPr>
+          <p:nvPr/>
+        </p:nvPicPr>
+        <p:blipFill>
+          <a:blip r:embed="rId3"/>
+          <a:stretch>
+            <a:fillRect/>
+          </a:stretch>
+        </p:blipFill>
+        <p:spPr>
+          <a:xfrm>
+            <a:off x="632061" y="174580"/>
+            <a:ext cx="746574" cy="358356"/>
+          </a:xfrm>
+          <a:prstGeom prst="rect">
+            <a:avLst/>
+          </a:prstGeom>
+        </p:spPr>
+      </p:pic>
+      <p:sp>
+        <p:nvSpPr>
+          <p:cNvPr id="12" name="Retângulo 11">
+            <a:extLst>
+              <a:ext uri="{FF2B5EF4-FFF2-40B4-BE49-F238E27FC236}">
+                <a16:creationId xmlns:a16="http://schemas.microsoft.com/office/drawing/2014/main" id="{271F94DF-0C4F-4EC5-8956-4969FA418718}"/>
+              </a:ext>
+            </a:extLst>
+          </p:cNvPr>
+          <p:cNvSpPr/>
+          <p:nvPr/>
+        </p:nvSpPr>
+        <p:spPr>
+          <a:xfrm>
+            <a:off x="0" y="0"/>
+            <a:ext cx="450166" cy="6858000"/>
+          </a:xfrm>
+          <a:prstGeom prst="rect">
+            <a:avLst/>
+          </a:prstGeom>
+          <a:gradFill>
+            <a:gsLst>
+              <a:gs pos="0">
+                <a:schemeClr val="accent1">
+                  <a:lumMod val="5000"/>
+                  <a:lumOff val="95000"/>
+                </a:schemeClr>
+              </a:gs>
+              <a:gs pos="100000">
+                <a:srgbClr val="54416B"/>
+              </a:gs>
+            </a:gsLst>
+            <a:path path="circle">
+              <a:fillToRect l="100000" t="100000"/>
+            </a:path>
+          </a:gradFill>
+          <a:ln>
+            <a:noFill/>
+          </a:ln>
+        </p:spPr>
+        <p:style>
+          <a:lnRef idx="2">
+            <a:schemeClr val="accent1">
+              <a:shade val="50000"/>
+            </a:schemeClr>
+          </a:lnRef>
+          <a:fillRef idx="1">
+            <a:schemeClr val="accent1"/>
+          </a:fillRef>
+          <a:effectRef idx="0">
+            <a:schemeClr val="accent1"/>
+          </a:effectRef>
+          <a:fontRef idx="minor">
+            <a:schemeClr val="lt1"/>
+          </a:fontRef>
+        </p:style>
+        <p:txBody>
+          <a:bodyPr rtlCol="0" anchor="ctr"/>
+          <a:lstStyle/>
+          <a:p>
+            <a:pPr algn="ctr"/>
+            <a:endParaRPr lang="pt-BR"/>
+          </a:p>
+        </p:txBody>
+      </p:sp>
+      <p:pic>
+        <p:nvPicPr>
+          <p:cNvPr id="13" name="Imagem 12">
+            <a:extLst>
+              <a:ext uri="{FF2B5EF4-FFF2-40B4-BE49-F238E27FC236}">
+                <a16:creationId xmlns:a16="http://schemas.microsoft.com/office/drawing/2014/main" id="{445294E5-3ADA-46DE-9D79-9BCEAAF12DBB}"/>
+              </a:ext>
+            </a:extLst>
+          </p:cNvPr>
+          <p:cNvPicPr>
+            <a:picLocks noChangeAspect="1"/>
+          </p:cNvPicPr>
+          <p:nvPr/>
+        </p:nvPicPr>
+        <p:blipFill>
+          <a:blip r:embed="rId3"/>
+          <a:stretch>
+            <a:fillRect/>
+          </a:stretch>
+        </p:blipFill>
+        <p:spPr>
+          <a:xfrm rot="16200000">
+            <a:off x="-148204" y="6213725"/>
+            <a:ext cx="746574" cy="358356"/>
+          </a:xfrm>
+          <a:prstGeom prst="rect">
+            <a:avLst/>
+          </a:prstGeom>
+        </p:spPr>
+      </p:pic>
+      <p:sp>
+        <p:nvSpPr>
+          <p:cNvPr id="14" name="CaixaDeTexto 13">
+            <a:extLst>
+              <a:ext uri="{FF2B5EF4-FFF2-40B4-BE49-F238E27FC236}">
+                <a16:creationId xmlns:a16="http://schemas.microsoft.com/office/drawing/2014/main" id="{F0069CE5-7C5D-4662-AABB-EB02AB282D94}"/>
+              </a:ext>
+            </a:extLst>
+          </p:cNvPr>
+          <p:cNvSpPr txBox="1"/>
+          <p:nvPr/>
+        </p:nvSpPr>
+        <p:spPr>
+          <a:xfrm rot="16200000">
+            <a:off x="-2323823" y="3225011"/>
+            <a:ext cx="5097813" cy="307777"/>
+          </a:xfrm>
+          <a:prstGeom prst="rect">
+            <a:avLst/>
+          </a:prstGeom>
+          <a:noFill/>
+        </p:spPr>
+        <p:txBody>
+          <a:bodyPr wrap="square" rtlCol="0">
+            <a:spAutoFit/>
+          </a:bodyPr>
+          <a:lstStyle/>
+          <a:p>
+            <a:r>
+              <a:rPr lang="pt-BR" dirty="0">
+                <a:latin typeface="Calibri" panose="020F0502020204030204" pitchFamily="34" charset="0"/>
+                <a:cs typeface="Calibri" panose="020F0502020204030204" pitchFamily="34" charset="0"/>
+              </a:rPr>
+              <a:t>FAI - Centro de Ensino Superior em Gestão, Tecnologia e Educação</a:t>
+            </a:r>
+          </a:p>
+        </p:txBody>
+      </p:sp>
+      <p:cxnSp>
+        <p:nvCxnSpPr>
+          <p:cNvPr id="16" name="Conector reto 15">
+            <a:extLst>
+              <a:ext uri="{FF2B5EF4-FFF2-40B4-BE49-F238E27FC236}">
+                <a16:creationId xmlns:a16="http://schemas.microsoft.com/office/drawing/2014/main" id="{6116879A-0ED7-47C5-A7F1-3BE9B9E35DD5}"/>
+              </a:ext>
+            </a:extLst>
+          </p:cNvPr>
+          <p:cNvCxnSpPr>
+            <a:cxnSpLocks/>
+          </p:cNvCxnSpPr>
+          <p:nvPr/>
+        </p:nvCxnSpPr>
+        <p:spPr>
+          <a:xfrm>
+            <a:off x="632061" y="633045"/>
+            <a:ext cx="8258721" cy="0"/>
+          </a:xfrm>
+          <a:prstGeom prst="line">
+            <a:avLst/>
+          </a:prstGeom>
+          <a:ln>
+            <a:gradFill flip="none" rotWithShape="1">
+              <a:gsLst>
+                <a:gs pos="0">
+                  <a:schemeClr val="accent3">
+                    <a:lumMod val="75000"/>
+                  </a:schemeClr>
+                </a:gs>
+                <a:gs pos="100000">
+                  <a:srgbClr val="4F6228"/>
+                </a:gs>
+              </a:gsLst>
+              <a:lin ang="0" scaled="1"/>
+              <a:tileRect/>
+            </a:gradFill>
+          </a:ln>
+        </p:spPr>
+        <p:style>
+          <a:lnRef idx="1">
+            <a:schemeClr val="accent1"/>
+          </a:lnRef>
+          <a:fillRef idx="0">
+            <a:schemeClr val="accent1"/>
+          </a:fillRef>
+          <a:effectRef idx="0">
+            <a:schemeClr val="accent1"/>
+          </a:effectRef>
+          <a:fontRef idx="minor">
+            <a:schemeClr val="tx1"/>
+          </a:fontRef>
+        </p:style>
+      </p:cxnSp>
+      <p:sp>
+        <p:nvSpPr>
           <p:cNvPr id="9" name="CaixaDeTexto 8">
             <a:extLst>
               <a:ext uri="{FF2B5EF4-FFF2-40B4-BE49-F238E27FC236}">
@@ -22250,7 +23585,7 @@
 </p:sld>
 </file>
 
-<file path=ppt/slides/slide8.xml><?xml version="1.0" encoding="utf-8"?>
+<file path=ppt/slides/slide9.xml><?xml version="1.0" encoding="utf-8"?>
 <p:sld xmlns:a="http://schemas.openxmlformats.org/drawingml/2006/main" xmlns:r="http://schemas.openxmlformats.org/officeDocument/2006/relationships" xmlns:p="http://schemas.openxmlformats.org/presentationml/2006/main">
   <p:cSld>
     <p:bg>
@@ -23720,312 +25055,6 @@
     <p:extLst>
       <p:ext uri="{BB962C8B-B14F-4D97-AF65-F5344CB8AC3E}">
         <p14:creationId xmlns:p14="http://schemas.microsoft.com/office/powerpoint/2010/main" val="1909159283"/>
-      </p:ext>
-    </p:extLst>
-  </p:cSld>
-  <p:clrMapOvr>
-    <a:masterClrMapping/>
-  </p:clrMapOvr>
-</p:sld>
-</file>
-
-<file path=ppt/slides/slide9.xml><?xml version="1.0" encoding="utf-8"?>
-<p:sld xmlns:a="http://schemas.openxmlformats.org/drawingml/2006/main" xmlns:r="http://schemas.openxmlformats.org/officeDocument/2006/relationships" xmlns:p="http://schemas.openxmlformats.org/presentationml/2006/main">
-  <p:cSld>
-    <p:bg>
-      <p:bgPr>
-        <a:solidFill>
-          <a:srgbClr val="54416B"/>
-        </a:solidFill>
-        <a:effectLst/>
-      </p:bgPr>
-    </p:bg>
-    <p:spTree>
-      <p:nvGrpSpPr>
-        <p:cNvPr id="1" name="Shape 97"/>
-        <p:cNvGrpSpPr/>
-        <p:nvPr/>
-      </p:nvGrpSpPr>
-      <p:grpSpPr>
-        <a:xfrm>
-          <a:off x="0" y="0"/>
-          <a:ext cx="0" cy="0"/>
-          <a:chOff x="0" y="0"/>
-          <a:chExt cx="0" cy="0"/>
-        </a:xfrm>
-      </p:grpSpPr>
-      <p:pic>
-        <p:nvPicPr>
-          <p:cNvPr id="7" name="Imagem 6">
-            <a:extLst>
-              <a:ext uri="{FF2B5EF4-FFF2-40B4-BE49-F238E27FC236}">
-                <a16:creationId xmlns:a16="http://schemas.microsoft.com/office/drawing/2014/main" id="{D6C112AC-0AED-409F-A046-42B8C81D7BFA}"/>
-              </a:ext>
-            </a:extLst>
-          </p:cNvPr>
-          <p:cNvPicPr>
-            <a:picLocks noChangeAspect="1"/>
-          </p:cNvPicPr>
-          <p:nvPr/>
-        </p:nvPicPr>
-        <p:blipFill>
-          <a:blip r:embed="rId3"/>
-          <a:stretch>
-            <a:fillRect/>
-          </a:stretch>
-        </p:blipFill>
-        <p:spPr>
-          <a:xfrm>
-            <a:off x="632061" y="174580"/>
-            <a:ext cx="746574" cy="358356"/>
-          </a:xfrm>
-          <a:prstGeom prst="rect">
-            <a:avLst/>
-          </a:prstGeom>
-        </p:spPr>
-      </p:pic>
-      <p:sp>
-        <p:nvSpPr>
-          <p:cNvPr id="12" name="Retângulo 11">
-            <a:extLst>
-              <a:ext uri="{FF2B5EF4-FFF2-40B4-BE49-F238E27FC236}">
-                <a16:creationId xmlns:a16="http://schemas.microsoft.com/office/drawing/2014/main" id="{271F94DF-0C4F-4EC5-8956-4969FA418718}"/>
-              </a:ext>
-            </a:extLst>
-          </p:cNvPr>
-          <p:cNvSpPr/>
-          <p:nvPr/>
-        </p:nvSpPr>
-        <p:spPr>
-          <a:xfrm>
-            <a:off x="0" y="0"/>
-            <a:ext cx="450166" cy="6858000"/>
-          </a:xfrm>
-          <a:prstGeom prst="rect">
-            <a:avLst/>
-          </a:prstGeom>
-          <a:gradFill>
-            <a:gsLst>
-              <a:gs pos="0">
-                <a:schemeClr val="accent1">
-                  <a:lumMod val="5000"/>
-                  <a:lumOff val="95000"/>
-                </a:schemeClr>
-              </a:gs>
-              <a:gs pos="100000">
-                <a:srgbClr val="54416B"/>
-              </a:gs>
-            </a:gsLst>
-            <a:path path="circle">
-              <a:fillToRect l="100000" t="100000"/>
-            </a:path>
-          </a:gradFill>
-          <a:ln>
-            <a:noFill/>
-          </a:ln>
-        </p:spPr>
-        <p:style>
-          <a:lnRef idx="2">
-            <a:schemeClr val="accent1">
-              <a:shade val="50000"/>
-            </a:schemeClr>
-          </a:lnRef>
-          <a:fillRef idx="1">
-            <a:schemeClr val="accent1"/>
-          </a:fillRef>
-          <a:effectRef idx="0">
-            <a:schemeClr val="accent1"/>
-          </a:effectRef>
-          <a:fontRef idx="minor">
-            <a:schemeClr val="lt1"/>
-          </a:fontRef>
-        </p:style>
-        <p:txBody>
-          <a:bodyPr rtlCol="0" anchor="ctr"/>
-          <a:lstStyle/>
-          <a:p>
-            <a:pPr algn="ctr"/>
-            <a:endParaRPr lang="pt-BR"/>
-          </a:p>
-        </p:txBody>
-      </p:sp>
-      <p:pic>
-        <p:nvPicPr>
-          <p:cNvPr id="13" name="Imagem 12">
-            <a:extLst>
-              <a:ext uri="{FF2B5EF4-FFF2-40B4-BE49-F238E27FC236}">
-                <a16:creationId xmlns:a16="http://schemas.microsoft.com/office/drawing/2014/main" id="{445294E5-3ADA-46DE-9D79-9BCEAAF12DBB}"/>
-              </a:ext>
-            </a:extLst>
-          </p:cNvPr>
-          <p:cNvPicPr>
-            <a:picLocks noChangeAspect="1"/>
-          </p:cNvPicPr>
-          <p:nvPr/>
-        </p:nvPicPr>
-        <p:blipFill>
-          <a:blip r:embed="rId3"/>
-          <a:stretch>
-            <a:fillRect/>
-          </a:stretch>
-        </p:blipFill>
-        <p:spPr>
-          <a:xfrm rot="16200000">
-            <a:off x="-148204" y="6213725"/>
-            <a:ext cx="746574" cy="358356"/>
-          </a:xfrm>
-          <a:prstGeom prst="rect">
-            <a:avLst/>
-          </a:prstGeom>
-        </p:spPr>
-      </p:pic>
-      <p:sp>
-        <p:nvSpPr>
-          <p:cNvPr id="14" name="CaixaDeTexto 13">
-            <a:extLst>
-              <a:ext uri="{FF2B5EF4-FFF2-40B4-BE49-F238E27FC236}">
-                <a16:creationId xmlns:a16="http://schemas.microsoft.com/office/drawing/2014/main" id="{F0069CE5-7C5D-4662-AABB-EB02AB282D94}"/>
-              </a:ext>
-            </a:extLst>
-          </p:cNvPr>
-          <p:cNvSpPr txBox="1"/>
-          <p:nvPr/>
-        </p:nvSpPr>
-        <p:spPr>
-          <a:xfrm rot="16200000">
-            <a:off x="-2323823" y="3225011"/>
-            <a:ext cx="5097813" cy="307777"/>
-          </a:xfrm>
-          <a:prstGeom prst="rect">
-            <a:avLst/>
-          </a:prstGeom>
-          <a:noFill/>
-        </p:spPr>
-        <p:txBody>
-          <a:bodyPr wrap="square" rtlCol="0">
-            <a:spAutoFit/>
-          </a:bodyPr>
-          <a:lstStyle/>
-          <a:p>
-            <a:r>
-              <a:rPr lang="pt-BR" dirty="0">
-                <a:latin typeface="Calibri" panose="020F0502020204030204" pitchFamily="34" charset="0"/>
-                <a:cs typeface="Calibri" panose="020F0502020204030204" pitchFamily="34" charset="0"/>
-              </a:rPr>
-              <a:t>FAI - Centro de Ensino Superior em Gestão, Tecnologia e Educação</a:t>
-            </a:r>
-          </a:p>
-        </p:txBody>
-      </p:sp>
-      <p:cxnSp>
-        <p:nvCxnSpPr>
-          <p:cNvPr id="16" name="Conector reto 15">
-            <a:extLst>
-              <a:ext uri="{FF2B5EF4-FFF2-40B4-BE49-F238E27FC236}">
-                <a16:creationId xmlns:a16="http://schemas.microsoft.com/office/drawing/2014/main" id="{6116879A-0ED7-47C5-A7F1-3BE9B9E35DD5}"/>
-              </a:ext>
-            </a:extLst>
-          </p:cNvPr>
-          <p:cNvCxnSpPr>
-            <a:cxnSpLocks/>
-          </p:cNvCxnSpPr>
-          <p:nvPr/>
-        </p:nvCxnSpPr>
-        <p:spPr>
-          <a:xfrm>
-            <a:off x="632061" y="633045"/>
-            <a:ext cx="8258721" cy="0"/>
-          </a:xfrm>
-          <a:prstGeom prst="line">
-            <a:avLst/>
-          </a:prstGeom>
-          <a:ln>
-            <a:gradFill flip="none" rotWithShape="1">
-              <a:gsLst>
-                <a:gs pos="0">
-                  <a:schemeClr val="accent3">
-                    <a:lumMod val="75000"/>
-                  </a:schemeClr>
-                </a:gs>
-                <a:gs pos="100000">
-                  <a:srgbClr val="4F6228"/>
-                </a:gs>
-              </a:gsLst>
-              <a:lin ang="0" scaled="1"/>
-              <a:tileRect/>
-            </a:gradFill>
-          </a:ln>
-        </p:spPr>
-        <p:style>
-          <a:lnRef idx="1">
-            <a:schemeClr val="accent1"/>
-          </a:lnRef>
-          <a:fillRef idx="0">
-            <a:schemeClr val="accent1"/>
-          </a:fillRef>
-          <a:effectRef idx="0">
-            <a:schemeClr val="accent1"/>
-          </a:effectRef>
-          <a:fontRef idx="minor">
-            <a:schemeClr val="tx1"/>
-          </a:fontRef>
-        </p:style>
-      </p:cxnSp>
-      <p:sp>
-        <p:nvSpPr>
-          <p:cNvPr id="9" name="CaixaDeTexto 8">
-            <a:extLst>
-              <a:ext uri="{FF2B5EF4-FFF2-40B4-BE49-F238E27FC236}">
-                <a16:creationId xmlns:a16="http://schemas.microsoft.com/office/drawing/2014/main" id="{E21B1250-A8A1-4771-8929-41EC66F5748E}"/>
-              </a:ext>
-            </a:extLst>
-          </p:cNvPr>
-          <p:cNvSpPr txBox="1"/>
-          <p:nvPr/>
-        </p:nvSpPr>
-        <p:spPr>
-          <a:xfrm>
-            <a:off x="1195262" y="3024956"/>
-            <a:ext cx="7132318" cy="707886"/>
-          </a:xfrm>
-          <a:prstGeom prst="rect">
-            <a:avLst/>
-          </a:prstGeom>
-          <a:noFill/>
-        </p:spPr>
-        <p:txBody>
-          <a:bodyPr wrap="square" rtlCol="0">
-            <a:spAutoFit/>
-          </a:bodyPr>
-          <a:lstStyle/>
-          <a:p>
-            <a:pPr algn="ctr">
-              <a:buClr>
-                <a:schemeClr val="bg1">
-                  <a:lumMod val="85000"/>
-                </a:schemeClr>
-              </a:buClr>
-            </a:pPr>
-            <a:r>
-              <a:rPr lang="pt-BR" sz="4000" dirty="0">
-                <a:solidFill>
-                  <a:schemeClr val="bg1">
-                    <a:lumMod val="85000"/>
-                  </a:schemeClr>
-                </a:solidFill>
-                <a:latin typeface="Verdana" panose="020B0604030504040204" pitchFamily="34" charset="0"/>
-                <a:ea typeface="Verdana" panose="020B0604030504040204" pitchFamily="34" charset="0"/>
-                <a:cs typeface="Calibri" panose="020F0502020204030204" pitchFamily="34" charset="0"/>
-              </a:rPr>
-              <a:t>DAO</a:t>
-            </a:r>
-          </a:p>
-        </p:txBody>
-      </p:sp>
-    </p:spTree>
-    <p:extLst>
-      <p:ext uri="{BB962C8B-B14F-4D97-AF65-F5344CB8AC3E}">
-        <p14:creationId xmlns:p14="http://schemas.microsoft.com/office/powerpoint/2010/main" val="734261597"/>
       </p:ext>
     </p:extLst>
   </p:cSld>

</xml_diff>